<commit_message>
cambios docu y ppt
</commit_message>
<xml_diff>
--- a/DOCUMENTACION PROYECTO/presentacion YSTC w scrapping y geo.pptx
+++ b/DOCUMENTACION PROYECTO/presentacion YSTC w scrapping y geo.pptx
@@ -5,7 +5,7 @@
     <p:sldMasterId id="2147483648" r:id="rId1"/>
   </p:sldMasterIdLst>
   <p:notesMasterIdLst>
-    <p:notesMasterId r:id="rId34"/>
+    <p:notesMasterId r:id="rId36"/>
   </p:notesMasterIdLst>
   <p:sldIdLst>
     <p:sldId id="259" r:id="rId2"/>
@@ -16,30 +16,32 @@
     <p:sldId id="285" r:id="rId7"/>
     <p:sldId id="288" r:id="rId8"/>
     <p:sldId id="286" r:id="rId9"/>
-    <p:sldId id="271" r:id="rId10"/>
-    <p:sldId id="291" r:id="rId11"/>
-    <p:sldId id="261" r:id="rId12"/>
-    <p:sldId id="273" r:id="rId13"/>
-    <p:sldId id="294" r:id="rId14"/>
-    <p:sldId id="295" r:id="rId15"/>
-    <p:sldId id="262" r:id="rId16"/>
-    <p:sldId id="272" r:id="rId17"/>
-    <p:sldId id="263" r:id="rId18"/>
-    <p:sldId id="264" r:id="rId19"/>
-    <p:sldId id="277" r:id="rId20"/>
-    <p:sldId id="265" r:id="rId21"/>
-    <p:sldId id="276" r:id="rId22"/>
-    <p:sldId id="266" r:id="rId23"/>
-    <p:sldId id="275" r:id="rId24"/>
-    <p:sldId id="267" r:id="rId25"/>
-    <p:sldId id="282" r:id="rId26"/>
-    <p:sldId id="280" r:id="rId27"/>
-    <p:sldId id="268" r:id="rId28"/>
-    <p:sldId id="279" r:id="rId29"/>
-    <p:sldId id="292" r:id="rId30"/>
-    <p:sldId id="278" r:id="rId31"/>
-    <p:sldId id="274" r:id="rId32"/>
-    <p:sldId id="284" r:id="rId33"/>
+    <p:sldId id="297" r:id="rId10"/>
+    <p:sldId id="296" r:id="rId11"/>
+    <p:sldId id="271" r:id="rId12"/>
+    <p:sldId id="291" r:id="rId13"/>
+    <p:sldId id="261" r:id="rId14"/>
+    <p:sldId id="273" r:id="rId15"/>
+    <p:sldId id="294" r:id="rId16"/>
+    <p:sldId id="295" r:id="rId17"/>
+    <p:sldId id="262" r:id="rId18"/>
+    <p:sldId id="272" r:id="rId19"/>
+    <p:sldId id="263" r:id="rId20"/>
+    <p:sldId id="264" r:id="rId21"/>
+    <p:sldId id="277" r:id="rId22"/>
+    <p:sldId id="265" r:id="rId23"/>
+    <p:sldId id="276" r:id="rId24"/>
+    <p:sldId id="266" r:id="rId25"/>
+    <p:sldId id="275" r:id="rId26"/>
+    <p:sldId id="267" r:id="rId27"/>
+    <p:sldId id="282" r:id="rId28"/>
+    <p:sldId id="280" r:id="rId29"/>
+    <p:sldId id="268" r:id="rId30"/>
+    <p:sldId id="279" r:id="rId31"/>
+    <p:sldId id="292" r:id="rId32"/>
+    <p:sldId id="278" r:id="rId33"/>
+    <p:sldId id="274" r:id="rId34"/>
+    <p:sldId id="284" r:id="rId35"/>
   </p:sldIdLst>
   <p:sldSz cx="12192000" cy="6858000"/>
   <p:notesSz cx="6858000" cy="9144000"/>
@@ -641,28 +643,64 @@
           <a:lstStyle/>
           <a:p>
             <a:r>
-              <a:rPr lang="es-ES" sz="1200" kern="1200" dirty="0" smtClean="0">
-                <a:solidFill>
-                  <a:schemeClr val="tx1"/>
-                </a:solidFill>
-                <a:effectLst/>
-                <a:latin typeface="+mn-lt"/>
-                <a:ea typeface="+mn-ea"/>
-                <a:cs typeface="+mn-cs"/>
-              </a:rPr>
-              <a:t>Ahora vamos a describir brevemente,</a:t>
-            </a:r>
-            <a:r>
-              <a:rPr lang="es-ES" sz="1200" kern="1200" baseline="0" dirty="0" smtClean="0">
-                <a:solidFill>
-                  <a:schemeClr val="tx1"/>
-                </a:solidFill>
-                <a:effectLst/>
-                <a:latin typeface="+mn-lt"/>
-                <a:ea typeface="+mn-ea"/>
-                <a:cs typeface="+mn-cs"/>
-              </a:rPr>
-              <a:t> cuales son las tecnologías elegidas para crear YSTC.</a:t>
+              <a:rPr lang="es-ES_tradnl" sz="1200" kern="1200" dirty="0" smtClean="0">
+                <a:solidFill>
+                  <a:schemeClr val="tx1"/>
+                </a:solidFill>
+                <a:effectLst/>
+                <a:latin typeface="+mn-lt"/>
+                <a:ea typeface="+mn-ea"/>
+                <a:cs typeface="+mn-cs"/>
+              </a:rPr>
+              <a:t>Aquí podemos ver un ejemplo de código de </a:t>
+            </a:r>
+            <a:r>
+              <a:rPr lang="es-ES_tradnl" sz="1200" kern="1200" dirty="0" err="1" smtClean="0">
+                <a:solidFill>
+                  <a:schemeClr val="tx1"/>
+                </a:solidFill>
+                <a:effectLst/>
+                <a:latin typeface="+mn-lt"/>
+                <a:ea typeface="+mn-ea"/>
+                <a:cs typeface="+mn-cs"/>
+              </a:rPr>
+              <a:t>scrapping</a:t>
+            </a:r>
+            <a:r>
+              <a:rPr lang="es-ES_tradnl" sz="1200" kern="1200" dirty="0" smtClean="0">
+                <a:solidFill>
+                  <a:schemeClr val="tx1"/>
+                </a:solidFill>
+                <a:effectLst/>
+                <a:latin typeface="+mn-lt"/>
+                <a:ea typeface="+mn-ea"/>
+                <a:cs typeface="+mn-cs"/>
+              </a:rPr>
+              <a:t> donde recuperamos información de una película de la web de </a:t>
+            </a:r>
+            <a:r>
+              <a:rPr lang="es-ES_tradnl" sz="1200" kern="1200" dirty="0" err="1" smtClean="0">
+                <a:solidFill>
+                  <a:schemeClr val="tx1"/>
+                </a:solidFill>
+                <a:effectLst/>
+                <a:latin typeface="+mn-lt"/>
+                <a:ea typeface="+mn-ea"/>
+                <a:cs typeface="+mn-cs"/>
+              </a:rPr>
+              <a:t>Cinesa</a:t>
+            </a:r>
+            <a:r>
+              <a:rPr lang="es-ES_tradnl" sz="1200" kern="1200" dirty="0" smtClean="0">
+                <a:solidFill>
+                  <a:schemeClr val="tx1"/>
+                </a:solidFill>
+                <a:effectLst/>
+                <a:latin typeface="+mn-lt"/>
+                <a:ea typeface="+mn-ea"/>
+                <a:cs typeface="+mn-cs"/>
+              </a:rPr>
+              <a:t>:</a:t>
             </a:r>
             <a:endParaRPr lang="es-ES" sz="1200" kern="1200" dirty="0" smtClean="0">
               <a:solidFill>
@@ -675,6 +713,29 @@
             </a:endParaRPr>
           </a:p>
           <a:p>
+            <a:r>
+              <a:rPr lang="es-ES_tradnl" sz="1200" kern="1200" dirty="0" smtClean="0">
+                <a:solidFill>
+                  <a:schemeClr val="tx1"/>
+                </a:solidFill>
+                <a:effectLst/>
+                <a:latin typeface="+mn-lt"/>
+                <a:ea typeface="+mn-ea"/>
+                <a:cs typeface="+mn-cs"/>
+              </a:rPr>
+              <a:t> </a:t>
+            </a:r>
+            <a:endParaRPr lang="es-ES" sz="1200" kern="1200" dirty="0" smtClean="0">
+              <a:solidFill>
+                <a:schemeClr val="tx1"/>
+              </a:solidFill>
+              <a:effectLst/>
+              <a:latin typeface="+mn-lt"/>
+              <a:ea typeface="+mn-ea"/>
+              <a:cs typeface="+mn-cs"/>
+            </a:endParaRPr>
+          </a:p>
+          <a:p>
             <a:endParaRPr lang="es-ES" dirty="0"/>
           </a:p>
         </p:txBody>
@@ -705,7 +766,7 @@
     </p:spTree>
     <p:extLst>
       <p:ext uri="{BB962C8B-B14F-4D97-AF65-F5344CB8AC3E}">
-        <p14:creationId xmlns:p14="http://schemas.microsoft.com/office/powerpoint/2010/main" val="1781061486"/>
+        <p14:creationId xmlns:p14="http://schemas.microsoft.com/office/powerpoint/2010/main" val="3618753324"/>
       </p:ext>
     </p:extLst>
   </p:cSld>
@@ -759,23 +820,6 @@
           <a:bodyPr/>
           <a:lstStyle/>
           <a:p>
-            <a:pPr marL="0" marR="0" lvl="0" indent="0" algn="l" defTabSz="914400" rtl="0" eaLnBrk="1" fontAlgn="auto" latinLnBrk="0" hangingPunct="1">
-              <a:lnSpc>
-                <a:spcPct val="100000"/>
-              </a:lnSpc>
-              <a:spcBef>
-                <a:spcPts val="0"/>
-              </a:spcBef>
-              <a:spcAft>
-                <a:spcPts val="0"/>
-              </a:spcAft>
-              <a:buClrTx/>
-              <a:buSzTx/>
-              <a:buFontTx/>
-              <a:buNone/>
-              <a:tabLst/>
-              <a:defRPr/>
-            </a:pPr>
             <a:r>
               <a:rPr lang="es-ES_tradnl" sz="1200" kern="1200" dirty="0" smtClean="0">
                 <a:solidFill>
@@ -786,7 +830,79 @@
                 <a:ea typeface="+mn-ea"/>
                 <a:cs typeface="+mn-cs"/>
               </a:rPr>
-              <a:t>Utilizado bajo el patrón MVC encargado de dirigir la aplicación web, recibir peticiones, ir a base de datos y devolver vistas.</a:t>
+              <a:t>Una vez teníamos la idea clara de la web que queríamos hacer tuvimos que realizar fue un análisis de requerimientos para saber cuántas paginas tendría nuestra web, que pasaría al pinchar en cada enlace, cuál iba a ser nuestra estructura, tecnologías que usaremos(AJAX o recargar la página, </a:t>
+            </a:r>
+            <a:r>
+              <a:rPr lang="es-ES_tradnl" sz="1200" kern="1200" dirty="0" err="1" smtClean="0">
+                <a:solidFill>
+                  <a:schemeClr val="tx1"/>
+                </a:solidFill>
+                <a:effectLst/>
+                <a:latin typeface="+mn-lt"/>
+                <a:ea typeface="+mn-ea"/>
+                <a:cs typeface="+mn-cs"/>
+              </a:rPr>
+              <a:t>bootstrap</a:t>
+            </a:r>
+            <a:r>
+              <a:rPr lang="es-ES_tradnl" sz="1200" kern="1200" dirty="0" smtClean="0">
+                <a:solidFill>
+                  <a:schemeClr val="tx1"/>
+                </a:solidFill>
+                <a:effectLst/>
+                <a:latin typeface="+mn-lt"/>
+                <a:ea typeface="+mn-ea"/>
+                <a:cs typeface="+mn-cs"/>
+              </a:rPr>
+              <a:t> u otro </a:t>
+            </a:r>
+            <a:r>
+              <a:rPr lang="es-ES_tradnl" sz="1200" kern="1200" dirty="0" err="1" smtClean="0">
+                <a:solidFill>
+                  <a:schemeClr val="tx1"/>
+                </a:solidFill>
+                <a:effectLst/>
+                <a:latin typeface="+mn-lt"/>
+                <a:ea typeface="+mn-ea"/>
+                <a:cs typeface="+mn-cs"/>
+              </a:rPr>
+              <a:t>framework</a:t>
+            </a:r>
+            <a:r>
+              <a:rPr lang="es-ES_tradnl" sz="1200" kern="1200" dirty="0" smtClean="0">
+                <a:solidFill>
+                  <a:schemeClr val="tx1"/>
+                </a:solidFill>
+                <a:effectLst/>
+                <a:latin typeface="+mn-lt"/>
+                <a:ea typeface="+mn-ea"/>
+                <a:cs typeface="+mn-cs"/>
+              </a:rPr>
+              <a:t> </a:t>
+            </a:r>
+            <a:r>
+              <a:rPr lang="es-ES_tradnl" sz="1200" kern="1200" dirty="0" err="1" smtClean="0">
+                <a:solidFill>
+                  <a:schemeClr val="tx1"/>
+                </a:solidFill>
+                <a:effectLst/>
+                <a:latin typeface="+mn-lt"/>
+                <a:ea typeface="+mn-ea"/>
+                <a:cs typeface="+mn-cs"/>
+              </a:rPr>
+              <a:t>css</a:t>
+            </a:r>
+            <a:r>
+              <a:rPr lang="es-ES_tradnl" sz="1200" kern="1200" dirty="0" smtClean="0">
+                <a:solidFill>
+                  <a:schemeClr val="tx1"/>
+                </a:solidFill>
+                <a:effectLst/>
+                <a:latin typeface="+mn-lt"/>
+                <a:ea typeface="+mn-ea"/>
+                <a:cs typeface="+mn-cs"/>
+              </a:rPr>
+              <a:t>..)etc…</a:t>
             </a:r>
             <a:endParaRPr lang="es-ES" sz="1200" kern="1200" dirty="0" smtClean="0">
               <a:solidFill>
@@ -799,6 +915,100 @@
             </a:endParaRPr>
           </a:p>
           <a:p>
+            <a:r>
+              <a:rPr lang="es-ES_tradnl" sz="1200" kern="1200" dirty="0" smtClean="0">
+                <a:solidFill>
+                  <a:schemeClr val="tx1"/>
+                </a:solidFill>
+                <a:effectLst/>
+                <a:latin typeface="+mn-lt"/>
+                <a:ea typeface="+mn-ea"/>
+                <a:cs typeface="+mn-cs"/>
+              </a:rPr>
+              <a:t> </a:t>
+            </a:r>
+            <a:endParaRPr lang="es-ES" sz="1200" kern="1200" dirty="0" smtClean="0">
+              <a:solidFill>
+                <a:schemeClr val="tx1"/>
+              </a:solidFill>
+              <a:effectLst/>
+              <a:latin typeface="+mn-lt"/>
+              <a:ea typeface="+mn-ea"/>
+              <a:cs typeface="+mn-cs"/>
+            </a:endParaRPr>
+          </a:p>
+          <a:p>
+            <a:r>
+              <a:rPr lang="es-ES_tradnl" sz="1200" kern="1200" dirty="0" smtClean="0">
+                <a:solidFill>
+                  <a:schemeClr val="tx1"/>
+                </a:solidFill>
+                <a:effectLst/>
+                <a:latin typeface="+mn-lt"/>
+                <a:ea typeface="+mn-ea"/>
+                <a:cs typeface="+mn-cs"/>
+              </a:rPr>
+              <a:t>Una vez con toda esa información aclarada y acordada entre el equipo diseñamos los primeros bocetos con herramientas de </a:t>
+            </a:r>
+            <a:r>
+              <a:rPr lang="es-ES_tradnl" sz="1200" kern="1200" dirty="0" err="1" smtClean="0">
+                <a:solidFill>
+                  <a:schemeClr val="tx1"/>
+                </a:solidFill>
+                <a:effectLst/>
+                <a:latin typeface="+mn-lt"/>
+                <a:ea typeface="+mn-ea"/>
+                <a:cs typeface="+mn-cs"/>
+              </a:rPr>
+              <a:t>prototipado</a:t>
+            </a:r>
+            <a:r>
+              <a:rPr lang="es-ES_tradnl" sz="1200" kern="1200" dirty="0" smtClean="0">
+                <a:solidFill>
+                  <a:schemeClr val="tx1"/>
+                </a:solidFill>
+                <a:effectLst/>
+                <a:latin typeface="+mn-lt"/>
+                <a:ea typeface="+mn-ea"/>
+                <a:cs typeface="+mn-cs"/>
+              </a:rPr>
+              <a:t> tales como </a:t>
+            </a:r>
+            <a:r>
+              <a:rPr lang="es-ES_tradnl" sz="1200" kern="1200" dirty="0" err="1" smtClean="0">
+                <a:solidFill>
+                  <a:schemeClr val="tx1"/>
+                </a:solidFill>
+                <a:effectLst/>
+                <a:latin typeface="+mn-lt"/>
+                <a:ea typeface="+mn-ea"/>
+                <a:cs typeface="+mn-cs"/>
+              </a:rPr>
+              <a:t>mockups</a:t>
+            </a:r>
+            <a:r>
+              <a:rPr lang="es-ES_tradnl" sz="1200" kern="1200" dirty="0" smtClean="0">
+                <a:solidFill>
+                  <a:schemeClr val="tx1"/>
+                </a:solidFill>
+                <a:effectLst/>
+                <a:latin typeface="+mn-lt"/>
+                <a:ea typeface="+mn-ea"/>
+                <a:cs typeface="+mn-cs"/>
+              </a:rPr>
+              <a:t> generando los siguientes bocetos para las páginas que previamente habíamos acordado que tendría la página:</a:t>
+            </a:r>
+            <a:endParaRPr lang="es-ES" sz="1200" kern="1200" dirty="0" smtClean="0">
+              <a:solidFill>
+                <a:schemeClr val="tx1"/>
+              </a:solidFill>
+              <a:effectLst/>
+              <a:latin typeface="+mn-lt"/>
+              <a:ea typeface="+mn-ea"/>
+              <a:cs typeface="+mn-cs"/>
+            </a:endParaRPr>
+          </a:p>
+          <a:p>
             <a:endParaRPr lang="es-ES" dirty="0"/>
           </a:p>
         </p:txBody>
@@ -829,7 +1039,7 @@
     </p:spTree>
     <p:extLst>
       <p:ext uri="{BB962C8B-B14F-4D97-AF65-F5344CB8AC3E}">
-        <p14:creationId xmlns:p14="http://schemas.microsoft.com/office/powerpoint/2010/main" val="544493660"/>
+        <p14:creationId xmlns:p14="http://schemas.microsoft.com/office/powerpoint/2010/main" val="2571825243"/>
       </p:ext>
     </p:extLst>
   </p:cSld>
@@ -893,19 +1103,19 @@
                 <a:ea typeface="+mn-ea"/>
                 <a:cs typeface="+mn-cs"/>
               </a:rPr>
-              <a:t>Aquí vemos la estructura de nuestro proyecto en eclipse</a:t>
-            </a:r>
-            <a:r>
-              <a:rPr lang="es-ES_tradnl" sz="1200" kern="1200" dirty="0" smtClean="0">
-                <a:solidFill>
-                  <a:schemeClr val="tx1"/>
-                </a:solidFill>
-                <a:effectLst/>
-                <a:latin typeface="+mn-lt"/>
-                <a:ea typeface="+mn-ea"/>
-                <a:cs typeface="+mn-cs"/>
-              </a:rPr>
-              <a:t>, que ha sido el IDE elegido ya que se integra perfectamente con GIT y también con TOMCAT nuestro servidor de aplicaciones TOMCAT necesario para desplegar la aplicación.</a:t>
+              <a:t>Ahora vamos a describir brevemente,</a:t>
+            </a:r>
+            <a:r>
+              <a:rPr lang="es-ES" sz="1200" kern="1200" baseline="0" dirty="0" smtClean="0">
+                <a:solidFill>
+                  <a:schemeClr val="tx1"/>
+                </a:solidFill>
+                <a:effectLst/>
+                <a:latin typeface="+mn-lt"/>
+                <a:ea typeface="+mn-ea"/>
+                <a:cs typeface="+mn-cs"/>
+              </a:rPr>
+              <a:t> cuales son las tecnologías elegidas para crear YSTC.</a:t>
             </a:r>
             <a:endParaRPr lang="es-ES" sz="1200" kern="1200" dirty="0" smtClean="0">
               <a:solidFill>
@@ -948,7 +1158,7 @@
     </p:spTree>
     <p:extLst>
       <p:ext uri="{BB962C8B-B14F-4D97-AF65-F5344CB8AC3E}">
-        <p14:creationId xmlns:p14="http://schemas.microsoft.com/office/powerpoint/2010/main" val="1973952242"/>
+        <p14:creationId xmlns:p14="http://schemas.microsoft.com/office/powerpoint/2010/main" val="1781061486"/>
       </p:ext>
     </p:extLst>
   </p:cSld>
@@ -1002,6 +1212,23 @@
           <a:bodyPr/>
           <a:lstStyle/>
           <a:p>
+            <a:pPr marL="0" marR="0" lvl="0" indent="0" algn="l" defTabSz="914400" rtl="0" eaLnBrk="1" fontAlgn="auto" latinLnBrk="0" hangingPunct="1">
+              <a:lnSpc>
+                <a:spcPct val="100000"/>
+              </a:lnSpc>
+              <a:spcBef>
+                <a:spcPts val="0"/>
+              </a:spcBef>
+              <a:spcAft>
+                <a:spcPts val="0"/>
+              </a:spcAft>
+              <a:buClrTx/>
+              <a:buSzTx/>
+              <a:buFontTx/>
+              <a:buNone/>
+              <a:tabLst/>
+              <a:defRPr/>
+            </a:pPr>
             <a:r>
               <a:rPr lang="es-ES_tradnl" sz="1200" kern="1200" dirty="0" smtClean="0">
                 <a:solidFill>
@@ -1012,10 +1239,8 @@
                 <a:ea typeface="+mn-ea"/>
                 <a:cs typeface="+mn-cs"/>
               </a:rPr>
-              <a:t>Para llevar a cabo el patrón MVC creamos los DAO y los BO.</a:t>
-            </a:r>
-          </a:p>
-          <a:p>
+              <a:t>Utilizado bajo el patrón MVC encargado de dirigir la aplicación web, recibir peticiones, ir a base de datos y devolver vistas.</a:t>
+            </a:r>
             <a:endParaRPr lang="es-ES" sz="1200" kern="1200" dirty="0" smtClean="0">
               <a:solidFill>
                 <a:schemeClr val="tx1"/>
@@ -1027,18 +1252,6 @@
             </a:endParaRPr>
           </a:p>
           <a:p>
-            <a:r>
-              <a:rPr lang="es-ES_tradnl" sz="1200" kern="1200" dirty="0" smtClean="0">
-                <a:solidFill>
-                  <a:schemeClr val="tx1"/>
-                </a:solidFill>
-                <a:effectLst/>
-                <a:latin typeface="+mn-lt"/>
-                <a:ea typeface="+mn-ea"/>
-                <a:cs typeface="+mn-cs"/>
-              </a:rPr>
-              <a:t>A groso modo podemos decir que: el DAO es el que va a base de datos y se conecta con ella, </a:t>
-            </a:r>
             <a:endParaRPr lang="es-ES" dirty="0"/>
           </a:p>
         </p:txBody>
@@ -1069,7 +1282,7 @@
     </p:spTree>
     <p:extLst>
       <p:ext uri="{BB962C8B-B14F-4D97-AF65-F5344CB8AC3E}">
-        <p14:creationId xmlns:p14="http://schemas.microsoft.com/office/powerpoint/2010/main" val="4264982809"/>
+        <p14:creationId xmlns:p14="http://schemas.microsoft.com/office/powerpoint/2010/main" val="544493660"/>
       </p:ext>
     </p:extLst>
   </p:cSld>
@@ -1124,6 +1337,18 @@
           <a:lstStyle/>
           <a:p>
             <a:r>
+              <a:rPr lang="es-ES" sz="1200" kern="1200" dirty="0" smtClean="0">
+                <a:solidFill>
+                  <a:schemeClr val="tx1"/>
+                </a:solidFill>
+                <a:effectLst/>
+                <a:latin typeface="+mn-lt"/>
+                <a:ea typeface="+mn-ea"/>
+                <a:cs typeface="+mn-cs"/>
+              </a:rPr>
+              <a:t>Aquí vemos la estructura de nuestro proyecto en eclipse</a:t>
+            </a:r>
+            <a:r>
               <a:rPr lang="es-ES_tradnl" sz="1200" kern="1200" dirty="0" smtClean="0">
                 <a:solidFill>
                   <a:schemeClr val="tx1"/>
@@ -1133,7 +1358,7 @@
                 <a:ea typeface="+mn-ea"/>
                 <a:cs typeface="+mn-cs"/>
               </a:rPr>
-              <a:t>y el BO es el encargado de insertar, borrar, actualizar etc…contiene el esquema/propiedades de la Base de datos.</a:t>
+              <a:t>, que ha sido el IDE elegido ya que se integra perfectamente con GIT y también con TOMCAT nuestro servidor de aplicaciones TOMCAT necesario para desplegar la aplicación.</a:t>
             </a:r>
             <a:endParaRPr lang="es-ES" sz="1200" kern="1200" dirty="0" smtClean="0">
               <a:solidFill>
@@ -1146,9 +1371,6 @@
             </a:endParaRPr>
           </a:p>
           <a:p>
-            <a:endParaRPr lang="es-ES" dirty="0" smtClean="0"/>
-          </a:p>
-          <a:p>
             <a:endParaRPr lang="es-ES" dirty="0"/>
           </a:p>
         </p:txBody>
@@ -1179,7 +1401,7 @@
     </p:spTree>
     <p:extLst>
       <p:ext uri="{BB962C8B-B14F-4D97-AF65-F5344CB8AC3E}">
-        <p14:creationId xmlns:p14="http://schemas.microsoft.com/office/powerpoint/2010/main" val="3530550791"/>
+        <p14:creationId xmlns:p14="http://schemas.microsoft.com/office/powerpoint/2010/main" val="1973952242"/>
       </p:ext>
     </p:extLst>
   </p:cSld>
@@ -1233,35 +1455,6 @@
           <a:bodyPr/>
           <a:lstStyle/>
           <a:p>
-            <a:pPr marL="0" marR="0" lvl="0" indent="0" algn="l" defTabSz="914400" rtl="0" eaLnBrk="1" fontAlgn="auto" latinLnBrk="0" hangingPunct="1">
-              <a:lnSpc>
-                <a:spcPct val="100000"/>
-              </a:lnSpc>
-              <a:spcBef>
-                <a:spcPts val="0"/>
-              </a:spcBef>
-              <a:spcAft>
-                <a:spcPts val="0"/>
-              </a:spcAft>
-              <a:buClrTx/>
-              <a:buSzTx/>
-              <a:buFontTx/>
-              <a:buNone/>
-              <a:tabLst/>
-              <a:defRPr/>
-            </a:pPr>
-            <a:r>
-              <a:rPr lang="es-ES_tradnl" sz="1200" kern="1200" dirty="0" err="1" smtClean="0">
-                <a:solidFill>
-                  <a:schemeClr val="tx1"/>
-                </a:solidFill>
-                <a:effectLst/>
-                <a:latin typeface="+mn-lt"/>
-                <a:ea typeface="+mn-ea"/>
-                <a:cs typeface="+mn-cs"/>
-              </a:rPr>
-              <a:t>MySQL</a:t>
-            </a:r>
             <a:r>
               <a:rPr lang="es-ES_tradnl" sz="1200" kern="1200" dirty="0" smtClean="0">
                 <a:solidFill>
@@ -1272,8 +1465,10 @@
                 <a:ea typeface="+mn-ea"/>
                 <a:cs typeface="+mn-cs"/>
               </a:rPr>
-              <a:t> ha sido el gestor de base de datos elegido debido a su facilidad de uso y a su ligereza que hacen de él la opción más utilizada para este tipo de proyectos Web.</a:t>
-            </a:r>
+              <a:t>Para llevar a cabo el patrón MVC creamos los DAO y los BO.</a:t>
+            </a:r>
+          </a:p>
+          <a:p>
             <a:endParaRPr lang="es-ES" sz="1200" kern="1200" dirty="0" smtClean="0">
               <a:solidFill>
                 <a:schemeClr val="tx1"/>
@@ -1285,6 +1480,18 @@
             </a:endParaRPr>
           </a:p>
           <a:p>
+            <a:r>
+              <a:rPr lang="es-ES_tradnl" sz="1200" kern="1200" dirty="0" smtClean="0">
+                <a:solidFill>
+                  <a:schemeClr val="tx1"/>
+                </a:solidFill>
+                <a:effectLst/>
+                <a:latin typeface="+mn-lt"/>
+                <a:ea typeface="+mn-ea"/>
+                <a:cs typeface="+mn-cs"/>
+              </a:rPr>
+              <a:t>A groso modo podemos decir que: el DAO es el que va a base de datos y se conecta con ella, </a:t>
+            </a:r>
             <a:endParaRPr lang="es-ES" dirty="0"/>
           </a:p>
         </p:txBody>
@@ -1315,7 +1522,7 @@
     </p:spTree>
     <p:extLst>
       <p:ext uri="{BB962C8B-B14F-4D97-AF65-F5344CB8AC3E}">
-        <p14:creationId xmlns:p14="http://schemas.microsoft.com/office/powerpoint/2010/main" val="3497186008"/>
+        <p14:creationId xmlns:p14="http://schemas.microsoft.com/office/powerpoint/2010/main" val="4264982809"/>
       </p:ext>
     </p:extLst>
   </p:cSld>
@@ -1379,32 +1586,22 @@
                 <a:ea typeface="+mn-ea"/>
                 <a:cs typeface="+mn-cs"/>
               </a:rPr>
-              <a:t>Una vez teníamos</a:t>
-            </a:r>
-            <a:r>
-              <a:rPr lang="es-ES_tradnl" sz="1200" kern="1200" baseline="0" dirty="0" smtClean="0">
-                <a:solidFill>
-                  <a:schemeClr val="tx1"/>
-                </a:solidFill>
-                <a:effectLst/>
-                <a:latin typeface="+mn-lt"/>
-                <a:ea typeface="+mn-ea"/>
-                <a:cs typeface="+mn-cs"/>
-              </a:rPr>
-              <a:t> claro que entidades serian necesarias para nuestro propósito, </a:t>
-            </a:r>
-            <a:r>
-              <a:rPr lang="es-ES_tradnl" sz="1200" kern="1200" dirty="0" smtClean="0">
-                <a:solidFill>
-                  <a:schemeClr val="tx1"/>
-                </a:solidFill>
-                <a:effectLst/>
-                <a:latin typeface="+mn-lt"/>
-                <a:ea typeface="+mn-ea"/>
-                <a:cs typeface="+mn-cs"/>
-              </a:rPr>
-              <a:t>realizamos un primer modelo entidad relación que posteriormente una vez acordado pasamos a modelo relacional y que finalmente se crea físicamente con el resultado que podemos ver en este esquema.</a:t>
-            </a:r>
+              <a:t>y el BO es el encargado de insertar, borrar, actualizar etc…contiene el esquema/propiedades de la Base de datos.</a:t>
+            </a:r>
+            <a:endParaRPr lang="es-ES" sz="1200" kern="1200" dirty="0" smtClean="0">
+              <a:solidFill>
+                <a:schemeClr val="tx1"/>
+              </a:solidFill>
+              <a:effectLst/>
+              <a:latin typeface="+mn-lt"/>
+              <a:ea typeface="+mn-ea"/>
+              <a:cs typeface="+mn-cs"/>
+            </a:endParaRPr>
+          </a:p>
+          <a:p>
+            <a:endParaRPr lang="es-ES" dirty="0" smtClean="0"/>
+          </a:p>
+          <a:p>
             <a:endParaRPr lang="es-ES" dirty="0"/>
           </a:p>
         </p:txBody>
@@ -1435,7 +1632,7 @@
     </p:spTree>
     <p:extLst>
       <p:ext uri="{BB962C8B-B14F-4D97-AF65-F5344CB8AC3E}">
-        <p14:creationId xmlns:p14="http://schemas.microsoft.com/office/powerpoint/2010/main" val="957838385"/>
+        <p14:creationId xmlns:p14="http://schemas.microsoft.com/office/powerpoint/2010/main" val="3530550791"/>
       </p:ext>
     </p:extLst>
   </p:cSld>
@@ -1507,6 +1704,262 @@
               <a:defRPr/>
             </a:pPr>
             <a:r>
+              <a:rPr lang="es-ES_tradnl" sz="1200" kern="1200" dirty="0" err="1" smtClean="0">
+                <a:solidFill>
+                  <a:schemeClr val="tx1"/>
+                </a:solidFill>
+                <a:effectLst/>
+                <a:latin typeface="+mn-lt"/>
+                <a:ea typeface="+mn-ea"/>
+                <a:cs typeface="+mn-cs"/>
+              </a:rPr>
+              <a:t>MySQL</a:t>
+            </a:r>
+            <a:r>
+              <a:rPr lang="es-ES_tradnl" sz="1200" kern="1200" dirty="0" smtClean="0">
+                <a:solidFill>
+                  <a:schemeClr val="tx1"/>
+                </a:solidFill>
+                <a:effectLst/>
+                <a:latin typeface="+mn-lt"/>
+                <a:ea typeface="+mn-ea"/>
+                <a:cs typeface="+mn-cs"/>
+              </a:rPr>
+              <a:t> ha sido el gestor de base de datos elegido debido a su facilidad de uso y a su ligereza que hacen de él la opción más utilizada para este tipo de proyectos Web.</a:t>
+            </a:r>
+            <a:endParaRPr lang="es-ES" sz="1200" kern="1200" dirty="0" smtClean="0">
+              <a:solidFill>
+                <a:schemeClr val="tx1"/>
+              </a:solidFill>
+              <a:effectLst/>
+              <a:latin typeface="+mn-lt"/>
+              <a:ea typeface="+mn-ea"/>
+              <a:cs typeface="+mn-cs"/>
+            </a:endParaRPr>
+          </a:p>
+          <a:p>
+            <a:endParaRPr lang="es-ES" dirty="0"/>
+          </a:p>
+        </p:txBody>
+      </p:sp>
+      <p:sp>
+        <p:nvSpPr>
+          <p:cNvPr id="4" name="Marcador de número de diapositiva 3"/>
+          <p:cNvSpPr>
+            <a:spLocks noGrp="1"/>
+          </p:cNvSpPr>
+          <p:nvPr>
+            <p:ph type="sldNum" sz="quarter" idx="10"/>
+          </p:nvPr>
+        </p:nvSpPr>
+        <p:spPr/>
+        <p:txBody>
+          <a:bodyPr/>
+          <a:lstStyle/>
+          <a:p>
+            <a:fld id="{DB7D0A05-FF74-4049-BC13-A9ACD9D2AB82}" type="slidenum">
+              <a:rPr lang="es-ES" smtClean="0"/>
+              <a:t>17</a:t>
+            </a:fld>
+            <a:endParaRPr lang="es-ES"/>
+          </a:p>
+        </p:txBody>
+      </p:sp>
+    </p:spTree>
+    <p:extLst>
+      <p:ext uri="{BB962C8B-B14F-4D97-AF65-F5344CB8AC3E}">
+        <p14:creationId xmlns:p14="http://schemas.microsoft.com/office/powerpoint/2010/main" val="3497186008"/>
+      </p:ext>
+    </p:extLst>
+  </p:cSld>
+  <p:clrMapOvr>
+    <a:masterClrMapping/>
+  </p:clrMapOvr>
+</p:notes>
+</file>
+
+<file path=ppt/notesSlides/notesSlide18.xml><?xml version="1.0" encoding="utf-8"?>
+<p:notes xmlns:a="http://schemas.openxmlformats.org/drawingml/2006/main" xmlns:r="http://schemas.openxmlformats.org/officeDocument/2006/relationships" xmlns:p="http://schemas.openxmlformats.org/presentationml/2006/main">
+  <p:cSld>
+    <p:spTree>
+      <p:nvGrpSpPr>
+        <p:cNvPr id="1" name=""/>
+        <p:cNvGrpSpPr/>
+        <p:nvPr/>
+      </p:nvGrpSpPr>
+      <p:grpSpPr>
+        <a:xfrm>
+          <a:off x="0" y="0"/>
+          <a:ext cx="0" cy="0"/>
+          <a:chOff x="0" y="0"/>
+          <a:chExt cx="0" cy="0"/>
+        </a:xfrm>
+      </p:grpSpPr>
+      <p:sp>
+        <p:nvSpPr>
+          <p:cNvPr id="2" name="Marcador de imagen de diapositiva 1"/>
+          <p:cNvSpPr>
+            <a:spLocks noGrp="1" noRot="1" noChangeAspect="1"/>
+          </p:cNvSpPr>
+          <p:nvPr>
+            <p:ph type="sldImg"/>
+          </p:nvPr>
+        </p:nvSpPr>
+        <p:spPr/>
+      </p:sp>
+      <p:sp>
+        <p:nvSpPr>
+          <p:cNvPr id="3" name="Marcador de notas 2"/>
+          <p:cNvSpPr>
+            <a:spLocks noGrp="1"/>
+          </p:cNvSpPr>
+          <p:nvPr>
+            <p:ph type="body" idx="1"/>
+          </p:nvPr>
+        </p:nvSpPr>
+        <p:spPr/>
+        <p:txBody>
+          <a:bodyPr/>
+          <a:lstStyle/>
+          <a:p>
+            <a:r>
+              <a:rPr lang="es-ES_tradnl" sz="1200" kern="1200" dirty="0" smtClean="0">
+                <a:solidFill>
+                  <a:schemeClr val="tx1"/>
+                </a:solidFill>
+                <a:effectLst/>
+                <a:latin typeface="+mn-lt"/>
+                <a:ea typeface="+mn-ea"/>
+                <a:cs typeface="+mn-cs"/>
+              </a:rPr>
+              <a:t>Una vez teníamos</a:t>
+            </a:r>
+            <a:r>
+              <a:rPr lang="es-ES_tradnl" sz="1200" kern="1200" baseline="0" dirty="0" smtClean="0">
+                <a:solidFill>
+                  <a:schemeClr val="tx1"/>
+                </a:solidFill>
+                <a:effectLst/>
+                <a:latin typeface="+mn-lt"/>
+                <a:ea typeface="+mn-ea"/>
+                <a:cs typeface="+mn-cs"/>
+              </a:rPr>
+              <a:t> claro que entidades serian necesarias para nuestro propósito, </a:t>
+            </a:r>
+            <a:r>
+              <a:rPr lang="es-ES_tradnl" sz="1200" kern="1200" dirty="0" smtClean="0">
+                <a:solidFill>
+                  <a:schemeClr val="tx1"/>
+                </a:solidFill>
+                <a:effectLst/>
+                <a:latin typeface="+mn-lt"/>
+                <a:ea typeface="+mn-ea"/>
+                <a:cs typeface="+mn-cs"/>
+              </a:rPr>
+              <a:t>realizamos un primer modelo entidad relación que posteriormente una vez acordado pasamos a modelo relacional y que finalmente se crea físicamente con el resultado que podemos ver en este esquema.</a:t>
+            </a:r>
+            <a:endParaRPr lang="es-ES" dirty="0"/>
+          </a:p>
+        </p:txBody>
+      </p:sp>
+      <p:sp>
+        <p:nvSpPr>
+          <p:cNvPr id="4" name="Marcador de número de diapositiva 3"/>
+          <p:cNvSpPr>
+            <a:spLocks noGrp="1"/>
+          </p:cNvSpPr>
+          <p:nvPr>
+            <p:ph type="sldNum" sz="quarter" idx="10"/>
+          </p:nvPr>
+        </p:nvSpPr>
+        <p:spPr/>
+        <p:txBody>
+          <a:bodyPr/>
+          <a:lstStyle/>
+          <a:p>
+            <a:fld id="{DB7D0A05-FF74-4049-BC13-A9ACD9D2AB82}" type="slidenum">
+              <a:rPr lang="es-ES" smtClean="0"/>
+              <a:t>18</a:t>
+            </a:fld>
+            <a:endParaRPr lang="es-ES"/>
+          </a:p>
+        </p:txBody>
+      </p:sp>
+    </p:spTree>
+    <p:extLst>
+      <p:ext uri="{BB962C8B-B14F-4D97-AF65-F5344CB8AC3E}">
+        <p14:creationId xmlns:p14="http://schemas.microsoft.com/office/powerpoint/2010/main" val="957838385"/>
+      </p:ext>
+    </p:extLst>
+  </p:cSld>
+  <p:clrMapOvr>
+    <a:masterClrMapping/>
+  </p:clrMapOvr>
+</p:notes>
+</file>
+
+<file path=ppt/notesSlides/notesSlide19.xml><?xml version="1.0" encoding="utf-8"?>
+<p:notes xmlns:a="http://schemas.openxmlformats.org/drawingml/2006/main" xmlns:r="http://schemas.openxmlformats.org/officeDocument/2006/relationships" xmlns:p="http://schemas.openxmlformats.org/presentationml/2006/main">
+  <p:cSld>
+    <p:spTree>
+      <p:nvGrpSpPr>
+        <p:cNvPr id="1" name=""/>
+        <p:cNvGrpSpPr/>
+        <p:nvPr/>
+      </p:nvGrpSpPr>
+      <p:grpSpPr>
+        <a:xfrm>
+          <a:off x="0" y="0"/>
+          <a:ext cx="0" cy="0"/>
+          <a:chOff x="0" y="0"/>
+          <a:chExt cx="0" cy="0"/>
+        </a:xfrm>
+      </p:grpSpPr>
+      <p:sp>
+        <p:nvSpPr>
+          <p:cNvPr id="2" name="Marcador de imagen de diapositiva 1"/>
+          <p:cNvSpPr>
+            <a:spLocks noGrp="1" noRot="1" noChangeAspect="1"/>
+          </p:cNvSpPr>
+          <p:nvPr>
+            <p:ph type="sldImg"/>
+          </p:nvPr>
+        </p:nvSpPr>
+        <p:spPr/>
+      </p:sp>
+      <p:sp>
+        <p:nvSpPr>
+          <p:cNvPr id="3" name="Marcador de notas 2"/>
+          <p:cNvSpPr>
+            <a:spLocks noGrp="1"/>
+          </p:cNvSpPr>
+          <p:nvPr>
+            <p:ph type="body" idx="1"/>
+          </p:nvPr>
+        </p:nvSpPr>
+        <p:spPr/>
+        <p:txBody>
+          <a:bodyPr/>
+          <a:lstStyle/>
+          <a:p>
+            <a:pPr marL="0" marR="0" lvl="0" indent="0" algn="l" defTabSz="914400" rtl="0" eaLnBrk="1" fontAlgn="auto" latinLnBrk="0" hangingPunct="1">
+              <a:lnSpc>
+                <a:spcPct val="100000"/>
+              </a:lnSpc>
+              <a:spcBef>
+                <a:spcPts val="0"/>
+              </a:spcBef>
+              <a:spcAft>
+                <a:spcPts val="0"/>
+              </a:spcAft>
+              <a:buClrTx/>
+              <a:buSzTx/>
+              <a:buFontTx/>
+              <a:buNone/>
+              <a:tabLst/>
+              <a:defRPr/>
+            </a:pPr>
+            <a:r>
               <a:rPr lang="es-ES_tradnl" sz="1200" kern="1200" dirty="0" smtClean="0">
                 <a:solidFill>
                   <a:schemeClr val="tx1"/>
@@ -1692,7 +2145,7 @@
           <a:p>
             <a:fld id="{DB7D0A05-FF74-4049-BC13-A9ACD9D2AB82}" type="slidenum">
               <a:rPr lang="es-ES" smtClean="0"/>
-              <a:t>17</a:t>
+              <a:t>19</a:t>
             </a:fld>
             <a:endParaRPr lang="es-ES"/>
           </a:p>
@@ -1702,226 +2155,6 @@
     <p:extLst>
       <p:ext uri="{BB962C8B-B14F-4D97-AF65-F5344CB8AC3E}">
         <p14:creationId xmlns:p14="http://schemas.microsoft.com/office/powerpoint/2010/main" val="2828250095"/>
-      </p:ext>
-    </p:extLst>
-  </p:cSld>
-  <p:clrMapOvr>
-    <a:masterClrMapping/>
-  </p:clrMapOvr>
-</p:notes>
-</file>
-
-<file path=ppt/notesSlides/notesSlide18.xml><?xml version="1.0" encoding="utf-8"?>
-<p:notes xmlns:a="http://schemas.openxmlformats.org/drawingml/2006/main" xmlns:r="http://schemas.openxmlformats.org/officeDocument/2006/relationships" xmlns:p="http://schemas.openxmlformats.org/presentationml/2006/main">
-  <p:cSld>
-    <p:spTree>
-      <p:nvGrpSpPr>
-        <p:cNvPr id="1" name=""/>
-        <p:cNvGrpSpPr/>
-        <p:nvPr/>
-      </p:nvGrpSpPr>
-      <p:grpSpPr>
-        <a:xfrm>
-          <a:off x="0" y="0"/>
-          <a:ext cx="0" cy="0"/>
-          <a:chOff x="0" y="0"/>
-          <a:chExt cx="0" cy="0"/>
-        </a:xfrm>
-      </p:grpSpPr>
-      <p:sp>
-        <p:nvSpPr>
-          <p:cNvPr id="2" name="Marcador de imagen de diapositiva 1"/>
-          <p:cNvSpPr>
-            <a:spLocks noGrp="1" noRot="1" noChangeAspect="1"/>
-          </p:cNvSpPr>
-          <p:nvPr>
-            <p:ph type="sldImg"/>
-          </p:nvPr>
-        </p:nvSpPr>
-        <p:spPr/>
-      </p:sp>
-      <p:sp>
-        <p:nvSpPr>
-          <p:cNvPr id="3" name="Marcador de notas 2"/>
-          <p:cNvSpPr>
-            <a:spLocks noGrp="1"/>
-          </p:cNvSpPr>
-          <p:nvPr>
-            <p:ph type="body" idx="1"/>
-          </p:nvPr>
-        </p:nvSpPr>
-        <p:spPr/>
-        <p:txBody>
-          <a:bodyPr/>
-          <a:lstStyle/>
-          <a:p>
-            <a:pPr marL="0" marR="0" lvl="0" indent="0" algn="l" defTabSz="914400" rtl="0" eaLnBrk="1" fontAlgn="auto" latinLnBrk="0" hangingPunct="1">
-              <a:lnSpc>
-                <a:spcPct val="100000"/>
-              </a:lnSpc>
-              <a:spcBef>
-                <a:spcPts val="0"/>
-              </a:spcBef>
-              <a:spcAft>
-                <a:spcPts val="0"/>
-              </a:spcAft>
-              <a:buClrTx/>
-              <a:buSzTx/>
-              <a:buFontTx/>
-              <a:buNone/>
-              <a:tabLst/>
-              <a:defRPr/>
-            </a:pPr>
-            <a:r>
-              <a:rPr lang="es-ES_tradnl" sz="1200" kern="1200" dirty="0" smtClean="0">
-                <a:solidFill>
-                  <a:schemeClr val="tx1"/>
-                </a:solidFill>
-                <a:effectLst/>
-                <a:latin typeface="+mn-lt"/>
-                <a:ea typeface="+mn-ea"/>
-                <a:cs typeface="+mn-cs"/>
-              </a:rPr>
-              <a:t>Librería de estilos creada y liberada por Twitter con una gran popularidad y aceptación en el mundo del diseño web gracias a las facilidades que aporta y que usamos en el proyecto como es su sistema de rejilla.</a:t>
-            </a:r>
-            <a:endParaRPr lang="es-ES" sz="1200" kern="1200" dirty="0" smtClean="0">
-              <a:solidFill>
-                <a:schemeClr val="tx1"/>
-              </a:solidFill>
-              <a:effectLst/>
-              <a:latin typeface="+mn-lt"/>
-              <a:ea typeface="+mn-ea"/>
-              <a:cs typeface="+mn-cs"/>
-            </a:endParaRPr>
-          </a:p>
-          <a:p>
-            <a:endParaRPr lang="es-ES" dirty="0"/>
-          </a:p>
-        </p:txBody>
-      </p:sp>
-      <p:sp>
-        <p:nvSpPr>
-          <p:cNvPr id="4" name="Marcador de número de diapositiva 3"/>
-          <p:cNvSpPr>
-            <a:spLocks noGrp="1"/>
-          </p:cNvSpPr>
-          <p:nvPr>
-            <p:ph type="sldNum" sz="quarter" idx="10"/>
-          </p:nvPr>
-        </p:nvSpPr>
-        <p:spPr/>
-        <p:txBody>
-          <a:bodyPr/>
-          <a:lstStyle/>
-          <a:p>
-            <a:fld id="{DB7D0A05-FF74-4049-BC13-A9ACD9D2AB82}" type="slidenum">
-              <a:rPr lang="es-ES" smtClean="0"/>
-              <a:t>18</a:t>
-            </a:fld>
-            <a:endParaRPr lang="es-ES"/>
-          </a:p>
-        </p:txBody>
-      </p:sp>
-    </p:spTree>
-    <p:extLst>
-      <p:ext uri="{BB962C8B-B14F-4D97-AF65-F5344CB8AC3E}">
-        <p14:creationId xmlns:p14="http://schemas.microsoft.com/office/powerpoint/2010/main" val="429507329"/>
-      </p:ext>
-    </p:extLst>
-  </p:cSld>
-  <p:clrMapOvr>
-    <a:masterClrMapping/>
-  </p:clrMapOvr>
-</p:notes>
-</file>
-
-<file path=ppt/notesSlides/notesSlide19.xml><?xml version="1.0" encoding="utf-8"?>
-<p:notes xmlns:a="http://schemas.openxmlformats.org/drawingml/2006/main" xmlns:r="http://schemas.openxmlformats.org/officeDocument/2006/relationships" xmlns:p="http://schemas.openxmlformats.org/presentationml/2006/main">
-  <p:cSld>
-    <p:spTree>
-      <p:nvGrpSpPr>
-        <p:cNvPr id="1" name=""/>
-        <p:cNvGrpSpPr/>
-        <p:nvPr/>
-      </p:nvGrpSpPr>
-      <p:grpSpPr>
-        <a:xfrm>
-          <a:off x="0" y="0"/>
-          <a:ext cx="0" cy="0"/>
-          <a:chOff x="0" y="0"/>
-          <a:chExt cx="0" cy="0"/>
-        </a:xfrm>
-      </p:grpSpPr>
-      <p:sp>
-        <p:nvSpPr>
-          <p:cNvPr id="2" name="Marcador de imagen de diapositiva 1"/>
-          <p:cNvSpPr>
-            <a:spLocks noGrp="1" noRot="1" noChangeAspect="1"/>
-          </p:cNvSpPr>
-          <p:nvPr>
-            <p:ph type="sldImg"/>
-          </p:nvPr>
-        </p:nvSpPr>
-        <p:spPr/>
-      </p:sp>
-      <p:sp>
-        <p:nvSpPr>
-          <p:cNvPr id="3" name="Marcador de notas 2"/>
-          <p:cNvSpPr>
-            <a:spLocks noGrp="1"/>
-          </p:cNvSpPr>
-          <p:nvPr>
-            <p:ph type="body" idx="1"/>
-          </p:nvPr>
-        </p:nvSpPr>
-        <p:spPr/>
-        <p:txBody>
-          <a:bodyPr/>
-          <a:lstStyle/>
-          <a:p>
-            <a:r>
-              <a:rPr lang="es-ES" dirty="0" smtClean="0"/>
-              <a:t>Aquí vemos como hemos hecho uso del sistema de rejilla de </a:t>
-            </a:r>
-            <a:r>
-              <a:rPr lang="es-ES" dirty="0" err="1" smtClean="0"/>
-              <a:t>bootstrap</a:t>
-            </a:r>
-            <a:r>
-              <a:rPr lang="es-ES" dirty="0" smtClean="0"/>
-              <a:t>.</a:t>
-            </a:r>
-            <a:endParaRPr lang="es-ES" dirty="0"/>
-          </a:p>
-        </p:txBody>
-      </p:sp>
-      <p:sp>
-        <p:nvSpPr>
-          <p:cNvPr id="4" name="Marcador de número de diapositiva 3"/>
-          <p:cNvSpPr>
-            <a:spLocks noGrp="1"/>
-          </p:cNvSpPr>
-          <p:nvPr>
-            <p:ph type="sldNum" sz="quarter" idx="10"/>
-          </p:nvPr>
-        </p:nvSpPr>
-        <p:spPr/>
-        <p:txBody>
-          <a:bodyPr/>
-          <a:lstStyle/>
-          <a:p>
-            <a:fld id="{DB7D0A05-FF74-4049-BC13-A9ACD9D2AB82}" type="slidenum">
-              <a:rPr lang="es-ES" smtClean="0"/>
-              <a:t>19</a:t>
-            </a:fld>
-            <a:endParaRPr lang="es-ES"/>
-          </a:p>
-        </p:txBody>
-      </p:sp>
-    </p:spTree>
-    <p:extLst>
-      <p:ext uri="{BB962C8B-B14F-4D97-AF65-F5344CB8AC3E}">
-        <p14:creationId xmlns:p14="http://schemas.microsoft.com/office/powerpoint/2010/main" val="1732749248"/>
       </p:ext>
     </p:extLst>
   </p:cSld>
@@ -2246,7 +2479,7 @@
                 <a:ea typeface="+mn-ea"/>
                 <a:cs typeface="+mn-cs"/>
               </a:rPr>
-              <a:t>Encargado de generar HTML dinámicamente y elegido por su rapidez y sencillez en cuanto a código para realizar dicha tarea.</a:t>
+              <a:t>Librería de estilos creada y liberada por Twitter con una gran popularidad y aceptación en el mundo del diseño web gracias a las facilidades que aporta y que usamos en el proyecto como es su sistema de rejilla.</a:t>
             </a:r>
             <a:endParaRPr lang="es-ES" sz="1200" kern="1200" dirty="0" smtClean="0">
               <a:solidFill>
@@ -2289,7 +2522,7 @@
     </p:spTree>
     <p:extLst>
       <p:ext uri="{BB962C8B-B14F-4D97-AF65-F5344CB8AC3E}">
-        <p14:creationId xmlns:p14="http://schemas.microsoft.com/office/powerpoint/2010/main" val="1775177090"/>
+        <p14:creationId xmlns:p14="http://schemas.microsoft.com/office/powerpoint/2010/main" val="429507329"/>
       </p:ext>
     </p:extLst>
   </p:cSld>
@@ -2345,11 +2578,15 @@
           <a:p>
             <a:r>
               <a:rPr lang="es-ES" dirty="0" smtClean="0"/>
-              <a:t>Aquí</a:t>
-            </a:r>
-            <a:r>
-              <a:rPr lang="es-ES" baseline="0" dirty="0" smtClean="0"/>
-              <a:t> tenemos un ejemplo de como generamos HTML dinámicamente mediante JQUERY</a:t>
+              <a:t>Aquí vemos como hemos hecho uso del sistema de rejilla de </a:t>
+            </a:r>
+            <a:r>
+              <a:rPr lang="es-ES" dirty="0" err="1" smtClean="0"/>
+              <a:t>bootstrap</a:t>
+            </a:r>
+            <a:r>
+              <a:rPr lang="es-ES" dirty="0" smtClean="0"/>
+              <a:t>.</a:t>
             </a:r>
             <a:endParaRPr lang="es-ES" dirty="0"/>
           </a:p>
@@ -2381,7 +2618,7 @@
     </p:spTree>
     <p:extLst>
       <p:ext uri="{BB962C8B-B14F-4D97-AF65-F5344CB8AC3E}">
-        <p14:creationId xmlns:p14="http://schemas.microsoft.com/office/powerpoint/2010/main" val="1512199226"/>
+        <p14:creationId xmlns:p14="http://schemas.microsoft.com/office/powerpoint/2010/main" val="1732749248"/>
       </p:ext>
     </p:extLst>
   </p:cSld>
@@ -2462,7 +2699,7 @@
                 <a:ea typeface="+mn-ea"/>
                 <a:cs typeface="+mn-cs"/>
               </a:rPr>
-              <a:t>Utilizado para evitar las recargas de la web a la hora de filtrar en las búsquedas.</a:t>
+              <a:t>Encargado de generar HTML dinámicamente y elegido por su rapidez y sencillez en cuanto a código para realizar dicha tarea.</a:t>
             </a:r>
             <a:endParaRPr lang="es-ES" sz="1200" kern="1200" dirty="0" smtClean="0">
               <a:solidFill>
@@ -2505,7 +2742,7 @@
     </p:spTree>
     <p:extLst>
       <p:ext uri="{BB962C8B-B14F-4D97-AF65-F5344CB8AC3E}">
-        <p14:creationId xmlns:p14="http://schemas.microsoft.com/office/powerpoint/2010/main" val="1234860430"/>
+        <p14:creationId xmlns:p14="http://schemas.microsoft.com/office/powerpoint/2010/main" val="1775177090"/>
       </p:ext>
     </p:extLst>
   </p:cSld>
@@ -2561,11 +2798,11 @@
           <a:p>
             <a:r>
               <a:rPr lang="es-ES" dirty="0" smtClean="0"/>
-              <a:t>Este es un ejemplo de llamadas AJAX durante la selección</a:t>
+              <a:t>Aquí</a:t>
             </a:r>
             <a:r>
               <a:rPr lang="es-ES" baseline="0" dirty="0" smtClean="0"/>
-              <a:t> de los distintos filtros de las paginas web de los cines.</a:t>
+              <a:t> tenemos un ejemplo de como generamos HTML dinámicamente mediante JQUERY</a:t>
             </a:r>
             <a:endParaRPr lang="es-ES" dirty="0"/>
           </a:p>
@@ -2597,7 +2834,7 @@
     </p:spTree>
     <p:extLst>
       <p:ext uri="{BB962C8B-B14F-4D97-AF65-F5344CB8AC3E}">
-        <p14:creationId xmlns:p14="http://schemas.microsoft.com/office/powerpoint/2010/main" val="708013584"/>
+        <p14:creationId xmlns:p14="http://schemas.microsoft.com/office/powerpoint/2010/main" val="1512199226"/>
       </p:ext>
     </p:extLst>
   </p:cSld>
@@ -2669,18 +2906,6 @@
               <a:defRPr/>
             </a:pPr>
             <a:r>
-              <a:rPr lang="es-ES_tradnl" sz="1200" kern="1200" dirty="0" err="1" smtClean="0">
-                <a:solidFill>
-                  <a:schemeClr val="tx1"/>
-                </a:solidFill>
-                <a:effectLst/>
-                <a:latin typeface="+mn-lt"/>
-                <a:ea typeface="+mn-ea"/>
-                <a:cs typeface="+mn-cs"/>
-              </a:rPr>
-              <a:t>Trello</a:t>
-            </a:r>
-            <a:r>
               <a:rPr lang="es-ES_tradnl" sz="1200" kern="1200" dirty="0" smtClean="0">
                 <a:solidFill>
                   <a:schemeClr val="tx1"/>
@@ -2690,7 +2915,7 @@
                 <a:ea typeface="+mn-ea"/>
                 <a:cs typeface="+mn-cs"/>
               </a:rPr>
-              <a:t> es una aplicación Web la cual te proporciona un sistema de trabajo basado en metodologías agiles.</a:t>
+              <a:t>Utilizado para evitar las recargas de la web a la hora de filtrar en las búsquedas.</a:t>
             </a:r>
             <a:endParaRPr lang="es-ES" sz="1200" kern="1200" dirty="0" smtClean="0">
               <a:solidFill>
@@ -2733,7 +2958,7 @@
     </p:spTree>
     <p:extLst>
       <p:ext uri="{BB962C8B-B14F-4D97-AF65-F5344CB8AC3E}">
-        <p14:creationId xmlns:p14="http://schemas.microsoft.com/office/powerpoint/2010/main" val="1050634970"/>
+        <p14:creationId xmlns:p14="http://schemas.microsoft.com/office/powerpoint/2010/main" val="1234860430"/>
       </p:ext>
     </p:extLst>
   </p:cSld>
@@ -2787,6 +3012,234 @@
           <a:bodyPr/>
           <a:lstStyle/>
           <a:p>
+            <a:r>
+              <a:rPr lang="es-ES" dirty="0" smtClean="0"/>
+              <a:t>Este es un ejemplo de llamadas AJAX durante la selección</a:t>
+            </a:r>
+            <a:r>
+              <a:rPr lang="es-ES" baseline="0" dirty="0" smtClean="0"/>
+              <a:t> de los distintos filtros de las paginas web de los cines.</a:t>
+            </a:r>
+            <a:endParaRPr lang="es-ES" dirty="0"/>
+          </a:p>
+        </p:txBody>
+      </p:sp>
+      <p:sp>
+        <p:nvSpPr>
+          <p:cNvPr id="4" name="Marcador de número de diapositiva 3"/>
+          <p:cNvSpPr>
+            <a:spLocks noGrp="1"/>
+          </p:cNvSpPr>
+          <p:nvPr>
+            <p:ph type="sldNum" sz="quarter" idx="10"/>
+          </p:nvPr>
+        </p:nvSpPr>
+        <p:spPr/>
+        <p:txBody>
+          <a:bodyPr/>
+          <a:lstStyle/>
+          <a:p>
+            <a:fld id="{DB7D0A05-FF74-4049-BC13-A9ACD9D2AB82}" type="slidenum">
+              <a:rPr lang="es-ES" smtClean="0"/>
+              <a:t>25</a:t>
+            </a:fld>
+            <a:endParaRPr lang="es-ES"/>
+          </a:p>
+        </p:txBody>
+      </p:sp>
+    </p:spTree>
+    <p:extLst>
+      <p:ext uri="{BB962C8B-B14F-4D97-AF65-F5344CB8AC3E}">
+        <p14:creationId xmlns:p14="http://schemas.microsoft.com/office/powerpoint/2010/main" val="708013584"/>
+      </p:ext>
+    </p:extLst>
+  </p:cSld>
+  <p:clrMapOvr>
+    <a:masterClrMapping/>
+  </p:clrMapOvr>
+</p:notes>
+</file>
+
+<file path=ppt/notesSlides/notesSlide26.xml><?xml version="1.0" encoding="utf-8"?>
+<p:notes xmlns:a="http://schemas.openxmlformats.org/drawingml/2006/main" xmlns:r="http://schemas.openxmlformats.org/officeDocument/2006/relationships" xmlns:p="http://schemas.openxmlformats.org/presentationml/2006/main">
+  <p:cSld>
+    <p:spTree>
+      <p:nvGrpSpPr>
+        <p:cNvPr id="1" name=""/>
+        <p:cNvGrpSpPr/>
+        <p:nvPr/>
+      </p:nvGrpSpPr>
+      <p:grpSpPr>
+        <a:xfrm>
+          <a:off x="0" y="0"/>
+          <a:ext cx="0" cy="0"/>
+          <a:chOff x="0" y="0"/>
+          <a:chExt cx="0" cy="0"/>
+        </a:xfrm>
+      </p:grpSpPr>
+      <p:sp>
+        <p:nvSpPr>
+          <p:cNvPr id="2" name="Marcador de imagen de diapositiva 1"/>
+          <p:cNvSpPr>
+            <a:spLocks noGrp="1" noRot="1" noChangeAspect="1"/>
+          </p:cNvSpPr>
+          <p:nvPr>
+            <p:ph type="sldImg"/>
+          </p:nvPr>
+        </p:nvSpPr>
+        <p:spPr/>
+      </p:sp>
+      <p:sp>
+        <p:nvSpPr>
+          <p:cNvPr id="3" name="Marcador de notas 2"/>
+          <p:cNvSpPr>
+            <a:spLocks noGrp="1"/>
+          </p:cNvSpPr>
+          <p:nvPr>
+            <p:ph type="body" idx="1"/>
+          </p:nvPr>
+        </p:nvSpPr>
+        <p:spPr/>
+        <p:txBody>
+          <a:bodyPr/>
+          <a:lstStyle/>
+          <a:p>
+            <a:pPr marL="0" marR="0" lvl="0" indent="0" algn="l" defTabSz="914400" rtl="0" eaLnBrk="1" fontAlgn="auto" latinLnBrk="0" hangingPunct="1">
+              <a:lnSpc>
+                <a:spcPct val="100000"/>
+              </a:lnSpc>
+              <a:spcBef>
+                <a:spcPts val="0"/>
+              </a:spcBef>
+              <a:spcAft>
+                <a:spcPts val="0"/>
+              </a:spcAft>
+              <a:buClrTx/>
+              <a:buSzTx/>
+              <a:buFontTx/>
+              <a:buNone/>
+              <a:tabLst/>
+              <a:defRPr/>
+            </a:pPr>
+            <a:r>
+              <a:rPr lang="es-ES_tradnl" sz="1200" kern="1200" dirty="0" err="1" smtClean="0">
+                <a:solidFill>
+                  <a:schemeClr val="tx1"/>
+                </a:solidFill>
+                <a:effectLst/>
+                <a:latin typeface="+mn-lt"/>
+                <a:ea typeface="+mn-ea"/>
+                <a:cs typeface="+mn-cs"/>
+              </a:rPr>
+              <a:t>Trello</a:t>
+            </a:r>
+            <a:r>
+              <a:rPr lang="es-ES_tradnl" sz="1200" kern="1200" dirty="0" smtClean="0">
+                <a:solidFill>
+                  <a:schemeClr val="tx1"/>
+                </a:solidFill>
+                <a:effectLst/>
+                <a:latin typeface="+mn-lt"/>
+                <a:ea typeface="+mn-ea"/>
+                <a:cs typeface="+mn-cs"/>
+              </a:rPr>
+              <a:t> es una aplicación Web la cual te proporciona un sistema de trabajo basado en metodologías agiles.</a:t>
+            </a:r>
+            <a:endParaRPr lang="es-ES" sz="1200" kern="1200" dirty="0" smtClean="0">
+              <a:solidFill>
+                <a:schemeClr val="tx1"/>
+              </a:solidFill>
+              <a:effectLst/>
+              <a:latin typeface="+mn-lt"/>
+              <a:ea typeface="+mn-ea"/>
+              <a:cs typeface="+mn-cs"/>
+            </a:endParaRPr>
+          </a:p>
+          <a:p>
+            <a:endParaRPr lang="es-ES" dirty="0"/>
+          </a:p>
+        </p:txBody>
+      </p:sp>
+      <p:sp>
+        <p:nvSpPr>
+          <p:cNvPr id="4" name="Marcador de número de diapositiva 3"/>
+          <p:cNvSpPr>
+            <a:spLocks noGrp="1"/>
+          </p:cNvSpPr>
+          <p:nvPr>
+            <p:ph type="sldNum" sz="quarter" idx="10"/>
+          </p:nvPr>
+        </p:nvSpPr>
+        <p:spPr/>
+        <p:txBody>
+          <a:bodyPr/>
+          <a:lstStyle/>
+          <a:p>
+            <a:fld id="{DB7D0A05-FF74-4049-BC13-A9ACD9D2AB82}" type="slidenum">
+              <a:rPr lang="es-ES" smtClean="0"/>
+              <a:t>26</a:t>
+            </a:fld>
+            <a:endParaRPr lang="es-ES"/>
+          </a:p>
+        </p:txBody>
+      </p:sp>
+    </p:spTree>
+    <p:extLst>
+      <p:ext uri="{BB962C8B-B14F-4D97-AF65-F5344CB8AC3E}">
+        <p14:creationId xmlns:p14="http://schemas.microsoft.com/office/powerpoint/2010/main" val="1050634970"/>
+      </p:ext>
+    </p:extLst>
+  </p:cSld>
+  <p:clrMapOvr>
+    <a:masterClrMapping/>
+  </p:clrMapOvr>
+</p:notes>
+</file>
+
+<file path=ppt/notesSlides/notesSlide27.xml><?xml version="1.0" encoding="utf-8"?>
+<p:notes xmlns:a="http://schemas.openxmlformats.org/drawingml/2006/main" xmlns:r="http://schemas.openxmlformats.org/officeDocument/2006/relationships" xmlns:p="http://schemas.openxmlformats.org/presentationml/2006/main">
+  <p:cSld>
+    <p:spTree>
+      <p:nvGrpSpPr>
+        <p:cNvPr id="1" name=""/>
+        <p:cNvGrpSpPr/>
+        <p:nvPr/>
+      </p:nvGrpSpPr>
+      <p:grpSpPr>
+        <a:xfrm>
+          <a:off x="0" y="0"/>
+          <a:ext cx="0" cy="0"/>
+          <a:chOff x="0" y="0"/>
+          <a:chExt cx="0" cy="0"/>
+        </a:xfrm>
+      </p:grpSpPr>
+      <p:sp>
+        <p:nvSpPr>
+          <p:cNvPr id="2" name="Marcador de imagen de diapositiva 1"/>
+          <p:cNvSpPr>
+            <a:spLocks noGrp="1" noRot="1" noChangeAspect="1"/>
+          </p:cNvSpPr>
+          <p:nvPr>
+            <p:ph type="sldImg"/>
+          </p:nvPr>
+        </p:nvSpPr>
+        <p:spPr/>
+      </p:sp>
+      <p:sp>
+        <p:nvSpPr>
+          <p:cNvPr id="3" name="Marcador de notas 2"/>
+          <p:cNvSpPr>
+            <a:spLocks noGrp="1"/>
+          </p:cNvSpPr>
+          <p:nvPr>
+            <p:ph type="body" idx="1"/>
+          </p:nvPr>
+        </p:nvSpPr>
+        <p:spPr/>
+        <p:txBody>
+          <a:bodyPr/>
+          <a:lstStyle/>
+          <a:p>
             <a:pPr marL="0" marR="0" lvl="0" indent="0" algn="l" defTabSz="914400" rtl="0" eaLnBrk="1" fontAlgn="auto" latinLnBrk="0" hangingPunct="1">
               <a:lnSpc>
                 <a:spcPct val="100000"/>
@@ -3149,7 +3602,7 @@
           <a:p>
             <a:fld id="{DB7D0A05-FF74-4049-BC13-A9ACD9D2AB82}" type="slidenum">
               <a:rPr lang="es-ES" smtClean="0"/>
-              <a:t>25</a:t>
+              <a:t>27</a:t>
             </a:fld>
             <a:endParaRPr lang="es-ES"/>
           </a:p>
@@ -3168,7 +3621,7 @@
 </p:notes>
 </file>
 
-<file path=ppt/notesSlides/notesSlide26.xml><?xml version="1.0" encoding="utf-8"?>
+<file path=ppt/notesSlides/notesSlide28.xml><?xml version="1.0" encoding="utf-8"?>
 <p:notes xmlns:a="http://schemas.openxmlformats.org/drawingml/2006/main" xmlns:r="http://schemas.openxmlformats.org/officeDocument/2006/relationships" xmlns:p="http://schemas.openxmlformats.org/presentationml/2006/main">
   <p:cSld>
     <p:spTree>
@@ -3404,7 +3857,7 @@
           <a:p>
             <a:fld id="{DB7D0A05-FF74-4049-BC13-A9ACD9D2AB82}" type="slidenum">
               <a:rPr lang="es-ES" smtClean="0"/>
-              <a:t>26</a:t>
+              <a:t>28</a:t>
             </a:fld>
             <a:endParaRPr lang="es-ES"/>
           </a:p>
@@ -3414,642 +3867,6 @@
     <p:extLst>
       <p:ext uri="{BB962C8B-B14F-4D97-AF65-F5344CB8AC3E}">
         <p14:creationId xmlns:p14="http://schemas.microsoft.com/office/powerpoint/2010/main" val="1844417592"/>
-      </p:ext>
-    </p:extLst>
-  </p:cSld>
-  <p:clrMapOvr>
-    <a:masterClrMapping/>
-  </p:clrMapOvr>
-</p:notes>
-</file>
-
-<file path=ppt/notesSlides/notesSlide27.xml><?xml version="1.0" encoding="utf-8"?>
-<p:notes xmlns:a="http://schemas.openxmlformats.org/drawingml/2006/main" xmlns:r="http://schemas.openxmlformats.org/officeDocument/2006/relationships" xmlns:p="http://schemas.openxmlformats.org/presentationml/2006/main">
-  <p:cSld>
-    <p:spTree>
-      <p:nvGrpSpPr>
-        <p:cNvPr id="1" name=""/>
-        <p:cNvGrpSpPr/>
-        <p:nvPr/>
-      </p:nvGrpSpPr>
-      <p:grpSpPr>
-        <a:xfrm>
-          <a:off x="0" y="0"/>
-          <a:ext cx="0" cy="0"/>
-          <a:chOff x="0" y="0"/>
-          <a:chExt cx="0" cy="0"/>
-        </a:xfrm>
-      </p:grpSpPr>
-      <p:sp>
-        <p:nvSpPr>
-          <p:cNvPr id="2" name="Marcador de imagen de diapositiva 1"/>
-          <p:cNvSpPr>
-            <a:spLocks noGrp="1" noRot="1" noChangeAspect="1"/>
-          </p:cNvSpPr>
-          <p:nvPr>
-            <p:ph type="sldImg"/>
-          </p:nvPr>
-        </p:nvSpPr>
-        <p:spPr/>
-      </p:sp>
-      <p:sp>
-        <p:nvSpPr>
-          <p:cNvPr id="3" name="Marcador de notas 2"/>
-          <p:cNvSpPr>
-            <a:spLocks noGrp="1"/>
-          </p:cNvSpPr>
-          <p:nvPr>
-            <p:ph type="body" idx="1"/>
-          </p:nvPr>
-        </p:nvSpPr>
-        <p:spPr/>
-        <p:txBody>
-          <a:bodyPr/>
-          <a:lstStyle/>
-          <a:p>
-            <a:r>
-              <a:rPr lang="es-ES_tradnl" sz="1200" kern="1200" dirty="0" err="1" smtClean="0">
-                <a:solidFill>
-                  <a:schemeClr val="tx1"/>
-                </a:solidFill>
-                <a:effectLst/>
-                <a:latin typeface="+mn-lt"/>
-                <a:ea typeface="+mn-ea"/>
-                <a:cs typeface="+mn-cs"/>
-              </a:rPr>
-              <a:t>Github</a:t>
-            </a:r>
-            <a:r>
-              <a:rPr lang="es-ES_tradnl" sz="1200" kern="1200" dirty="0" smtClean="0">
-                <a:solidFill>
-                  <a:schemeClr val="tx1"/>
-                </a:solidFill>
-                <a:effectLst/>
-                <a:latin typeface="+mn-lt"/>
-                <a:ea typeface="+mn-ea"/>
-                <a:cs typeface="+mn-cs"/>
-              </a:rPr>
-              <a:t> es la comunidad/red social de los programadores por excelencia y está basado en el software de control de versiones GIT, creado por </a:t>
-            </a:r>
-            <a:r>
-              <a:rPr lang="es-ES_tradnl" sz="1200" kern="1200" dirty="0" err="1" smtClean="0">
-                <a:solidFill>
-                  <a:schemeClr val="tx1"/>
-                </a:solidFill>
-                <a:effectLst/>
-                <a:latin typeface="+mn-lt"/>
-                <a:ea typeface="+mn-ea"/>
-                <a:cs typeface="+mn-cs"/>
-              </a:rPr>
-              <a:t>Linus</a:t>
-            </a:r>
-            <a:r>
-              <a:rPr lang="es-ES_tradnl" sz="1200" kern="1200" dirty="0" smtClean="0">
-                <a:solidFill>
-                  <a:schemeClr val="tx1"/>
-                </a:solidFill>
-                <a:effectLst/>
-                <a:latin typeface="+mn-lt"/>
-                <a:ea typeface="+mn-ea"/>
-                <a:cs typeface="+mn-cs"/>
-              </a:rPr>
-              <a:t> </a:t>
-            </a:r>
-            <a:r>
-              <a:rPr lang="es-ES_tradnl" sz="1200" kern="1200" dirty="0" err="1" smtClean="0">
-                <a:solidFill>
-                  <a:schemeClr val="tx1"/>
-                </a:solidFill>
-                <a:effectLst/>
-                <a:latin typeface="+mn-lt"/>
-                <a:ea typeface="+mn-ea"/>
-                <a:cs typeface="+mn-cs"/>
-              </a:rPr>
-              <a:t>Torvalds</a:t>
-            </a:r>
-            <a:r>
-              <a:rPr lang="es-ES_tradnl" sz="1200" kern="1200" dirty="0" smtClean="0">
-                <a:solidFill>
-                  <a:schemeClr val="tx1"/>
-                </a:solidFill>
-                <a:effectLst/>
-                <a:latin typeface="+mn-lt"/>
-                <a:ea typeface="+mn-ea"/>
-                <a:cs typeface="+mn-cs"/>
-              </a:rPr>
-              <a:t>.</a:t>
-            </a:r>
-          </a:p>
-          <a:p>
-            <a:endParaRPr lang="es-ES" sz="1200" kern="1200" dirty="0" smtClean="0">
-              <a:solidFill>
-                <a:schemeClr val="tx1"/>
-              </a:solidFill>
-              <a:effectLst/>
-              <a:latin typeface="+mn-lt"/>
-              <a:ea typeface="+mn-ea"/>
-              <a:cs typeface="+mn-cs"/>
-            </a:endParaRPr>
-          </a:p>
-          <a:p>
-            <a:r>
-              <a:rPr lang="es-ES_tradnl" sz="1200" kern="1200" dirty="0" smtClean="0">
-                <a:solidFill>
-                  <a:schemeClr val="tx1"/>
-                </a:solidFill>
-                <a:effectLst/>
-                <a:latin typeface="+mn-lt"/>
-                <a:ea typeface="+mn-ea"/>
-                <a:cs typeface="+mn-cs"/>
-              </a:rPr>
-              <a:t>Para nuestro proyecto hemos decido usar control de versiones para familiarizarnos con esta herramienta absolutamente imprescindible y fundamental en el mundo del desarrollo.</a:t>
-            </a:r>
-            <a:endParaRPr lang="es-ES" sz="1200" kern="1200" dirty="0" smtClean="0">
-              <a:solidFill>
-                <a:schemeClr val="tx1"/>
-              </a:solidFill>
-              <a:effectLst/>
-              <a:latin typeface="+mn-lt"/>
-              <a:ea typeface="+mn-ea"/>
-              <a:cs typeface="+mn-cs"/>
-            </a:endParaRPr>
-          </a:p>
-          <a:p>
-            <a:endParaRPr lang="es-ES" dirty="0"/>
-          </a:p>
-        </p:txBody>
-      </p:sp>
-      <p:sp>
-        <p:nvSpPr>
-          <p:cNvPr id="4" name="Marcador de número de diapositiva 3"/>
-          <p:cNvSpPr>
-            <a:spLocks noGrp="1"/>
-          </p:cNvSpPr>
-          <p:nvPr>
-            <p:ph type="sldNum" sz="quarter" idx="10"/>
-          </p:nvPr>
-        </p:nvSpPr>
-        <p:spPr/>
-        <p:txBody>
-          <a:bodyPr/>
-          <a:lstStyle/>
-          <a:p>
-            <a:fld id="{DB7D0A05-FF74-4049-BC13-A9ACD9D2AB82}" type="slidenum">
-              <a:rPr lang="es-ES" smtClean="0"/>
-              <a:t>27</a:t>
-            </a:fld>
-            <a:endParaRPr lang="es-ES"/>
-          </a:p>
-        </p:txBody>
-      </p:sp>
-    </p:spTree>
-    <p:extLst>
-      <p:ext uri="{BB962C8B-B14F-4D97-AF65-F5344CB8AC3E}">
-        <p14:creationId xmlns:p14="http://schemas.microsoft.com/office/powerpoint/2010/main" val="2480262944"/>
-      </p:ext>
-    </p:extLst>
-  </p:cSld>
-  <p:clrMapOvr>
-    <a:masterClrMapping/>
-  </p:clrMapOvr>
-</p:notes>
-</file>
-
-<file path=ppt/notesSlides/notesSlide28.xml><?xml version="1.0" encoding="utf-8"?>
-<p:notes xmlns:a="http://schemas.openxmlformats.org/drawingml/2006/main" xmlns:r="http://schemas.openxmlformats.org/officeDocument/2006/relationships" xmlns:p="http://schemas.openxmlformats.org/presentationml/2006/main">
-  <p:cSld>
-    <p:spTree>
-      <p:nvGrpSpPr>
-        <p:cNvPr id="1" name=""/>
-        <p:cNvGrpSpPr/>
-        <p:nvPr/>
-      </p:nvGrpSpPr>
-      <p:grpSpPr>
-        <a:xfrm>
-          <a:off x="0" y="0"/>
-          <a:ext cx="0" cy="0"/>
-          <a:chOff x="0" y="0"/>
-          <a:chExt cx="0" cy="0"/>
-        </a:xfrm>
-      </p:grpSpPr>
-      <p:sp>
-        <p:nvSpPr>
-          <p:cNvPr id="2" name="Marcador de imagen de diapositiva 1"/>
-          <p:cNvSpPr>
-            <a:spLocks noGrp="1" noRot="1" noChangeAspect="1"/>
-          </p:cNvSpPr>
-          <p:nvPr>
-            <p:ph type="sldImg"/>
-          </p:nvPr>
-        </p:nvSpPr>
-        <p:spPr/>
-      </p:sp>
-      <p:sp>
-        <p:nvSpPr>
-          <p:cNvPr id="3" name="Marcador de notas 2"/>
-          <p:cNvSpPr>
-            <a:spLocks noGrp="1"/>
-          </p:cNvSpPr>
-          <p:nvPr>
-            <p:ph type="body" idx="1"/>
-          </p:nvPr>
-        </p:nvSpPr>
-        <p:spPr/>
-        <p:txBody>
-          <a:bodyPr/>
-          <a:lstStyle/>
-          <a:p>
-            <a:pPr marL="0" marR="0" lvl="0" indent="0" algn="l" defTabSz="914400" rtl="0" eaLnBrk="1" fontAlgn="auto" latinLnBrk="0" hangingPunct="1">
-              <a:lnSpc>
-                <a:spcPct val="100000"/>
-              </a:lnSpc>
-              <a:spcBef>
-                <a:spcPts val="0"/>
-              </a:spcBef>
-              <a:spcAft>
-                <a:spcPts val="0"/>
-              </a:spcAft>
-              <a:buClrTx/>
-              <a:buSzTx/>
-              <a:buFontTx/>
-              <a:buNone/>
-              <a:tabLst/>
-              <a:defRPr/>
-            </a:pPr>
-            <a:r>
-              <a:rPr lang="es-ES_tradnl" sz="1200" kern="1200" dirty="0" smtClean="0">
-                <a:solidFill>
-                  <a:schemeClr val="tx1"/>
-                </a:solidFill>
-                <a:effectLst/>
-                <a:latin typeface="+mn-lt"/>
-                <a:ea typeface="+mn-ea"/>
-                <a:cs typeface="+mn-cs"/>
-              </a:rPr>
-              <a:t>Creamos un repositorio para el proyecto, en el cual los integrantes del equipo de desarrollo podemos programar simultáneamente al disponer siempre de las versiones actualizadas de los códigos.</a:t>
-            </a:r>
-          </a:p>
-          <a:p>
-            <a:pPr marL="0" marR="0" lvl="0" indent="0" algn="l" defTabSz="914400" rtl="0" eaLnBrk="1" fontAlgn="auto" latinLnBrk="0" hangingPunct="1">
-              <a:lnSpc>
-                <a:spcPct val="100000"/>
-              </a:lnSpc>
-              <a:spcBef>
-                <a:spcPts val="0"/>
-              </a:spcBef>
-              <a:spcAft>
-                <a:spcPts val="0"/>
-              </a:spcAft>
-              <a:buClrTx/>
-              <a:buSzTx/>
-              <a:buFontTx/>
-              <a:buNone/>
-              <a:tabLst/>
-              <a:defRPr/>
-            </a:pPr>
-            <a:endParaRPr lang="es-ES_tradnl" sz="1200" kern="1200" dirty="0" smtClean="0">
-              <a:solidFill>
-                <a:schemeClr val="tx1"/>
-              </a:solidFill>
-              <a:effectLst/>
-              <a:latin typeface="+mn-lt"/>
-              <a:ea typeface="+mn-ea"/>
-              <a:cs typeface="+mn-cs"/>
-            </a:endParaRPr>
-          </a:p>
-          <a:p>
-            <a:pPr marL="0" marR="0" lvl="0" indent="0" algn="l" defTabSz="914400" rtl="0" eaLnBrk="1" fontAlgn="auto" latinLnBrk="0" hangingPunct="1">
-              <a:lnSpc>
-                <a:spcPct val="100000"/>
-              </a:lnSpc>
-              <a:spcBef>
-                <a:spcPts val="0"/>
-              </a:spcBef>
-              <a:spcAft>
-                <a:spcPts val="0"/>
-              </a:spcAft>
-              <a:buClrTx/>
-              <a:buSzTx/>
-              <a:buFontTx/>
-              <a:buNone/>
-              <a:tabLst/>
-              <a:defRPr/>
-            </a:pPr>
-            <a:r>
-              <a:rPr lang="es-ES_tradnl" sz="1200" kern="1200" dirty="0" smtClean="0">
-                <a:solidFill>
-                  <a:schemeClr val="tx1"/>
-                </a:solidFill>
-                <a:effectLst/>
-                <a:latin typeface="+mn-lt"/>
-                <a:ea typeface="+mn-ea"/>
-                <a:cs typeface="+mn-cs"/>
-              </a:rPr>
-              <a:t>Esto es posible gracias a funcionalidades de los software de control de versiones como es la</a:t>
-            </a:r>
-            <a:r>
-              <a:rPr lang="es-ES_tradnl" sz="1200" kern="1200" baseline="0" dirty="0" smtClean="0">
-                <a:solidFill>
-                  <a:schemeClr val="tx1"/>
-                </a:solidFill>
-                <a:effectLst/>
-                <a:latin typeface="+mn-lt"/>
-                <a:ea typeface="+mn-ea"/>
-                <a:cs typeface="+mn-cs"/>
-              </a:rPr>
-              <a:t> </a:t>
-            </a:r>
-            <a:r>
-              <a:rPr lang="es-ES_tradnl" sz="1200" kern="1200" baseline="0" dirty="0" err="1" smtClean="0">
-                <a:solidFill>
-                  <a:schemeClr val="tx1"/>
-                </a:solidFill>
-                <a:effectLst/>
-                <a:latin typeface="+mn-lt"/>
-                <a:ea typeface="+mn-ea"/>
-                <a:cs typeface="+mn-cs"/>
-              </a:rPr>
-              <a:t>operacion</a:t>
-            </a:r>
-            <a:r>
-              <a:rPr lang="es-ES_tradnl" sz="1200" kern="1200" dirty="0" smtClean="0">
-                <a:solidFill>
-                  <a:schemeClr val="tx1"/>
-                </a:solidFill>
-                <a:effectLst/>
-                <a:latin typeface="+mn-lt"/>
-                <a:ea typeface="+mn-ea"/>
-                <a:cs typeface="+mn-cs"/>
-              </a:rPr>
-              <a:t> </a:t>
-            </a:r>
-            <a:r>
-              <a:rPr lang="es-ES_tradnl" sz="1200" kern="1200" dirty="0" err="1" smtClean="0">
-                <a:solidFill>
-                  <a:schemeClr val="tx1"/>
-                </a:solidFill>
-                <a:effectLst/>
-                <a:latin typeface="+mn-lt"/>
-                <a:ea typeface="+mn-ea"/>
-                <a:cs typeface="+mn-cs"/>
-              </a:rPr>
-              <a:t>Merge</a:t>
-            </a:r>
-            <a:r>
-              <a:rPr lang="es-ES_tradnl" sz="1200" kern="1200" dirty="0" smtClean="0">
-                <a:solidFill>
-                  <a:schemeClr val="tx1"/>
-                </a:solidFill>
-                <a:effectLst/>
-                <a:latin typeface="+mn-lt"/>
-                <a:ea typeface="+mn-ea"/>
-                <a:cs typeface="+mn-cs"/>
-              </a:rPr>
-              <a:t> que te permite que varias persones trabajen sobre un mismo código integrando al finalizar de programar las líneas de todo el equipo.</a:t>
-            </a:r>
-          </a:p>
-          <a:p>
-            <a:pPr marL="0" marR="0" lvl="0" indent="0" algn="l" defTabSz="914400" rtl="0" eaLnBrk="1" fontAlgn="auto" latinLnBrk="0" hangingPunct="1">
-              <a:lnSpc>
-                <a:spcPct val="100000"/>
-              </a:lnSpc>
-              <a:spcBef>
-                <a:spcPts val="0"/>
-              </a:spcBef>
-              <a:spcAft>
-                <a:spcPts val="0"/>
-              </a:spcAft>
-              <a:buClrTx/>
-              <a:buSzTx/>
-              <a:buFontTx/>
-              <a:buNone/>
-              <a:tabLst/>
-              <a:defRPr/>
-            </a:pPr>
-            <a:endParaRPr lang="es-ES_tradnl" sz="1200" kern="1200" dirty="0" smtClean="0">
-              <a:solidFill>
-                <a:schemeClr val="tx1"/>
-              </a:solidFill>
-              <a:effectLst/>
-              <a:latin typeface="+mn-lt"/>
-              <a:ea typeface="+mn-ea"/>
-              <a:cs typeface="+mn-cs"/>
-            </a:endParaRPr>
-          </a:p>
-          <a:p>
-            <a:pPr marL="0" marR="0" lvl="0" indent="0" algn="l" defTabSz="914400" rtl="0" eaLnBrk="1" fontAlgn="auto" latinLnBrk="0" hangingPunct="1">
-              <a:lnSpc>
-                <a:spcPct val="100000"/>
-              </a:lnSpc>
-              <a:spcBef>
-                <a:spcPts val="0"/>
-              </a:spcBef>
-              <a:spcAft>
-                <a:spcPts val="0"/>
-              </a:spcAft>
-              <a:buClrTx/>
-              <a:buSzTx/>
-              <a:buFontTx/>
-              <a:buNone/>
-              <a:tabLst/>
-              <a:defRPr/>
-            </a:pPr>
-            <a:r>
-              <a:rPr lang="es-ES_tradnl" sz="1200" kern="1200" dirty="0" smtClean="0">
-                <a:solidFill>
-                  <a:schemeClr val="tx1"/>
-                </a:solidFill>
-                <a:effectLst/>
-                <a:latin typeface="+mn-lt"/>
-                <a:ea typeface="+mn-ea"/>
-                <a:cs typeface="+mn-cs"/>
-              </a:rPr>
-              <a:t>La forma elegida para trabajar ha sido la de crear una rama master, una rama desarrollo y varias ramas individuales para trabajar cada uno sobre nuestra rama e ir integrándolas sobre la rama desarrolla y una vez esta testeado integrarlo en la master.</a:t>
-            </a:r>
-          </a:p>
-          <a:p>
-            <a:pPr marL="0" marR="0" lvl="0" indent="0" algn="l" defTabSz="914400" rtl="0" eaLnBrk="1" fontAlgn="auto" latinLnBrk="0" hangingPunct="1">
-              <a:lnSpc>
-                <a:spcPct val="100000"/>
-              </a:lnSpc>
-              <a:spcBef>
-                <a:spcPts val="0"/>
-              </a:spcBef>
-              <a:spcAft>
-                <a:spcPts val="0"/>
-              </a:spcAft>
-              <a:buClrTx/>
-              <a:buSzTx/>
-              <a:buFontTx/>
-              <a:buNone/>
-              <a:tabLst/>
-              <a:defRPr/>
-            </a:pPr>
-            <a:endParaRPr lang="es-ES_tradnl" sz="1200" kern="1200" dirty="0" smtClean="0">
-              <a:solidFill>
-                <a:schemeClr val="tx1"/>
-              </a:solidFill>
-              <a:effectLst/>
-              <a:latin typeface="+mn-lt"/>
-              <a:ea typeface="+mn-ea"/>
-              <a:cs typeface="+mn-cs"/>
-            </a:endParaRPr>
-          </a:p>
-          <a:p>
-            <a:pPr marL="0" marR="0" lvl="0" indent="0" algn="l" defTabSz="914400" rtl="0" eaLnBrk="1" fontAlgn="auto" latinLnBrk="0" hangingPunct="1">
-              <a:lnSpc>
-                <a:spcPct val="100000"/>
-              </a:lnSpc>
-              <a:spcBef>
-                <a:spcPts val="0"/>
-              </a:spcBef>
-              <a:spcAft>
-                <a:spcPts val="0"/>
-              </a:spcAft>
-              <a:buClrTx/>
-              <a:buSzTx/>
-              <a:buFontTx/>
-              <a:buNone/>
-              <a:tabLst/>
-              <a:defRPr/>
-            </a:pPr>
-            <a:r>
-              <a:rPr lang="es-ES_tradnl" sz="1200" kern="1200" dirty="0" smtClean="0">
-                <a:solidFill>
-                  <a:schemeClr val="tx1"/>
-                </a:solidFill>
-                <a:effectLst/>
-                <a:latin typeface="+mn-lt"/>
-                <a:ea typeface="+mn-ea"/>
-                <a:cs typeface="+mn-cs"/>
-              </a:rPr>
-              <a:t> El control de versiones te permite tener un absoluto control sobre las diferentes versiones del software y te permite volver atrás y deshacer errores con gran facilidad manteniendo </a:t>
-            </a:r>
-            <a:r>
-              <a:rPr lang="es-ES_tradnl" sz="1200" kern="1200" dirty="0" err="1" smtClean="0">
-                <a:solidFill>
-                  <a:schemeClr val="tx1"/>
-                </a:solidFill>
-                <a:effectLst/>
-                <a:latin typeface="+mn-lt"/>
-                <a:ea typeface="+mn-ea"/>
-                <a:cs typeface="+mn-cs"/>
-              </a:rPr>
-              <a:t>asi</a:t>
-            </a:r>
-            <a:r>
-              <a:rPr lang="es-ES_tradnl" sz="1200" kern="1200" baseline="0" dirty="0" smtClean="0">
-                <a:solidFill>
-                  <a:schemeClr val="tx1"/>
-                </a:solidFill>
-                <a:effectLst/>
-                <a:latin typeface="+mn-lt"/>
-                <a:ea typeface="+mn-ea"/>
-                <a:cs typeface="+mn-cs"/>
-              </a:rPr>
-              <a:t> </a:t>
-            </a:r>
-            <a:r>
-              <a:rPr lang="es-ES_tradnl" sz="1200" kern="1200" dirty="0" smtClean="0">
-                <a:solidFill>
-                  <a:schemeClr val="tx1"/>
-                </a:solidFill>
-                <a:effectLst/>
-                <a:latin typeface="+mn-lt"/>
-                <a:ea typeface="+mn-ea"/>
-                <a:cs typeface="+mn-cs"/>
-              </a:rPr>
-              <a:t>un orden sin volverte loco.</a:t>
-            </a:r>
-          </a:p>
-          <a:p>
-            <a:pPr marL="0" marR="0" lvl="0" indent="0" algn="l" defTabSz="914400" rtl="0" eaLnBrk="1" fontAlgn="auto" latinLnBrk="0" hangingPunct="1">
-              <a:lnSpc>
-                <a:spcPct val="100000"/>
-              </a:lnSpc>
-              <a:spcBef>
-                <a:spcPts val="0"/>
-              </a:spcBef>
-              <a:spcAft>
-                <a:spcPts val="0"/>
-              </a:spcAft>
-              <a:buClrTx/>
-              <a:buSzTx/>
-              <a:buFontTx/>
-              <a:buNone/>
-              <a:tabLst/>
-              <a:defRPr/>
-            </a:pPr>
-            <a:endParaRPr lang="es-ES_tradnl" sz="1200" kern="1200" dirty="0" smtClean="0">
-              <a:solidFill>
-                <a:schemeClr val="tx1"/>
-              </a:solidFill>
-              <a:effectLst/>
-              <a:latin typeface="+mn-lt"/>
-              <a:ea typeface="+mn-ea"/>
-              <a:cs typeface="+mn-cs"/>
-            </a:endParaRPr>
-          </a:p>
-          <a:p>
-            <a:pPr marL="0" marR="0" lvl="0" indent="0" algn="l" defTabSz="914400" rtl="0" eaLnBrk="1" fontAlgn="auto" latinLnBrk="0" hangingPunct="1">
-              <a:lnSpc>
-                <a:spcPct val="100000"/>
-              </a:lnSpc>
-              <a:spcBef>
-                <a:spcPts val="0"/>
-              </a:spcBef>
-              <a:spcAft>
-                <a:spcPts val="0"/>
-              </a:spcAft>
-              <a:buClrTx/>
-              <a:buSzTx/>
-              <a:buFontTx/>
-              <a:buNone/>
-              <a:tabLst/>
-              <a:defRPr/>
-            </a:pPr>
-            <a:endParaRPr lang="es-ES" sz="1200" kern="1200" dirty="0" smtClean="0">
-              <a:solidFill>
-                <a:schemeClr val="tx1"/>
-              </a:solidFill>
-              <a:effectLst/>
-              <a:latin typeface="+mn-lt"/>
-              <a:ea typeface="+mn-ea"/>
-              <a:cs typeface="+mn-cs"/>
-            </a:endParaRPr>
-          </a:p>
-          <a:p>
-            <a:endParaRPr lang="es-ES" dirty="0"/>
-          </a:p>
-        </p:txBody>
-      </p:sp>
-      <p:sp>
-        <p:nvSpPr>
-          <p:cNvPr id="4" name="Marcador de número de diapositiva 3"/>
-          <p:cNvSpPr>
-            <a:spLocks noGrp="1"/>
-          </p:cNvSpPr>
-          <p:nvPr>
-            <p:ph type="sldNum" sz="quarter" idx="10"/>
-          </p:nvPr>
-        </p:nvSpPr>
-        <p:spPr/>
-        <p:txBody>
-          <a:bodyPr/>
-          <a:lstStyle/>
-          <a:p>
-            <a:fld id="{DB7D0A05-FF74-4049-BC13-A9ACD9D2AB82}" type="slidenum">
-              <a:rPr lang="es-ES" smtClean="0"/>
-              <a:t>28</a:t>
-            </a:fld>
-            <a:endParaRPr lang="es-ES"/>
-          </a:p>
-        </p:txBody>
-      </p:sp>
-    </p:spTree>
-    <p:extLst>
-      <p:ext uri="{BB962C8B-B14F-4D97-AF65-F5344CB8AC3E}">
-        <p14:creationId xmlns:p14="http://schemas.microsoft.com/office/powerpoint/2010/main" val="4061869060"/>
       </p:ext>
     </p:extLst>
   </p:cSld>
@@ -4103,23 +3920,18 @@
           <a:bodyPr/>
           <a:lstStyle/>
           <a:p>
-            <a:pPr marL="0" marR="0" lvl="0" indent="0" algn="l" defTabSz="914400" rtl="0" eaLnBrk="1" fontAlgn="auto" latinLnBrk="0" hangingPunct="1">
-              <a:lnSpc>
-                <a:spcPct val="100000"/>
-              </a:lnSpc>
-              <a:spcBef>
-                <a:spcPts val="0"/>
-              </a:spcBef>
-              <a:spcAft>
-                <a:spcPts val="0"/>
-              </a:spcAft>
-              <a:buClrTx/>
-              <a:buSzTx/>
-              <a:buFontTx/>
-              <a:buNone/>
-              <a:tabLst/>
-              <a:defRPr/>
-            </a:pPr>
+            <a:r>
+              <a:rPr lang="es-ES_tradnl" sz="1200" kern="1200" dirty="0" err="1" smtClean="0">
+                <a:solidFill>
+                  <a:schemeClr val="tx1"/>
+                </a:solidFill>
+                <a:effectLst/>
+                <a:latin typeface="+mn-lt"/>
+                <a:ea typeface="+mn-ea"/>
+                <a:cs typeface="+mn-cs"/>
+              </a:rPr>
+              <a:t>Github</a:t>
+            </a:r>
             <a:r>
               <a:rPr lang="es-ES_tradnl" sz="1200" kern="1200" dirty="0" smtClean="0">
                 <a:solidFill>
@@ -4130,55 +3942,20 @@
                 <a:ea typeface="+mn-ea"/>
                 <a:cs typeface="+mn-cs"/>
               </a:rPr>
-              <a:t>Puedes trabajar con GITHUB mediante la consola de GIT y tener acceso a todas los comandos o para familiarizarte y aprender las funciones más básicas (como es nuestro caso ya que no tenemos que hacer uso de comandos avanzados) usar el cliente de escritorio, que es tremendamente sencillo y fácil de usar.</a:t>
-            </a:r>
-          </a:p>
-          <a:p>
-            <a:pPr marL="0" marR="0" lvl="0" indent="0" algn="l" defTabSz="914400" rtl="0" eaLnBrk="1" fontAlgn="auto" latinLnBrk="0" hangingPunct="1">
-              <a:lnSpc>
-                <a:spcPct val="100000"/>
-              </a:lnSpc>
-              <a:spcBef>
-                <a:spcPts val="0"/>
-              </a:spcBef>
-              <a:spcAft>
-                <a:spcPts val="0"/>
-              </a:spcAft>
-              <a:buClrTx/>
-              <a:buSzTx/>
-              <a:buFontTx/>
-              <a:buNone/>
-              <a:tabLst/>
-              <a:defRPr/>
-            </a:pPr>
-            <a:endParaRPr lang="es-ES_tradnl" sz="1200" kern="1200" dirty="0" smtClean="0">
-              <a:solidFill>
-                <a:schemeClr val="tx1"/>
-              </a:solidFill>
-              <a:effectLst/>
-              <a:latin typeface="+mn-lt"/>
-              <a:ea typeface="+mn-ea"/>
-              <a:cs typeface="+mn-cs"/>
-            </a:endParaRPr>
-          </a:p>
-          <a:p>
-            <a:pPr marL="0" marR="0" lvl="0" indent="0" algn="l" defTabSz="914400" rtl="0" eaLnBrk="1" fontAlgn="auto" latinLnBrk="0" hangingPunct="1">
-              <a:lnSpc>
-                <a:spcPct val="100000"/>
-              </a:lnSpc>
-              <a:spcBef>
-                <a:spcPts val="0"/>
-              </a:spcBef>
-              <a:spcAft>
-                <a:spcPts val="0"/>
-              </a:spcAft>
-              <a:buClrTx/>
-              <a:buSzTx/>
-              <a:buFontTx/>
-              <a:buNone/>
-              <a:tabLst/>
-              <a:defRPr/>
-            </a:pPr>
+              <a:t> es la comunidad/red social de los programadores por excelencia y está basado en el software de control de versiones GIT, creado por </a:t>
+            </a:r>
+            <a:r>
+              <a:rPr lang="es-ES_tradnl" sz="1200" kern="1200" dirty="0" err="1" smtClean="0">
+                <a:solidFill>
+                  <a:schemeClr val="tx1"/>
+                </a:solidFill>
+                <a:effectLst/>
+                <a:latin typeface="+mn-lt"/>
+                <a:ea typeface="+mn-ea"/>
+                <a:cs typeface="+mn-cs"/>
+              </a:rPr>
+              <a:t>Linus</a:t>
+            </a:r>
             <a:r>
               <a:rPr lang="es-ES_tradnl" sz="1200" kern="1200" dirty="0" smtClean="0">
                 <a:solidFill>
@@ -4189,7 +3966,7 @@
                 <a:ea typeface="+mn-ea"/>
                 <a:cs typeface="+mn-cs"/>
               </a:rPr>
-              <a:t>A simple vista podemos ver cómo podemos elegir las ramas, descargarnos la última versión del código, hacer </a:t>
+              <a:t> </a:t>
             </a:r>
             <a:r>
               <a:rPr lang="es-ES_tradnl" sz="1200" kern="1200" dirty="0" err="1" smtClean="0">
@@ -4201,7 +3978,7 @@
                 <a:ea typeface="+mn-ea"/>
                 <a:cs typeface="+mn-cs"/>
               </a:rPr>
-              <a:t>commit</a:t>
+              <a:t>Torvalds</a:t>
             </a:r>
             <a:r>
               <a:rPr lang="es-ES_tradnl" sz="1200" kern="1200" dirty="0" smtClean="0">
@@ -4213,32 +3990,10 @@
                 <a:ea typeface="+mn-ea"/>
                 <a:cs typeface="+mn-cs"/>
               </a:rPr>
-              <a:t> de los cambios, hacer </a:t>
-            </a:r>
-            <a:r>
-              <a:rPr lang="es-ES_tradnl" sz="1200" kern="1200" dirty="0" err="1" smtClean="0">
-                <a:solidFill>
-                  <a:schemeClr val="tx1"/>
-                </a:solidFill>
-                <a:effectLst/>
-                <a:latin typeface="+mn-lt"/>
-                <a:ea typeface="+mn-ea"/>
-                <a:cs typeface="+mn-cs"/>
-              </a:rPr>
-              <a:t>merge</a:t>
-            </a:r>
-            <a:r>
-              <a:rPr lang="es-ES_tradnl" sz="1200" kern="1200" dirty="0" smtClean="0">
-                <a:solidFill>
-                  <a:schemeClr val="tx1"/>
-                </a:solidFill>
-                <a:effectLst/>
-                <a:latin typeface="+mn-lt"/>
-                <a:ea typeface="+mn-ea"/>
-                <a:cs typeface="+mn-cs"/>
-              </a:rPr>
-              <a:t> de ramas, subir los cambios al repositorio remoto…etc.</a:t>
-            </a:r>
+              <a:t>.</a:t>
+            </a:r>
+          </a:p>
+          <a:p>
             <a:endParaRPr lang="es-ES" sz="1200" kern="1200" dirty="0" smtClean="0">
               <a:solidFill>
                 <a:schemeClr val="tx1"/>
@@ -4250,23 +4005,18 @@
             </a:endParaRPr>
           </a:p>
           <a:p>
-            <a:pPr marL="0" marR="0" lvl="0" indent="0" algn="l" defTabSz="914400" rtl="0" eaLnBrk="1" fontAlgn="auto" latinLnBrk="0" hangingPunct="1">
-              <a:lnSpc>
-                <a:spcPct val="100000"/>
-              </a:lnSpc>
-              <a:spcBef>
-                <a:spcPts val="0"/>
-              </a:spcBef>
-              <a:spcAft>
-                <a:spcPts val="0"/>
-              </a:spcAft>
-              <a:buClrTx/>
-              <a:buSzTx/>
-              <a:buFontTx/>
-              <a:buNone/>
-              <a:tabLst/>
-              <a:defRPr/>
-            </a:pPr>
+            <a:r>
+              <a:rPr lang="es-ES_tradnl" sz="1200" kern="1200" dirty="0" smtClean="0">
+                <a:solidFill>
+                  <a:schemeClr val="tx1"/>
+                </a:solidFill>
+                <a:effectLst/>
+                <a:latin typeface="+mn-lt"/>
+                <a:ea typeface="+mn-ea"/>
+                <a:cs typeface="+mn-cs"/>
+              </a:rPr>
+              <a:t>Para nuestro proyecto hemos decido usar control de versiones para familiarizarnos con esta herramienta absolutamente imprescindible y fundamental en el mundo del desarrollo.</a:t>
+            </a:r>
             <a:endParaRPr lang="es-ES" sz="1200" kern="1200" dirty="0" smtClean="0">
               <a:solidFill>
                 <a:schemeClr val="tx1"/>
@@ -4308,7 +4058,7 @@
     </p:spTree>
     <p:extLst>
       <p:ext uri="{BB962C8B-B14F-4D97-AF65-F5344CB8AC3E}">
-        <p14:creationId xmlns:p14="http://schemas.microsoft.com/office/powerpoint/2010/main" val="3972647194"/>
+        <p14:creationId xmlns:p14="http://schemas.microsoft.com/office/powerpoint/2010/main" val="2480262944"/>
       </p:ext>
     </p:extLst>
   </p:cSld>
@@ -4526,14 +4276,366 @@
           <a:bodyPr/>
           <a:lstStyle/>
           <a:p>
-            <a:r>
-              <a:rPr lang="es-ES" dirty="0" smtClean="0"/>
-              <a:t>Y bueno, ya para finalizar pues así es como nos imaginábamos nuestra aplicación</a:t>
-            </a:r>
-            <a:r>
-              <a:rPr lang="es-ES" baseline="0" dirty="0" smtClean="0"/>
-              <a:t> web.</a:t>
-            </a:r>
+            <a:pPr marL="0" marR="0" lvl="0" indent="0" algn="l" defTabSz="914400" rtl="0" eaLnBrk="1" fontAlgn="auto" latinLnBrk="0" hangingPunct="1">
+              <a:lnSpc>
+                <a:spcPct val="100000"/>
+              </a:lnSpc>
+              <a:spcBef>
+                <a:spcPts val="0"/>
+              </a:spcBef>
+              <a:spcAft>
+                <a:spcPts val="0"/>
+              </a:spcAft>
+              <a:buClrTx/>
+              <a:buSzTx/>
+              <a:buFontTx/>
+              <a:buNone/>
+              <a:tabLst/>
+              <a:defRPr/>
+            </a:pPr>
+            <a:r>
+              <a:rPr lang="es-ES_tradnl" sz="1200" kern="1200" dirty="0" smtClean="0">
+                <a:solidFill>
+                  <a:schemeClr val="tx1"/>
+                </a:solidFill>
+                <a:effectLst/>
+                <a:latin typeface="+mn-lt"/>
+                <a:ea typeface="+mn-ea"/>
+                <a:cs typeface="+mn-cs"/>
+              </a:rPr>
+              <a:t>Creamos un repositorio para el proyecto, en el cual los integrantes del equipo de desarrollo podemos programar simultáneamente al disponer siempre de las versiones actualizadas de los códigos.</a:t>
+            </a:r>
+          </a:p>
+          <a:p>
+            <a:pPr marL="0" marR="0" lvl="0" indent="0" algn="l" defTabSz="914400" rtl="0" eaLnBrk="1" fontAlgn="auto" latinLnBrk="0" hangingPunct="1">
+              <a:lnSpc>
+                <a:spcPct val="100000"/>
+              </a:lnSpc>
+              <a:spcBef>
+                <a:spcPts val="0"/>
+              </a:spcBef>
+              <a:spcAft>
+                <a:spcPts val="0"/>
+              </a:spcAft>
+              <a:buClrTx/>
+              <a:buSzTx/>
+              <a:buFontTx/>
+              <a:buNone/>
+              <a:tabLst/>
+              <a:defRPr/>
+            </a:pPr>
+            <a:endParaRPr lang="es-ES_tradnl" sz="1200" kern="1200" dirty="0" smtClean="0">
+              <a:solidFill>
+                <a:schemeClr val="tx1"/>
+              </a:solidFill>
+              <a:effectLst/>
+              <a:latin typeface="+mn-lt"/>
+              <a:ea typeface="+mn-ea"/>
+              <a:cs typeface="+mn-cs"/>
+            </a:endParaRPr>
+          </a:p>
+          <a:p>
+            <a:pPr marL="0" marR="0" lvl="0" indent="0" algn="l" defTabSz="914400" rtl="0" eaLnBrk="1" fontAlgn="auto" latinLnBrk="0" hangingPunct="1">
+              <a:lnSpc>
+                <a:spcPct val="100000"/>
+              </a:lnSpc>
+              <a:spcBef>
+                <a:spcPts val="0"/>
+              </a:spcBef>
+              <a:spcAft>
+                <a:spcPts val="0"/>
+              </a:spcAft>
+              <a:buClrTx/>
+              <a:buSzTx/>
+              <a:buFontTx/>
+              <a:buNone/>
+              <a:tabLst/>
+              <a:defRPr/>
+            </a:pPr>
+            <a:r>
+              <a:rPr lang="es-ES_tradnl" sz="1200" kern="1200" dirty="0" smtClean="0">
+                <a:solidFill>
+                  <a:schemeClr val="tx1"/>
+                </a:solidFill>
+                <a:effectLst/>
+                <a:latin typeface="+mn-lt"/>
+                <a:ea typeface="+mn-ea"/>
+                <a:cs typeface="+mn-cs"/>
+              </a:rPr>
+              <a:t>Esto es posible gracias a funcionalidades de los software de control de versiones como es la</a:t>
+            </a:r>
+            <a:r>
+              <a:rPr lang="es-ES_tradnl" sz="1200" kern="1200" baseline="0" dirty="0" smtClean="0">
+                <a:solidFill>
+                  <a:schemeClr val="tx1"/>
+                </a:solidFill>
+                <a:effectLst/>
+                <a:latin typeface="+mn-lt"/>
+                <a:ea typeface="+mn-ea"/>
+                <a:cs typeface="+mn-cs"/>
+              </a:rPr>
+              <a:t> </a:t>
+            </a:r>
+            <a:r>
+              <a:rPr lang="es-ES_tradnl" sz="1200" kern="1200" baseline="0" dirty="0" err="1" smtClean="0">
+                <a:solidFill>
+                  <a:schemeClr val="tx1"/>
+                </a:solidFill>
+                <a:effectLst/>
+                <a:latin typeface="+mn-lt"/>
+                <a:ea typeface="+mn-ea"/>
+                <a:cs typeface="+mn-cs"/>
+              </a:rPr>
+              <a:t>operacion</a:t>
+            </a:r>
+            <a:r>
+              <a:rPr lang="es-ES_tradnl" sz="1200" kern="1200" dirty="0" smtClean="0">
+                <a:solidFill>
+                  <a:schemeClr val="tx1"/>
+                </a:solidFill>
+                <a:effectLst/>
+                <a:latin typeface="+mn-lt"/>
+                <a:ea typeface="+mn-ea"/>
+                <a:cs typeface="+mn-cs"/>
+              </a:rPr>
+              <a:t> </a:t>
+            </a:r>
+            <a:r>
+              <a:rPr lang="es-ES_tradnl" sz="1200" kern="1200" dirty="0" err="1" smtClean="0">
+                <a:solidFill>
+                  <a:schemeClr val="tx1"/>
+                </a:solidFill>
+                <a:effectLst/>
+                <a:latin typeface="+mn-lt"/>
+                <a:ea typeface="+mn-ea"/>
+                <a:cs typeface="+mn-cs"/>
+              </a:rPr>
+              <a:t>Merge</a:t>
+            </a:r>
+            <a:r>
+              <a:rPr lang="es-ES_tradnl" sz="1200" kern="1200" dirty="0" smtClean="0">
+                <a:solidFill>
+                  <a:schemeClr val="tx1"/>
+                </a:solidFill>
+                <a:effectLst/>
+                <a:latin typeface="+mn-lt"/>
+                <a:ea typeface="+mn-ea"/>
+                <a:cs typeface="+mn-cs"/>
+              </a:rPr>
+              <a:t> que te permite que varias persones trabajen sobre un mismo código integrando al finalizar de programar las líneas de todo el equipo.</a:t>
+            </a:r>
+          </a:p>
+          <a:p>
+            <a:pPr marL="0" marR="0" lvl="0" indent="0" algn="l" defTabSz="914400" rtl="0" eaLnBrk="1" fontAlgn="auto" latinLnBrk="0" hangingPunct="1">
+              <a:lnSpc>
+                <a:spcPct val="100000"/>
+              </a:lnSpc>
+              <a:spcBef>
+                <a:spcPts val="0"/>
+              </a:spcBef>
+              <a:spcAft>
+                <a:spcPts val="0"/>
+              </a:spcAft>
+              <a:buClrTx/>
+              <a:buSzTx/>
+              <a:buFontTx/>
+              <a:buNone/>
+              <a:tabLst/>
+              <a:defRPr/>
+            </a:pPr>
+            <a:endParaRPr lang="es-ES_tradnl" sz="1200" kern="1200" dirty="0" smtClean="0">
+              <a:solidFill>
+                <a:schemeClr val="tx1"/>
+              </a:solidFill>
+              <a:effectLst/>
+              <a:latin typeface="+mn-lt"/>
+              <a:ea typeface="+mn-ea"/>
+              <a:cs typeface="+mn-cs"/>
+            </a:endParaRPr>
+          </a:p>
+          <a:p>
+            <a:pPr marL="0" marR="0" lvl="0" indent="0" algn="l" defTabSz="914400" rtl="0" eaLnBrk="1" fontAlgn="auto" latinLnBrk="0" hangingPunct="1">
+              <a:lnSpc>
+                <a:spcPct val="100000"/>
+              </a:lnSpc>
+              <a:spcBef>
+                <a:spcPts val="0"/>
+              </a:spcBef>
+              <a:spcAft>
+                <a:spcPts val="0"/>
+              </a:spcAft>
+              <a:buClrTx/>
+              <a:buSzTx/>
+              <a:buFontTx/>
+              <a:buNone/>
+              <a:tabLst/>
+              <a:defRPr/>
+            </a:pPr>
+            <a:r>
+              <a:rPr lang="es-ES_tradnl" sz="1200" kern="1200" dirty="0" smtClean="0">
+                <a:solidFill>
+                  <a:schemeClr val="tx1"/>
+                </a:solidFill>
+                <a:effectLst/>
+                <a:latin typeface="+mn-lt"/>
+                <a:ea typeface="+mn-ea"/>
+                <a:cs typeface="+mn-cs"/>
+              </a:rPr>
+              <a:t>La forma elegida para trabajar ha sido la de crear una rama master, una rama desarrollo y varias ramas individuales para trabajar cada uno sobre nuestra rama e ir integrándolas sobre la rama desarrolla y una vez esta testeado integrarlo en la master.</a:t>
+            </a:r>
+          </a:p>
+          <a:p>
+            <a:pPr marL="0" marR="0" lvl="0" indent="0" algn="l" defTabSz="914400" rtl="0" eaLnBrk="1" fontAlgn="auto" latinLnBrk="0" hangingPunct="1">
+              <a:lnSpc>
+                <a:spcPct val="100000"/>
+              </a:lnSpc>
+              <a:spcBef>
+                <a:spcPts val="0"/>
+              </a:spcBef>
+              <a:spcAft>
+                <a:spcPts val="0"/>
+              </a:spcAft>
+              <a:buClrTx/>
+              <a:buSzTx/>
+              <a:buFontTx/>
+              <a:buNone/>
+              <a:tabLst/>
+              <a:defRPr/>
+            </a:pPr>
+            <a:endParaRPr lang="es-ES_tradnl" sz="1200" kern="1200" dirty="0" smtClean="0">
+              <a:solidFill>
+                <a:schemeClr val="tx1"/>
+              </a:solidFill>
+              <a:effectLst/>
+              <a:latin typeface="+mn-lt"/>
+              <a:ea typeface="+mn-ea"/>
+              <a:cs typeface="+mn-cs"/>
+            </a:endParaRPr>
+          </a:p>
+          <a:p>
+            <a:pPr marL="0" marR="0" lvl="0" indent="0" algn="l" defTabSz="914400" rtl="0" eaLnBrk="1" fontAlgn="auto" latinLnBrk="0" hangingPunct="1">
+              <a:lnSpc>
+                <a:spcPct val="100000"/>
+              </a:lnSpc>
+              <a:spcBef>
+                <a:spcPts val="0"/>
+              </a:spcBef>
+              <a:spcAft>
+                <a:spcPts val="0"/>
+              </a:spcAft>
+              <a:buClrTx/>
+              <a:buSzTx/>
+              <a:buFontTx/>
+              <a:buNone/>
+              <a:tabLst/>
+              <a:defRPr/>
+            </a:pPr>
+            <a:r>
+              <a:rPr lang="es-ES_tradnl" sz="1200" kern="1200" dirty="0" smtClean="0">
+                <a:solidFill>
+                  <a:schemeClr val="tx1"/>
+                </a:solidFill>
+                <a:effectLst/>
+                <a:latin typeface="+mn-lt"/>
+                <a:ea typeface="+mn-ea"/>
+                <a:cs typeface="+mn-cs"/>
+              </a:rPr>
+              <a:t> El control de versiones te permite tener un absoluto control sobre las diferentes versiones del software y te permite volver atrás y deshacer errores con gran facilidad manteniendo </a:t>
+            </a:r>
+            <a:r>
+              <a:rPr lang="es-ES_tradnl" sz="1200" kern="1200" dirty="0" err="1" smtClean="0">
+                <a:solidFill>
+                  <a:schemeClr val="tx1"/>
+                </a:solidFill>
+                <a:effectLst/>
+                <a:latin typeface="+mn-lt"/>
+                <a:ea typeface="+mn-ea"/>
+                <a:cs typeface="+mn-cs"/>
+              </a:rPr>
+              <a:t>asi</a:t>
+            </a:r>
+            <a:r>
+              <a:rPr lang="es-ES_tradnl" sz="1200" kern="1200" baseline="0" dirty="0" smtClean="0">
+                <a:solidFill>
+                  <a:schemeClr val="tx1"/>
+                </a:solidFill>
+                <a:effectLst/>
+                <a:latin typeface="+mn-lt"/>
+                <a:ea typeface="+mn-ea"/>
+                <a:cs typeface="+mn-cs"/>
+              </a:rPr>
+              <a:t> </a:t>
+            </a:r>
+            <a:r>
+              <a:rPr lang="es-ES_tradnl" sz="1200" kern="1200" dirty="0" smtClean="0">
+                <a:solidFill>
+                  <a:schemeClr val="tx1"/>
+                </a:solidFill>
+                <a:effectLst/>
+                <a:latin typeface="+mn-lt"/>
+                <a:ea typeface="+mn-ea"/>
+                <a:cs typeface="+mn-cs"/>
+              </a:rPr>
+              <a:t>un orden sin volverte loco.</a:t>
+            </a:r>
+          </a:p>
+          <a:p>
+            <a:pPr marL="0" marR="0" lvl="0" indent="0" algn="l" defTabSz="914400" rtl="0" eaLnBrk="1" fontAlgn="auto" latinLnBrk="0" hangingPunct="1">
+              <a:lnSpc>
+                <a:spcPct val="100000"/>
+              </a:lnSpc>
+              <a:spcBef>
+                <a:spcPts val="0"/>
+              </a:spcBef>
+              <a:spcAft>
+                <a:spcPts val="0"/>
+              </a:spcAft>
+              <a:buClrTx/>
+              <a:buSzTx/>
+              <a:buFontTx/>
+              <a:buNone/>
+              <a:tabLst/>
+              <a:defRPr/>
+            </a:pPr>
+            <a:endParaRPr lang="es-ES_tradnl" sz="1200" kern="1200" dirty="0" smtClean="0">
+              <a:solidFill>
+                <a:schemeClr val="tx1"/>
+              </a:solidFill>
+              <a:effectLst/>
+              <a:latin typeface="+mn-lt"/>
+              <a:ea typeface="+mn-ea"/>
+              <a:cs typeface="+mn-cs"/>
+            </a:endParaRPr>
+          </a:p>
+          <a:p>
+            <a:pPr marL="0" marR="0" lvl="0" indent="0" algn="l" defTabSz="914400" rtl="0" eaLnBrk="1" fontAlgn="auto" latinLnBrk="0" hangingPunct="1">
+              <a:lnSpc>
+                <a:spcPct val="100000"/>
+              </a:lnSpc>
+              <a:spcBef>
+                <a:spcPts val="0"/>
+              </a:spcBef>
+              <a:spcAft>
+                <a:spcPts val="0"/>
+              </a:spcAft>
+              <a:buClrTx/>
+              <a:buSzTx/>
+              <a:buFontTx/>
+              <a:buNone/>
+              <a:tabLst/>
+              <a:defRPr/>
+            </a:pPr>
+            <a:endParaRPr lang="es-ES" sz="1200" kern="1200" dirty="0" smtClean="0">
+              <a:solidFill>
+                <a:schemeClr val="tx1"/>
+              </a:solidFill>
+              <a:effectLst/>
+              <a:latin typeface="+mn-lt"/>
+              <a:ea typeface="+mn-ea"/>
+              <a:cs typeface="+mn-cs"/>
+            </a:endParaRPr>
+          </a:p>
+          <a:p>
             <a:endParaRPr lang="es-ES" dirty="0"/>
           </a:p>
         </p:txBody>
@@ -4564,7 +4666,7 @@
     </p:spTree>
     <p:extLst>
       <p:ext uri="{BB962C8B-B14F-4D97-AF65-F5344CB8AC3E}">
-        <p14:creationId xmlns:p14="http://schemas.microsoft.com/office/powerpoint/2010/main" val="3540851105"/>
+        <p14:creationId xmlns:p14="http://schemas.microsoft.com/office/powerpoint/2010/main" val="4061869060"/>
       </p:ext>
     </p:extLst>
   </p:cSld>
@@ -4618,18 +4720,181 @@
           <a:bodyPr/>
           <a:lstStyle/>
           <a:p>
-            <a:r>
-              <a:rPr lang="es-ES" dirty="0" smtClean="0"/>
-              <a:t>Y </a:t>
-            </a:r>
-            <a:r>
-              <a:rPr lang="es-ES" dirty="0" err="1" smtClean="0"/>
-              <a:t>asi</a:t>
-            </a:r>
-            <a:r>
-              <a:rPr lang="es-ES" dirty="0" smtClean="0"/>
-              <a:t> es como la hemos conseguido.</a:t>
-            </a:r>
+            <a:pPr marL="0" marR="0" lvl="0" indent="0" algn="l" defTabSz="914400" rtl="0" eaLnBrk="1" fontAlgn="auto" latinLnBrk="0" hangingPunct="1">
+              <a:lnSpc>
+                <a:spcPct val="100000"/>
+              </a:lnSpc>
+              <a:spcBef>
+                <a:spcPts val="0"/>
+              </a:spcBef>
+              <a:spcAft>
+                <a:spcPts val="0"/>
+              </a:spcAft>
+              <a:buClrTx/>
+              <a:buSzTx/>
+              <a:buFontTx/>
+              <a:buNone/>
+              <a:tabLst/>
+              <a:defRPr/>
+            </a:pPr>
+            <a:r>
+              <a:rPr lang="es-ES_tradnl" sz="1200" kern="1200" dirty="0" smtClean="0">
+                <a:solidFill>
+                  <a:schemeClr val="tx1"/>
+                </a:solidFill>
+                <a:effectLst/>
+                <a:latin typeface="+mn-lt"/>
+                <a:ea typeface="+mn-ea"/>
+                <a:cs typeface="+mn-cs"/>
+              </a:rPr>
+              <a:t>Puedes trabajar con GITHUB mediante la consola de GIT y tener acceso a todas los comandos o para familiarizarte y aprender las funciones más básicas (como es nuestro caso ya que no tenemos que hacer uso de comandos avanzados) usar el cliente de escritorio, que es tremendamente sencillo y fácil de usar.</a:t>
+            </a:r>
+          </a:p>
+          <a:p>
+            <a:pPr marL="0" marR="0" lvl="0" indent="0" algn="l" defTabSz="914400" rtl="0" eaLnBrk="1" fontAlgn="auto" latinLnBrk="0" hangingPunct="1">
+              <a:lnSpc>
+                <a:spcPct val="100000"/>
+              </a:lnSpc>
+              <a:spcBef>
+                <a:spcPts val="0"/>
+              </a:spcBef>
+              <a:spcAft>
+                <a:spcPts val="0"/>
+              </a:spcAft>
+              <a:buClrTx/>
+              <a:buSzTx/>
+              <a:buFontTx/>
+              <a:buNone/>
+              <a:tabLst/>
+              <a:defRPr/>
+            </a:pPr>
+            <a:endParaRPr lang="es-ES_tradnl" sz="1200" kern="1200" dirty="0" smtClean="0">
+              <a:solidFill>
+                <a:schemeClr val="tx1"/>
+              </a:solidFill>
+              <a:effectLst/>
+              <a:latin typeface="+mn-lt"/>
+              <a:ea typeface="+mn-ea"/>
+              <a:cs typeface="+mn-cs"/>
+            </a:endParaRPr>
+          </a:p>
+          <a:p>
+            <a:pPr marL="0" marR="0" lvl="0" indent="0" algn="l" defTabSz="914400" rtl="0" eaLnBrk="1" fontAlgn="auto" latinLnBrk="0" hangingPunct="1">
+              <a:lnSpc>
+                <a:spcPct val="100000"/>
+              </a:lnSpc>
+              <a:spcBef>
+                <a:spcPts val="0"/>
+              </a:spcBef>
+              <a:spcAft>
+                <a:spcPts val="0"/>
+              </a:spcAft>
+              <a:buClrTx/>
+              <a:buSzTx/>
+              <a:buFontTx/>
+              <a:buNone/>
+              <a:tabLst/>
+              <a:defRPr/>
+            </a:pPr>
+            <a:r>
+              <a:rPr lang="es-ES_tradnl" sz="1200" kern="1200" dirty="0" smtClean="0">
+                <a:solidFill>
+                  <a:schemeClr val="tx1"/>
+                </a:solidFill>
+                <a:effectLst/>
+                <a:latin typeface="+mn-lt"/>
+                <a:ea typeface="+mn-ea"/>
+                <a:cs typeface="+mn-cs"/>
+              </a:rPr>
+              <a:t>A simple vista podemos ver cómo podemos elegir las ramas, descargarnos la última versión del código, hacer </a:t>
+            </a:r>
+            <a:r>
+              <a:rPr lang="es-ES_tradnl" sz="1200" kern="1200" dirty="0" err="1" smtClean="0">
+                <a:solidFill>
+                  <a:schemeClr val="tx1"/>
+                </a:solidFill>
+                <a:effectLst/>
+                <a:latin typeface="+mn-lt"/>
+                <a:ea typeface="+mn-ea"/>
+                <a:cs typeface="+mn-cs"/>
+              </a:rPr>
+              <a:t>commit</a:t>
+            </a:r>
+            <a:r>
+              <a:rPr lang="es-ES_tradnl" sz="1200" kern="1200" dirty="0" smtClean="0">
+                <a:solidFill>
+                  <a:schemeClr val="tx1"/>
+                </a:solidFill>
+                <a:effectLst/>
+                <a:latin typeface="+mn-lt"/>
+                <a:ea typeface="+mn-ea"/>
+                <a:cs typeface="+mn-cs"/>
+              </a:rPr>
+              <a:t> de los cambios, hacer </a:t>
+            </a:r>
+            <a:r>
+              <a:rPr lang="es-ES_tradnl" sz="1200" kern="1200" dirty="0" err="1" smtClean="0">
+                <a:solidFill>
+                  <a:schemeClr val="tx1"/>
+                </a:solidFill>
+                <a:effectLst/>
+                <a:latin typeface="+mn-lt"/>
+                <a:ea typeface="+mn-ea"/>
+                <a:cs typeface="+mn-cs"/>
+              </a:rPr>
+              <a:t>merge</a:t>
+            </a:r>
+            <a:r>
+              <a:rPr lang="es-ES_tradnl" sz="1200" kern="1200" dirty="0" smtClean="0">
+                <a:solidFill>
+                  <a:schemeClr val="tx1"/>
+                </a:solidFill>
+                <a:effectLst/>
+                <a:latin typeface="+mn-lt"/>
+                <a:ea typeface="+mn-ea"/>
+                <a:cs typeface="+mn-cs"/>
+              </a:rPr>
+              <a:t> de ramas, subir los cambios al repositorio remoto…etc.</a:t>
+            </a:r>
+            <a:endParaRPr lang="es-ES" sz="1200" kern="1200" dirty="0" smtClean="0">
+              <a:solidFill>
+                <a:schemeClr val="tx1"/>
+              </a:solidFill>
+              <a:effectLst/>
+              <a:latin typeface="+mn-lt"/>
+              <a:ea typeface="+mn-ea"/>
+              <a:cs typeface="+mn-cs"/>
+            </a:endParaRPr>
+          </a:p>
+          <a:p>
+            <a:pPr marL="0" marR="0" lvl="0" indent="0" algn="l" defTabSz="914400" rtl="0" eaLnBrk="1" fontAlgn="auto" latinLnBrk="0" hangingPunct="1">
+              <a:lnSpc>
+                <a:spcPct val="100000"/>
+              </a:lnSpc>
+              <a:spcBef>
+                <a:spcPts val="0"/>
+              </a:spcBef>
+              <a:spcAft>
+                <a:spcPts val="0"/>
+              </a:spcAft>
+              <a:buClrTx/>
+              <a:buSzTx/>
+              <a:buFontTx/>
+              <a:buNone/>
+              <a:tabLst/>
+              <a:defRPr/>
+            </a:pPr>
+            <a:endParaRPr lang="es-ES" sz="1200" kern="1200" dirty="0" smtClean="0">
+              <a:solidFill>
+                <a:schemeClr val="tx1"/>
+              </a:solidFill>
+              <a:effectLst/>
+              <a:latin typeface="+mn-lt"/>
+              <a:ea typeface="+mn-ea"/>
+              <a:cs typeface="+mn-cs"/>
+            </a:endParaRPr>
+          </a:p>
+          <a:p>
             <a:endParaRPr lang="es-ES" dirty="0"/>
           </a:p>
         </p:txBody>
@@ -4660,7 +4925,7 @@
     </p:spTree>
     <p:extLst>
       <p:ext uri="{BB962C8B-B14F-4D97-AF65-F5344CB8AC3E}">
-        <p14:creationId xmlns:p14="http://schemas.microsoft.com/office/powerpoint/2010/main" val="124897716"/>
+        <p14:creationId xmlns:p14="http://schemas.microsoft.com/office/powerpoint/2010/main" val="3972647194"/>
       </p:ext>
     </p:extLst>
   </p:cSld>
@@ -4716,11 +4981,11 @@
           <a:p>
             <a:r>
               <a:rPr lang="es-ES" dirty="0" smtClean="0"/>
-              <a:t>Muchas gracias a todos y a continuación</a:t>
+              <a:t>Y bueno, ya para finalizar pues así es como nos imaginábamos nuestra aplicación</a:t>
             </a:r>
             <a:r>
               <a:rPr lang="es-ES" baseline="0" dirty="0" smtClean="0"/>
-              <a:t> vamos a ver la web en funcionamiento con una pequeña demo.</a:t>
+              <a:t> web.</a:t>
             </a:r>
             <a:endParaRPr lang="es-ES" dirty="0"/>
           </a:p>
@@ -4744,6 +5009,194 @@
             <a:fld id="{DB7D0A05-FF74-4049-BC13-A9ACD9D2AB82}" type="slidenum">
               <a:rPr lang="es-ES" smtClean="0"/>
               <a:t>32</a:t>
+            </a:fld>
+            <a:endParaRPr lang="es-ES"/>
+          </a:p>
+        </p:txBody>
+      </p:sp>
+    </p:spTree>
+    <p:extLst>
+      <p:ext uri="{BB962C8B-B14F-4D97-AF65-F5344CB8AC3E}">
+        <p14:creationId xmlns:p14="http://schemas.microsoft.com/office/powerpoint/2010/main" val="3540851105"/>
+      </p:ext>
+    </p:extLst>
+  </p:cSld>
+  <p:clrMapOvr>
+    <a:masterClrMapping/>
+  </p:clrMapOvr>
+</p:notes>
+</file>
+
+<file path=ppt/notesSlides/notesSlide33.xml><?xml version="1.0" encoding="utf-8"?>
+<p:notes xmlns:a="http://schemas.openxmlformats.org/drawingml/2006/main" xmlns:r="http://schemas.openxmlformats.org/officeDocument/2006/relationships" xmlns:p="http://schemas.openxmlformats.org/presentationml/2006/main">
+  <p:cSld>
+    <p:spTree>
+      <p:nvGrpSpPr>
+        <p:cNvPr id="1" name=""/>
+        <p:cNvGrpSpPr/>
+        <p:nvPr/>
+      </p:nvGrpSpPr>
+      <p:grpSpPr>
+        <a:xfrm>
+          <a:off x="0" y="0"/>
+          <a:ext cx="0" cy="0"/>
+          <a:chOff x="0" y="0"/>
+          <a:chExt cx="0" cy="0"/>
+        </a:xfrm>
+      </p:grpSpPr>
+      <p:sp>
+        <p:nvSpPr>
+          <p:cNvPr id="2" name="Marcador de imagen de diapositiva 1"/>
+          <p:cNvSpPr>
+            <a:spLocks noGrp="1" noRot="1" noChangeAspect="1"/>
+          </p:cNvSpPr>
+          <p:nvPr>
+            <p:ph type="sldImg"/>
+          </p:nvPr>
+        </p:nvSpPr>
+        <p:spPr/>
+      </p:sp>
+      <p:sp>
+        <p:nvSpPr>
+          <p:cNvPr id="3" name="Marcador de notas 2"/>
+          <p:cNvSpPr>
+            <a:spLocks noGrp="1"/>
+          </p:cNvSpPr>
+          <p:nvPr>
+            <p:ph type="body" idx="1"/>
+          </p:nvPr>
+        </p:nvSpPr>
+        <p:spPr/>
+        <p:txBody>
+          <a:bodyPr/>
+          <a:lstStyle/>
+          <a:p>
+            <a:r>
+              <a:rPr lang="es-ES" dirty="0" smtClean="0"/>
+              <a:t>Y </a:t>
+            </a:r>
+            <a:r>
+              <a:rPr lang="es-ES" dirty="0" err="1" smtClean="0"/>
+              <a:t>asi</a:t>
+            </a:r>
+            <a:r>
+              <a:rPr lang="es-ES" dirty="0" smtClean="0"/>
+              <a:t> es como la hemos conseguido.</a:t>
+            </a:r>
+            <a:endParaRPr lang="es-ES" dirty="0"/>
+          </a:p>
+        </p:txBody>
+      </p:sp>
+      <p:sp>
+        <p:nvSpPr>
+          <p:cNvPr id="4" name="Marcador de número de diapositiva 3"/>
+          <p:cNvSpPr>
+            <a:spLocks noGrp="1"/>
+          </p:cNvSpPr>
+          <p:nvPr>
+            <p:ph type="sldNum" sz="quarter" idx="10"/>
+          </p:nvPr>
+        </p:nvSpPr>
+        <p:spPr/>
+        <p:txBody>
+          <a:bodyPr/>
+          <a:lstStyle/>
+          <a:p>
+            <a:fld id="{DB7D0A05-FF74-4049-BC13-A9ACD9D2AB82}" type="slidenum">
+              <a:rPr lang="es-ES" smtClean="0"/>
+              <a:t>33</a:t>
+            </a:fld>
+            <a:endParaRPr lang="es-ES"/>
+          </a:p>
+        </p:txBody>
+      </p:sp>
+    </p:spTree>
+    <p:extLst>
+      <p:ext uri="{BB962C8B-B14F-4D97-AF65-F5344CB8AC3E}">
+        <p14:creationId xmlns:p14="http://schemas.microsoft.com/office/powerpoint/2010/main" val="124897716"/>
+      </p:ext>
+    </p:extLst>
+  </p:cSld>
+  <p:clrMapOvr>
+    <a:masterClrMapping/>
+  </p:clrMapOvr>
+</p:notes>
+</file>
+
+<file path=ppt/notesSlides/notesSlide34.xml><?xml version="1.0" encoding="utf-8"?>
+<p:notes xmlns:a="http://schemas.openxmlformats.org/drawingml/2006/main" xmlns:r="http://schemas.openxmlformats.org/officeDocument/2006/relationships" xmlns:p="http://schemas.openxmlformats.org/presentationml/2006/main">
+  <p:cSld>
+    <p:spTree>
+      <p:nvGrpSpPr>
+        <p:cNvPr id="1" name=""/>
+        <p:cNvGrpSpPr/>
+        <p:nvPr/>
+      </p:nvGrpSpPr>
+      <p:grpSpPr>
+        <a:xfrm>
+          <a:off x="0" y="0"/>
+          <a:ext cx="0" cy="0"/>
+          <a:chOff x="0" y="0"/>
+          <a:chExt cx="0" cy="0"/>
+        </a:xfrm>
+      </p:grpSpPr>
+      <p:sp>
+        <p:nvSpPr>
+          <p:cNvPr id="2" name="Marcador de imagen de diapositiva 1"/>
+          <p:cNvSpPr>
+            <a:spLocks noGrp="1" noRot="1" noChangeAspect="1"/>
+          </p:cNvSpPr>
+          <p:nvPr>
+            <p:ph type="sldImg"/>
+          </p:nvPr>
+        </p:nvSpPr>
+        <p:spPr/>
+      </p:sp>
+      <p:sp>
+        <p:nvSpPr>
+          <p:cNvPr id="3" name="Marcador de notas 2"/>
+          <p:cNvSpPr>
+            <a:spLocks noGrp="1"/>
+          </p:cNvSpPr>
+          <p:nvPr>
+            <p:ph type="body" idx="1"/>
+          </p:nvPr>
+        </p:nvSpPr>
+        <p:spPr/>
+        <p:txBody>
+          <a:bodyPr/>
+          <a:lstStyle/>
+          <a:p>
+            <a:r>
+              <a:rPr lang="es-ES" dirty="0" smtClean="0"/>
+              <a:t>Muchas gracias a todos y a continuación</a:t>
+            </a:r>
+            <a:r>
+              <a:rPr lang="es-ES" baseline="0" dirty="0" smtClean="0"/>
+              <a:t> vamos a ver la web en funcionamiento con una pequeña demo.</a:t>
+            </a:r>
+            <a:endParaRPr lang="es-ES" dirty="0"/>
+          </a:p>
+        </p:txBody>
+      </p:sp>
+      <p:sp>
+        <p:nvSpPr>
+          <p:cNvPr id="4" name="Marcador de número de diapositiva 3"/>
+          <p:cNvSpPr>
+            <a:spLocks noGrp="1"/>
+          </p:cNvSpPr>
+          <p:nvPr>
+            <p:ph type="sldNum" sz="quarter" idx="10"/>
+          </p:nvPr>
+        </p:nvSpPr>
+        <p:spPr/>
+        <p:txBody>
+          <a:bodyPr/>
+          <a:lstStyle/>
+          <a:p>
+            <a:fld id="{DB7D0A05-FF74-4049-BC13-A9ACD9D2AB82}" type="slidenum">
+              <a:rPr lang="es-ES" smtClean="0"/>
+              <a:t>34</a:t>
             </a:fld>
             <a:endParaRPr lang="es-ES"/>
           </a:p>
@@ -5733,160 +6186,8 @@
                 <a:ea typeface="+mn-ea"/>
                 <a:cs typeface="+mn-cs"/>
               </a:rPr>
-              <a:t> Por ejemplo lanzando el </a:t>
-            </a:r>
-            <a:r>
-              <a:rPr lang="es-ES_tradnl" sz="1200" kern="1200" dirty="0" err="1" smtClean="0">
-                <a:solidFill>
-                  <a:schemeClr val="tx1"/>
-                </a:solidFill>
-                <a:effectLst/>
-                <a:latin typeface="+mn-lt"/>
-                <a:ea typeface="+mn-ea"/>
-                <a:cs typeface="+mn-cs"/>
-              </a:rPr>
-              <a:t>scrapping</a:t>
-            </a:r>
-            <a:r>
-              <a:rPr lang="es-ES_tradnl" sz="1200" kern="1200" dirty="0" smtClean="0">
-                <a:solidFill>
-                  <a:schemeClr val="tx1"/>
-                </a:solidFill>
-                <a:effectLst/>
-                <a:latin typeface="+mn-lt"/>
-                <a:ea typeface="+mn-ea"/>
-                <a:cs typeface="+mn-cs"/>
-              </a:rPr>
-              <a:t> cada viernes podemos actualizar nuestra base de datos con las películas nuevas o borrar las películas que ya no tenemos en cartelera.</a:t>
-            </a:r>
-            <a:endParaRPr lang="es-ES" sz="1200" kern="1200" dirty="0" smtClean="0">
-              <a:solidFill>
-                <a:schemeClr val="tx1"/>
-              </a:solidFill>
-              <a:effectLst/>
-              <a:latin typeface="+mn-lt"/>
-              <a:ea typeface="+mn-ea"/>
-              <a:cs typeface="+mn-cs"/>
-            </a:endParaRPr>
-          </a:p>
-          <a:p>
-            <a:r>
-              <a:rPr lang="es-ES_tradnl" sz="1200" kern="1200" dirty="0" smtClean="0">
-                <a:solidFill>
-                  <a:schemeClr val="tx1"/>
-                </a:solidFill>
-                <a:effectLst/>
-                <a:latin typeface="+mn-lt"/>
-                <a:ea typeface="+mn-ea"/>
-                <a:cs typeface="+mn-cs"/>
-              </a:rPr>
-              <a:t> </a:t>
-            </a:r>
-            <a:endParaRPr lang="es-ES" sz="1200" kern="1200" dirty="0" smtClean="0">
-              <a:solidFill>
-                <a:schemeClr val="tx1"/>
-              </a:solidFill>
-              <a:effectLst/>
-              <a:latin typeface="+mn-lt"/>
-              <a:ea typeface="+mn-ea"/>
-              <a:cs typeface="+mn-cs"/>
-            </a:endParaRPr>
-          </a:p>
-          <a:p>
-            <a:r>
-              <a:rPr lang="es-ES_tradnl" sz="1200" kern="1200" dirty="0" smtClean="0">
-                <a:solidFill>
-                  <a:schemeClr val="tx1"/>
-                </a:solidFill>
-                <a:effectLst/>
-                <a:latin typeface="+mn-lt"/>
-                <a:ea typeface="+mn-ea"/>
-                <a:cs typeface="+mn-cs"/>
-              </a:rPr>
-              <a:t>Aquí podemos ver un ejemplo de código de </a:t>
-            </a:r>
-            <a:r>
-              <a:rPr lang="es-ES_tradnl" sz="1200" kern="1200" dirty="0" err="1" smtClean="0">
-                <a:solidFill>
-                  <a:schemeClr val="tx1"/>
-                </a:solidFill>
-                <a:effectLst/>
-                <a:latin typeface="+mn-lt"/>
-                <a:ea typeface="+mn-ea"/>
-                <a:cs typeface="+mn-cs"/>
-              </a:rPr>
-              <a:t>scrapping</a:t>
-            </a:r>
-            <a:r>
-              <a:rPr lang="es-ES_tradnl" sz="1200" kern="1200" dirty="0" smtClean="0">
-                <a:solidFill>
-                  <a:schemeClr val="tx1"/>
-                </a:solidFill>
-                <a:effectLst/>
-                <a:latin typeface="+mn-lt"/>
-                <a:ea typeface="+mn-ea"/>
-                <a:cs typeface="+mn-cs"/>
-              </a:rPr>
-              <a:t> donde recuperamos información de una película de la web de </a:t>
-            </a:r>
-            <a:r>
-              <a:rPr lang="es-ES_tradnl" sz="1200" kern="1200" dirty="0" err="1" smtClean="0">
-                <a:solidFill>
-                  <a:schemeClr val="tx1"/>
-                </a:solidFill>
-                <a:effectLst/>
-                <a:latin typeface="+mn-lt"/>
-                <a:ea typeface="+mn-ea"/>
-                <a:cs typeface="+mn-cs"/>
-              </a:rPr>
-              <a:t>Cinesa</a:t>
-            </a:r>
-            <a:r>
-              <a:rPr lang="es-ES_tradnl" sz="1200" kern="1200" dirty="0" smtClean="0">
-                <a:solidFill>
-                  <a:schemeClr val="tx1"/>
-                </a:solidFill>
-                <a:effectLst/>
-                <a:latin typeface="+mn-lt"/>
-                <a:ea typeface="+mn-ea"/>
-                <a:cs typeface="+mn-cs"/>
-              </a:rPr>
-              <a:t>:</a:t>
-            </a:r>
-            <a:endParaRPr lang="es-ES" sz="1200" kern="1200" dirty="0" smtClean="0">
-              <a:solidFill>
-                <a:schemeClr val="tx1"/>
-              </a:solidFill>
-              <a:effectLst/>
-              <a:latin typeface="+mn-lt"/>
-              <a:ea typeface="+mn-ea"/>
-              <a:cs typeface="+mn-cs"/>
-            </a:endParaRPr>
-          </a:p>
-          <a:p>
-            <a:r>
-              <a:rPr lang="es-ES_tradnl" sz="1200" kern="1200" dirty="0" smtClean="0">
-                <a:solidFill>
-                  <a:schemeClr val="tx1"/>
-                </a:solidFill>
-                <a:effectLst/>
-                <a:latin typeface="+mn-lt"/>
-                <a:ea typeface="+mn-ea"/>
-                <a:cs typeface="+mn-cs"/>
-              </a:rPr>
-              <a:t> </a:t>
-            </a:r>
-            <a:endParaRPr lang="es-ES" sz="1200" kern="1200" dirty="0" smtClean="0">
-              <a:solidFill>
-                <a:schemeClr val="tx1"/>
-              </a:solidFill>
-              <a:effectLst/>
-              <a:latin typeface="+mn-lt"/>
-              <a:ea typeface="+mn-ea"/>
-              <a:cs typeface="+mn-cs"/>
-            </a:endParaRPr>
-          </a:p>
-          <a:p>
+              <a:t> </a:t>
+            </a:r>
             <a:endParaRPr lang="es-ES" dirty="0"/>
           </a:p>
         </p:txBody>
@@ -5981,7 +6282,7 @@
                 <a:ea typeface="+mn-ea"/>
                 <a:cs typeface="+mn-cs"/>
               </a:rPr>
-              <a:t>Una vez teníamos la idea clara de la web que queríamos hacer tuvimos que realizar fue un análisis de requerimientos para saber cuántas paginas tendría nuestra web, que pasaría al pinchar en cada enlace, cuál iba a ser nuestra estructura, tecnologías que usaremos(AJAX o recargar la página, </a:t>
+              <a:t>Por ejemplo lanzando el </a:t>
             </a:r>
             <a:r>
               <a:rPr lang="es-ES_tradnl" sz="1200" kern="1200" dirty="0" err="1" smtClean="0">
@@ -5993,7 +6294,7 @@
                 <a:ea typeface="+mn-ea"/>
                 <a:cs typeface="+mn-cs"/>
               </a:rPr>
-              <a:t>bootstrap</a:t>
+              <a:t>scrapping</a:t>
             </a:r>
             <a:r>
               <a:rPr lang="es-ES_tradnl" sz="1200" kern="1200" dirty="0" smtClean="0">
@@ -6005,55 +6306,7 @@
                 <a:ea typeface="+mn-ea"/>
                 <a:cs typeface="+mn-cs"/>
               </a:rPr>
-              <a:t> u otro </a:t>
-            </a:r>
-            <a:r>
-              <a:rPr lang="es-ES_tradnl" sz="1200" kern="1200" dirty="0" err="1" smtClean="0">
-                <a:solidFill>
-                  <a:schemeClr val="tx1"/>
-                </a:solidFill>
-                <a:effectLst/>
-                <a:latin typeface="+mn-lt"/>
-                <a:ea typeface="+mn-ea"/>
-                <a:cs typeface="+mn-cs"/>
-              </a:rPr>
-              <a:t>framework</a:t>
-            </a:r>
-            <a:r>
-              <a:rPr lang="es-ES_tradnl" sz="1200" kern="1200" dirty="0" smtClean="0">
-                <a:solidFill>
-                  <a:schemeClr val="tx1"/>
-                </a:solidFill>
-                <a:effectLst/>
-                <a:latin typeface="+mn-lt"/>
-                <a:ea typeface="+mn-ea"/>
-                <a:cs typeface="+mn-cs"/>
-              </a:rPr>
-              <a:t> </a:t>
-            </a:r>
-            <a:r>
-              <a:rPr lang="es-ES_tradnl" sz="1200" kern="1200" dirty="0" err="1" smtClean="0">
-                <a:solidFill>
-                  <a:schemeClr val="tx1"/>
-                </a:solidFill>
-                <a:effectLst/>
-                <a:latin typeface="+mn-lt"/>
-                <a:ea typeface="+mn-ea"/>
-                <a:cs typeface="+mn-cs"/>
-              </a:rPr>
-              <a:t>css</a:t>
-            </a:r>
-            <a:r>
-              <a:rPr lang="es-ES_tradnl" sz="1200" kern="1200" dirty="0" smtClean="0">
-                <a:solidFill>
-                  <a:schemeClr val="tx1"/>
-                </a:solidFill>
-                <a:effectLst/>
-                <a:latin typeface="+mn-lt"/>
-                <a:ea typeface="+mn-ea"/>
-                <a:cs typeface="+mn-cs"/>
-              </a:rPr>
-              <a:t>..)etc…</a:t>
+              <a:t> cada viernes podemos actualizar nuestra base de datos con las películas nuevas o borrar las películas que ya no tenemos en cartelera.</a:t>
             </a:r>
             <a:endParaRPr lang="es-ES" sz="1200" kern="1200" dirty="0" smtClean="0">
               <a:solidFill>
@@ -6089,77 +6342,6 @@
             </a:endParaRPr>
           </a:p>
           <a:p>
-            <a:r>
-              <a:rPr lang="es-ES_tradnl" sz="1200" kern="1200" dirty="0" smtClean="0">
-                <a:solidFill>
-                  <a:schemeClr val="tx1"/>
-                </a:solidFill>
-                <a:effectLst/>
-                <a:latin typeface="+mn-lt"/>
-                <a:ea typeface="+mn-ea"/>
-                <a:cs typeface="+mn-cs"/>
-              </a:rPr>
-              <a:t>Una vez con toda esa información aclarada y acordada entre el equipo diseñamos los primeros bocetos con herramientas de </a:t>
-            </a:r>
-            <a:r>
-              <a:rPr lang="es-ES_tradnl" sz="1200" kern="1200" dirty="0" err="1" smtClean="0">
-                <a:solidFill>
-                  <a:schemeClr val="tx1"/>
-                </a:solidFill>
-                <a:effectLst/>
-                <a:latin typeface="+mn-lt"/>
-                <a:ea typeface="+mn-ea"/>
-                <a:cs typeface="+mn-cs"/>
-              </a:rPr>
-              <a:t>prototipado</a:t>
-            </a:r>
-            <a:r>
-              <a:rPr lang="es-ES_tradnl" sz="1200" kern="1200" dirty="0" smtClean="0">
-                <a:solidFill>
-                  <a:schemeClr val="tx1"/>
-                </a:solidFill>
-                <a:effectLst/>
-                <a:latin typeface="+mn-lt"/>
-                <a:ea typeface="+mn-ea"/>
-                <a:cs typeface="+mn-cs"/>
-              </a:rPr>
-              <a:t> tales como </a:t>
-            </a:r>
-            <a:r>
-              <a:rPr lang="es-ES_tradnl" sz="1200" kern="1200" dirty="0" err="1" smtClean="0">
-                <a:solidFill>
-                  <a:schemeClr val="tx1"/>
-                </a:solidFill>
-                <a:effectLst/>
-                <a:latin typeface="+mn-lt"/>
-                <a:ea typeface="+mn-ea"/>
-                <a:cs typeface="+mn-cs"/>
-              </a:rPr>
-              <a:t>mockups</a:t>
-            </a:r>
-            <a:r>
-              <a:rPr lang="es-ES_tradnl" sz="1200" kern="1200" dirty="0" smtClean="0">
-                <a:solidFill>
-                  <a:schemeClr val="tx1"/>
-                </a:solidFill>
-                <a:effectLst/>
-                <a:latin typeface="+mn-lt"/>
-                <a:ea typeface="+mn-ea"/>
-                <a:cs typeface="+mn-cs"/>
-              </a:rPr>
-              <a:t> generando los siguientes bocetos para las páginas que previamente habíamos acordado que tendría la página:</a:t>
-            </a:r>
-            <a:endParaRPr lang="es-ES" sz="1200" kern="1200" dirty="0" smtClean="0">
-              <a:solidFill>
-                <a:schemeClr val="tx1"/>
-              </a:solidFill>
-              <a:effectLst/>
-              <a:latin typeface="+mn-lt"/>
-              <a:ea typeface="+mn-ea"/>
-              <a:cs typeface="+mn-cs"/>
-            </a:endParaRPr>
-          </a:p>
-          <a:p>
             <a:endParaRPr lang="es-ES" dirty="0"/>
           </a:p>
         </p:txBody>
@@ -6190,7 +6372,7 @@
     </p:spTree>
     <p:extLst>
       <p:ext uri="{BB962C8B-B14F-4D97-AF65-F5344CB8AC3E}">
-        <p14:creationId xmlns:p14="http://schemas.microsoft.com/office/powerpoint/2010/main" val="2571825243"/>
+        <p14:creationId xmlns:p14="http://schemas.microsoft.com/office/powerpoint/2010/main" val="554763033"/>
       </p:ext>
     </p:extLst>
   </p:cSld>
@@ -9143,6 +9325,154 @@
           <a:lstStyle/>
           <a:p>
             <a:r>
+              <a:rPr lang="es-ES" dirty="0" err="1" smtClean="0"/>
+              <a:t>Scrapping</a:t>
+            </a:r>
+            <a:endParaRPr lang="es-ES" dirty="0"/>
+          </a:p>
+        </p:txBody>
+      </p:sp>
+      <p:pic>
+        <p:nvPicPr>
+          <p:cNvPr id="3" name="Marcador de contenido 2"/>
+          <p:cNvPicPr>
+            <a:picLocks noGrp="1" noChangeAspect="1"/>
+          </p:cNvPicPr>
+          <p:nvPr>
+            <p:ph idx="1"/>
+          </p:nvPr>
+        </p:nvPicPr>
+        <p:blipFill>
+          <a:blip r:embed="rId3">
+            <a:extLst>
+              <a:ext uri="{28A0092B-C50C-407E-A947-70E740481C1C}">
+                <a14:useLocalDpi xmlns:a14="http://schemas.microsoft.com/office/drawing/2010/main" val="0"/>
+              </a:ext>
+            </a:extLst>
+          </a:blip>
+          <a:stretch>
+            <a:fillRect/>
+          </a:stretch>
+        </p:blipFill>
+        <p:spPr>
+          <a:xfrm>
+            <a:off x="3679926" y="1825625"/>
+            <a:ext cx="4832148" cy="4351338"/>
+          </a:xfrm>
+        </p:spPr>
+      </p:pic>
+    </p:spTree>
+    <p:extLst>
+      <p:ext uri="{BB962C8B-B14F-4D97-AF65-F5344CB8AC3E}">
+        <p14:creationId xmlns:p14="http://schemas.microsoft.com/office/powerpoint/2010/main" val="4009081455"/>
+      </p:ext>
+    </p:extLst>
+  </p:cSld>
+  <p:clrMapOvr>
+    <a:masterClrMapping/>
+  </p:clrMapOvr>
+  <p:timing>
+    <p:tnLst>
+      <p:par>
+        <p:cTn id="1" dur="indefinite" restart="never" nodeType="tmRoot"/>
+      </p:par>
+    </p:tnLst>
+  </p:timing>
+</p:sld>
+</file>
+
+<file path=ppt/slides/slide11.xml><?xml version="1.0" encoding="utf-8"?>
+<p:sld xmlns:a="http://schemas.openxmlformats.org/drawingml/2006/main" xmlns:r="http://schemas.openxmlformats.org/officeDocument/2006/relationships" xmlns:p="http://schemas.openxmlformats.org/presentationml/2006/main">
+  <p:cSld>
+    <p:spTree>
+      <p:nvGrpSpPr>
+        <p:cNvPr id="1" name=""/>
+        <p:cNvGrpSpPr/>
+        <p:nvPr/>
+      </p:nvGrpSpPr>
+      <p:grpSpPr>
+        <a:xfrm>
+          <a:off x="0" y="0"/>
+          <a:ext cx="0" cy="0"/>
+          <a:chOff x="0" y="0"/>
+          <a:chExt cx="0" cy="0"/>
+        </a:xfrm>
+      </p:grpSpPr>
+      <p:pic>
+        <p:nvPicPr>
+          <p:cNvPr id="2" name="Imagen 1"/>
+          <p:cNvPicPr/>
+          <p:nvPr/>
+        </p:nvPicPr>
+        <p:blipFill>
+          <a:blip r:embed="rId3"/>
+          <a:stretch>
+            <a:fillRect/>
+          </a:stretch>
+        </p:blipFill>
+        <p:spPr>
+          <a:xfrm>
+            <a:off x="1103541" y="727803"/>
+            <a:ext cx="9869260" cy="5183599"/>
+          </a:xfrm>
+          <a:prstGeom prst="rect">
+            <a:avLst/>
+          </a:prstGeom>
+        </p:spPr>
+      </p:pic>
+    </p:spTree>
+    <p:extLst>
+      <p:ext uri="{BB962C8B-B14F-4D97-AF65-F5344CB8AC3E}">
+        <p14:creationId xmlns:p14="http://schemas.microsoft.com/office/powerpoint/2010/main" val="2934858950"/>
+      </p:ext>
+    </p:extLst>
+  </p:cSld>
+  <p:clrMapOvr>
+    <a:masterClrMapping/>
+  </p:clrMapOvr>
+  <p:timing>
+    <p:tnLst>
+      <p:par>
+        <p:cTn id="1" dur="indefinite" restart="never" nodeType="tmRoot"/>
+      </p:par>
+    </p:tnLst>
+  </p:timing>
+</p:sld>
+</file>
+
+<file path=ppt/slides/slide12.xml><?xml version="1.0" encoding="utf-8"?>
+<p:sld xmlns:a="http://schemas.openxmlformats.org/drawingml/2006/main" xmlns:r="http://schemas.openxmlformats.org/officeDocument/2006/relationships" xmlns:p="http://schemas.openxmlformats.org/presentationml/2006/main">
+  <p:cSld>
+    <p:spTree>
+      <p:nvGrpSpPr>
+        <p:cNvPr id="1" name=""/>
+        <p:cNvGrpSpPr/>
+        <p:nvPr/>
+      </p:nvGrpSpPr>
+      <p:grpSpPr>
+        <a:xfrm>
+          <a:off x="0" y="0"/>
+          <a:ext cx="0" cy="0"/>
+          <a:chOff x="0" y="0"/>
+          <a:chExt cx="0" cy="0"/>
+        </a:xfrm>
+      </p:grpSpPr>
+      <p:sp>
+        <p:nvSpPr>
+          <p:cNvPr id="2" name="Título 1"/>
+          <p:cNvSpPr>
+            <a:spLocks noGrp="1"/>
+          </p:cNvSpPr>
+          <p:nvPr>
+            <p:ph type="title"/>
+          </p:nvPr>
+        </p:nvSpPr>
+        <p:spPr/>
+        <p:txBody>
+          <a:bodyPr/>
+          <a:lstStyle/>
+          <a:p>
+            <a:r>
               <a:rPr lang="es-ES" dirty="0" smtClean="0"/>
               <a:t>Tecnologías usadas</a:t>
             </a:r>
@@ -9409,7 +9739,7 @@
 </p:sld>
 </file>
 
-<file path=ppt/slides/slide11.xml><?xml version="1.0" encoding="utf-8"?>
+<file path=ppt/slides/slide13.xml><?xml version="1.0" encoding="utf-8"?>
 <p:sld xmlns:a="http://schemas.openxmlformats.org/drawingml/2006/main" xmlns:r="http://schemas.openxmlformats.org/officeDocument/2006/relationships" xmlns:p="http://schemas.openxmlformats.org/presentationml/2006/main">
   <p:cSld>
     <p:spTree>
@@ -9476,7 +9806,7 @@
 </p:sld>
 </file>
 
-<file path=ppt/slides/slide12.xml><?xml version="1.0" encoding="utf-8"?>
+<file path=ppt/slides/slide14.xml><?xml version="1.0" encoding="utf-8"?>
 <p:sld xmlns:a="http://schemas.openxmlformats.org/drawingml/2006/main" xmlns:r="http://schemas.openxmlformats.org/officeDocument/2006/relationships" xmlns:p="http://schemas.openxmlformats.org/presentationml/2006/main">
   <p:cSld>
     <p:spTree>
@@ -9604,7 +9934,7 @@
 </p:sld>
 </file>
 
-<file path=ppt/slides/slide13.xml><?xml version="1.0" encoding="utf-8"?>
+<file path=ppt/slides/slide15.xml><?xml version="1.0" encoding="utf-8"?>
 <p:sld xmlns:a="http://schemas.openxmlformats.org/drawingml/2006/main" xmlns:r="http://schemas.openxmlformats.org/officeDocument/2006/relationships" xmlns:p="http://schemas.openxmlformats.org/presentationml/2006/main">
   <p:cSld>
     <p:spTree>
@@ -9658,7 +9988,7 @@
 </p:sld>
 </file>
 
-<file path=ppt/slides/slide14.xml><?xml version="1.0" encoding="utf-8"?>
+<file path=ppt/slides/slide16.xml><?xml version="1.0" encoding="utf-8"?>
 <p:sld xmlns:a="http://schemas.openxmlformats.org/drawingml/2006/main" xmlns:r="http://schemas.openxmlformats.org/officeDocument/2006/relationships" xmlns:p="http://schemas.openxmlformats.org/presentationml/2006/main">
   <p:cSld>
     <p:spTree>
@@ -9712,7 +10042,7 @@
 </p:sld>
 </file>
 
-<file path=ppt/slides/slide15.xml><?xml version="1.0" encoding="utf-8"?>
+<file path=ppt/slides/slide17.xml><?xml version="1.0" encoding="utf-8"?>
 <p:sld xmlns:a="http://schemas.openxmlformats.org/drawingml/2006/main" xmlns:r="http://schemas.openxmlformats.org/officeDocument/2006/relationships" xmlns:p="http://schemas.openxmlformats.org/presentationml/2006/main">
   <p:cSld>
     <p:spTree>
@@ -9779,7 +10109,7 @@
 </p:sld>
 </file>
 
-<file path=ppt/slides/slide16.xml><?xml version="1.0" encoding="utf-8"?>
+<file path=ppt/slides/slide18.xml><?xml version="1.0" encoding="utf-8"?>
 <p:sld xmlns:a="http://schemas.openxmlformats.org/drawingml/2006/main" xmlns:r="http://schemas.openxmlformats.org/officeDocument/2006/relationships" xmlns:p="http://schemas.openxmlformats.org/presentationml/2006/main">
   <p:cSld>
     <p:spTree>
@@ -9844,7 +10174,7 @@
 </p:sld>
 </file>
 
-<file path=ppt/slides/slide17.xml><?xml version="1.0" encoding="utf-8"?>
+<file path=ppt/slides/slide19.xml><?xml version="1.0" encoding="utf-8"?>
 <p:sld xmlns:a="http://schemas.openxmlformats.org/drawingml/2006/main" xmlns:r="http://schemas.openxmlformats.org/officeDocument/2006/relationships" xmlns:p="http://schemas.openxmlformats.org/presentationml/2006/main">
   <p:cSld>
     <p:spTree>
@@ -9895,246 +10225,6 @@
     <p:extLst>
       <p:ext uri="{BB962C8B-B14F-4D97-AF65-F5344CB8AC3E}">
         <p14:creationId xmlns:p14="http://schemas.microsoft.com/office/powerpoint/2010/main" val="3294839507"/>
-      </p:ext>
-    </p:extLst>
-  </p:cSld>
-  <p:clrMapOvr>
-    <a:masterClrMapping/>
-  </p:clrMapOvr>
-  <p:timing>
-    <p:tnLst>
-      <p:par>
-        <p:cTn id="1" dur="indefinite" restart="never" nodeType="tmRoot"/>
-      </p:par>
-    </p:tnLst>
-  </p:timing>
-</p:sld>
-</file>
-
-<file path=ppt/slides/slide18.xml><?xml version="1.0" encoding="utf-8"?>
-<p:sld xmlns:a="http://schemas.openxmlformats.org/drawingml/2006/main" xmlns:r="http://schemas.openxmlformats.org/officeDocument/2006/relationships" xmlns:p="http://schemas.openxmlformats.org/presentationml/2006/main">
-  <p:cSld>
-    <p:spTree>
-      <p:nvGrpSpPr>
-        <p:cNvPr id="1" name=""/>
-        <p:cNvGrpSpPr/>
-        <p:nvPr/>
-      </p:nvGrpSpPr>
-      <p:grpSpPr>
-        <a:xfrm>
-          <a:off x="0" y="0"/>
-          <a:ext cx="0" cy="0"/>
-          <a:chOff x="0" y="0"/>
-          <a:chExt cx="0" cy="0"/>
-        </a:xfrm>
-      </p:grpSpPr>
-      <p:pic>
-        <p:nvPicPr>
-          <p:cNvPr id="3" name="Imagen 2"/>
-          <p:cNvPicPr>
-            <a:picLocks noChangeAspect="1"/>
-          </p:cNvPicPr>
-          <p:nvPr/>
-        </p:nvPicPr>
-        <p:blipFill>
-          <a:blip r:embed="rId3">
-            <a:extLst>
-              <a:ext uri="{28A0092B-C50C-407E-A947-70E740481C1C}">
-                <a14:useLocalDpi xmlns:a14="http://schemas.microsoft.com/office/drawing/2010/main" val="0"/>
-              </a:ext>
-            </a:extLst>
-          </a:blip>
-          <a:stretch>
-            <a:fillRect/>
-          </a:stretch>
-        </p:blipFill>
-        <p:spPr>
-          <a:xfrm>
-            <a:off x="3545304" y="605588"/>
-            <a:ext cx="5197643" cy="5197643"/>
-          </a:xfrm>
-          <a:prstGeom prst="rect">
-            <a:avLst/>
-          </a:prstGeom>
-        </p:spPr>
-      </p:pic>
-    </p:spTree>
-    <p:extLst>
-      <p:ext uri="{BB962C8B-B14F-4D97-AF65-F5344CB8AC3E}">
-        <p14:creationId xmlns:p14="http://schemas.microsoft.com/office/powerpoint/2010/main" val="3911173567"/>
-      </p:ext>
-    </p:extLst>
-  </p:cSld>
-  <p:clrMapOvr>
-    <a:masterClrMapping/>
-  </p:clrMapOvr>
-  <p:timing>
-    <p:tnLst>
-      <p:par>
-        <p:cTn id="1" dur="indefinite" restart="never" nodeType="tmRoot"/>
-      </p:par>
-    </p:tnLst>
-  </p:timing>
-</p:sld>
-</file>
-
-<file path=ppt/slides/slide19.xml><?xml version="1.0" encoding="utf-8"?>
-<p:sld xmlns:a="http://schemas.openxmlformats.org/drawingml/2006/main" xmlns:r="http://schemas.openxmlformats.org/officeDocument/2006/relationships" xmlns:p="http://schemas.openxmlformats.org/presentationml/2006/main">
-  <p:cSld>
-    <p:spTree>
-      <p:nvGrpSpPr>
-        <p:cNvPr id="1" name=""/>
-        <p:cNvGrpSpPr/>
-        <p:nvPr/>
-      </p:nvGrpSpPr>
-      <p:grpSpPr>
-        <a:xfrm>
-          <a:off x="0" y="0"/>
-          <a:ext cx="0" cy="0"/>
-          <a:chOff x="0" y="0"/>
-          <a:chExt cx="0" cy="0"/>
-        </a:xfrm>
-      </p:grpSpPr>
-      <p:pic>
-        <p:nvPicPr>
-          <p:cNvPr id="3" name="Imagen 2"/>
-          <p:cNvPicPr/>
-          <p:nvPr/>
-        </p:nvPicPr>
-        <p:blipFill>
-          <a:blip r:embed="rId3"/>
-          <a:stretch>
-            <a:fillRect/>
-          </a:stretch>
-        </p:blipFill>
-        <p:spPr>
-          <a:xfrm>
-            <a:off x="6088604" y="1516238"/>
-            <a:ext cx="5400040" cy="3192145"/>
-          </a:xfrm>
-          <a:prstGeom prst="rect">
-            <a:avLst/>
-          </a:prstGeom>
-        </p:spPr>
-      </p:pic>
-      <p:sp>
-        <p:nvSpPr>
-          <p:cNvPr id="4" name="Rectángulo 3"/>
-          <p:cNvSpPr/>
-          <p:nvPr/>
-        </p:nvSpPr>
-        <p:spPr>
-          <a:xfrm>
-            <a:off x="7250001" y="648471"/>
-            <a:ext cx="2125454" cy="388696"/>
-          </a:xfrm>
-          <a:prstGeom prst="rect">
-            <a:avLst/>
-          </a:prstGeom>
-        </p:spPr>
-        <p:txBody>
-          <a:bodyPr wrap="none">
-            <a:spAutoFit/>
-          </a:bodyPr>
-          <a:lstStyle/>
-          <a:p>
-            <a:pPr>
-              <a:lnSpc>
-                <a:spcPct val="107000"/>
-              </a:lnSpc>
-              <a:spcAft>
-                <a:spcPts val="800"/>
-              </a:spcAft>
-            </a:pPr>
-            <a:r>
-              <a:rPr lang="es-ES_tradnl" b="1" dirty="0">
-                <a:latin typeface="Calibri" panose="020F0502020204030204" pitchFamily="34" charset="0"/>
-                <a:ea typeface="Calibri" panose="020F0502020204030204" pitchFamily="34" charset="0"/>
-                <a:cs typeface="Times New Roman" panose="02020603050405020304" pitchFamily="18" charset="0"/>
-              </a:rPr>
-              <a:t>USO DE BOOTSTRAP</a:t>
-            </a:r>
-            <a:endParaRPr lang="es-ES" sz="1400" dirty="0">
-              <a:effectLst/>
-              <a:latin typeface="Calibri" panose="020F0502020204030204" pitchFamily="34" charset="0"/>
-              <a:ea typeface="Calibri" panose="020F0502020204030204" pitchFamily="34" charset="0"/>
-              <a:cs typeface="Times New Roman" panose="02020603050405020304" pitchFamily="18" charset="0"/>
-            </a:endParaRPr>
-          </a:p>
-        </p:txBody>
-      </p:sp>
-      <p:pic>
-        <p:nvPicPr>
-          <p:cNvPr id="5" name="Imagen 4"/>
-          <p:cNvPicPr/>
-          <p:nvPr/>
-        </p:nvPicPr>
-        <p:blipFill>
-          <a:blip r:embed="rId4"/>
-          <a:stretch>
-            <a:fillRect/>
-          </a:stretch>
-        </p:blipFill>
-        <p:spPr>
-          <a:xfrm>
-            <a:off x="209435" y="2170923"/>
-            <a:ext cx="5400040" cy="2537460"/>
-          </a:xfrm>
-          <a:prstGeom prst="rect">
-            <a:avLst/>
-          </a:prstGeom>
-        </p:spPr>
-      </p:pic>
-      <p:sp>
-        <p:nvSpPr>
-          <p:cNvPr id="6" name="Rectángulo 5"/>
-          <p:cNvSpPr/>
-          <p:nvPr/>
-        </p:nvSpPr>
-        <p:spPr>
-          <a:xfrm>
-            <a:off x="1290489" y="648471"/>
-            <a:ext cx="744114" cy="388696"/>
-          </a:xfrm>
-          <a:prstGeom prst="rect">
-            <a:avLst/>
-          </a:prstGeom>
-        </p:spPr>
-        <p:txBody>
-          <a:bodyPr wrap="none">
-            <a:spAutoFit/>
-          </a:bodyPr>
-          <a:lstStyle/>
-          <a:p>
-            <a:pPr>
-              <a:lnSpc>
-                <a:spcPct val="107000"/>
-              </a:lnSpc>
-              <a:spcAft>
-                <a:spcPts val="800"/>
-              </a:spcAft>
-            </a:pPr>
-            <a:r>
-              <a:rPr lang="es-ES_tradnl" b="1" dirty="0">
-                <a:latin typeface="Calibri" panose="020F0502020204030204" pitchFamily="34" charset="0"/>
-                <a:ea typeface="Calibri" panose="020F0502020204030204" pitchFamily="34" charset="0"/>
-                <a:cs typeface="Times New Roman" panose="02020603050405020304" pitchFamily="18" charset="0"/>
-              </a:rPr>
-              <a:t>HTML</a:t>
-            </a:r>
-            <a:endParaRPr lang="es-ES" sz="1400" dirty="0">
-              <a:effectLst/>
-              <a:latin typeface="Calibri" panose="020F0502020204030204" pitchFamily="34" charset="0"/>
-              <a:ea typeface="Calibri" panose="020F0502020204030204" pitchFamily="34" charset="0"/>
-              <a:cs typeface="Times New Roman" panose="02020603050405020304" pitchFamily="18" charset="0"/>
-            </a:endParaRPr>
-          </a:p>
-        </p:txBody>
-      </p:sp>
-    </p:spTree>
-    <p:extLst>
-      <p:ext uri="{BB962C8B-B14F-4D97-AF65-F5344CB8AC3E}">
-        <p14:creationId xmlns:p14="http://schemas.microsoft.com/office/powerpoint/2010/main" val="3017904557"/>
       </p:ext>
     </p:extLst>
   </p:cSld>
@@ -10249,6 +10339,246 @@
         </p:blipFill>
         <p:spPr>
           <a:xfrm>
+            <a:off x="3545304" y="605588"/>
+            <a:ext cx="5197643" cy="5197643"/>
+          </a:xfrm>
+          <a:prstGeom prst="rect">
+            <a:avLst/>
+          </a:prstGeom>
+        </p:spPr>
+      </p:pic>
+    </p:spTree>
+    <p:extLst>
+      <p:ext uri="{BB962C8B-B14F-4D97-AF65-F5344CB8AC3E}">
+        <p14:creationId xmlns:p14="http://schemas.microsoft.com/office/powerpoint/2010/main" val="3911173567"/>
+      </p:ext>
+    </p:extLst>
+  </p:cSld>
+  <p:clrMapOvr>
+    <a:masterClrMapping/>
+  </p:clrMapOvr>
+  <p:timing>
+    <p:tnLst>
+      <p:par>
+        <p:cTn id="1" dur="indefinite" restart="never" nodeType="tmRoot"/>
+      </p:par>
+    </p:tnLst>
+  </p:timing>
+</p:sld>
+</file>
+
+<file path=ppt/slides/slide21.xml><?xml version="1.0" encoding="utf-8"?>
+<p:sld xmlns:a="http://schemas.openxmlformats.org/drawingml/2006/main" xmlns:r="http://schemas.openxmlformats.org/officeDocument/2006/relationships" xmlns:p="http://schemas.openxmlformats.org/presentationml/2006/main">
+  <p:cSld>
+    <p:spTree>
+      <p:nvGrpSpPr>
+        <p:cNvPr id="1" name=""/>
+        <p:cNvGrpSpPr/>
+        <p:nvPr/>
+      </p:nvGrpSpPr>
+      <p:grpSpPr>
+        <a:xfrm>
+          <a:off x="0" y="0"/>
+          <a:ext cx="0" cy="0"/>
+          <a:chOff x="0" y="0"/>
+          <a:chExt cx="0" cy="0"/>
+        </a:xfrm>
+      </p:grpSpPr>
+      <p:pic>
+        <p:nvPicPr>
+          <p:cNvPr id="3" name="Imagen 2"/>
+          <p:cNvPicPr/>
+          <p:nvPr/>
+        </p:nvPicPr>
+        <p:blipFill>
+          <a:blip r:embed="rId3"/>
+          <a:stretch>
+            <a:fillRect/>
+          </a:stretch>
+        </p:blipFill>
+        <p:spPr>
+          <a:xfrm>
+            <a:off x="6088604" y="1516238"/>
+            <a:ext cx="5400040" cy="3192145"/>
+          </a:xfrm>
+          <a:prstGeom prst="rect">
+            <a:avLst/>
+          </a:prstGeom>
+        </p:spPr>
+      </p:pic>
+      <p:sp>
+        <p:nvSpPr>
+          <p:cNvPr id="4" name="Rectángulo 3"/>
+          <p:cNvSpPr/>
+          <p:nvPr/>
+        </p:nvSpPr>
+        <p:spPr>
+          <a:xfrm>
+            <a:off x="7250001" y="648471"/>
+            <a:ext cx="2125454" cy="388696"/>
+          </a:xfrm>
+          <a:prstGeom prst="rect">
+            <a:avLst/>
+          </a:prstGeom>
+        </p:spPr>
+        <p:txBody>
+          <a:bodyPr wrap="none">
+            <a:spAutoFit/>
+          </a:bodyPr>
+          <a:lstStyle/>
+          <a:p>
+            <a:pPr>
+              <a:lnSpc>
+                <a:spcPct val="107000"/>
+              </a:lnSpc>
+              <a:spcAft>
+                <a:spcPts val="800"/>
+              </a:spcAft>
+            </a:pPr>
+            <a:r>
+              <a:rPr lang="es-ES_tradnl" b="1" dirty="0">
+                <a:latin typeface="Calibri" panose="020F0502020204030204" pitchFamily="34" charset="0"/>
+                <a:ea typeface="Calibri" panose="020F0502020204030204" pitchFamily="34" charset="0"/>
+                <a:cs typeface="Times New Roman" panose="02020603050405020304" pitchFamily="18" charset="0"/>
+              </a:rPr>
+              <a:t>USO DE BOOTSTRAP</a:t>
+            </a:r>
+            <a:endParaRPr lang="es-ES" sz="1400" dirty="0">
+              <a:effectLst/>
+              <a:latin typeface="Calibri" panose="020F0502020204030204" pitchFamily="34" charset="0"/>
+              <a:ea typeface="Calibri" panose="020F0502020204030204" pitchFamily="34" charset="0"/>
+              <a:cs typeface="Times New Roman" panose="02020603050405020304" pitchFamily="18" charset="0"/>
+            </a:endParaRPr>
+          </a:p>
+        </p:txBody>
+      </p:sp>
+      <p:pic>
+        <p:nvPicPr>
+          <p:cNvPr id="5" name="Imagen 4"/>
+          <p:cNvPicPr/>
+          <p:nvPr/>
+        </p:nvPicPr>
+        <p:blipFill>
+          <a:blip r:embed="rId4"/>
+          <a:stretch>
+            <a:fillRect/>
+          </a:stretch>
+        </p:blipFill>
+        <p:spPr>
+          <a:xfrm>
+            <a:off x="209435" y="2170923"/>
+            <a:ext cx="5400040" cy="2537460"/>
+          </a:xfrm>
+          <a:prstGeom prst="rect">
+            <a:avLst/>
+          </a:prstGeom>
+        </p:spPr>
+      </p:pic>
+      <p:sp>
+        <p:nvSpPr>
+          <p:cNvPr id="6" name="Rectángulo 5"/>
+          <p:cNvSpPr/>
+          <p:nvPr/>
+        </p:nvSpPr>
+        <p:spPr>
+          <a:xfrm>
+            <a:off x="1290489" y="648471"/>
+            <a:ext cx="744114" cy="388696"/>
+          </a:xfrm>
+          <a:prstGeom prst="rect">
+            <a:avLst/>
+          </a:prstGeom>
+        </p:spPr>
+        <p:txBody>
+          <a:bodyPr wrap="none">
+            <a:spAutoFit/>
+          </a:bodyPr>
+          <a:lstStyle/>
+          <a:p>
+            <a:pPr>
+              <a:lnSpc>
+                <a:spcPct val="107000"/>
+              </a:lnSpc>
+              <a:spcAft>
+                <a:spcPts val="800"/>
+              </a:spcAft>
+            </a:pPr>
+            <a:r>
+              <a:rPr lang="es-ES_tradnl" b="1" dirty="0">
+                <a:latin typeface="Calibri" panose="020F0502020204030204" pitchFamily="34" charset="0"/>
+                <a:ea typeface="Calibri" panose="020F0502020204030204" pitchFamily="34" charset="0"/>
+                <a:cs typeface="Times New Roman" panose="02020603050405020304" pitchFamily="18" charset="0"/>
+              </a:rPr>
+              <a:t>HTML</a:t>
+            </a:r>
+            <a:endParaRPr lang="es-ES" sz="1400" dirty="0">
+              <a:effectLst/>
+              <a:latin typeface="Calibri" panose="020F0502020204030204" pitchFamily="34" charset="0"/>
+              <a:ea typeface="Calibri" panose="020F0502020204030204" pitchFamily="34" charset="0"/>
+              <a:cs typeface="Times New Roman" panose="02020603050405020304" pitchFamily="18" charset="0"/>
+            </a:endParaRPr>
+          </a:p>
+        </p:txBody>
+      </p:sp>
+    </p:spTree>
+    <p:extLst>
+      <p:ext uri="{BB962C8B-B14F-4D97-AF65-F5344CB8AC3E}">
+        <p14:creationId xmlns:p14="http://schemas.microsoft.com/office/powerpoint/2010/main" val="3017904557"/>
+      </p:ext>
+    </p:extLst>
+  </p:cSld>
+  <p:clrMapOvr>
+    <a:masterClrMapping/>
+  </p:clrMapOvr>
+  <p:timing>
+    <p:tnLst>
+      <p:par>
+        <p:cTn id="1" dur="indefinite" restart="never" nodeType="tmRoot"/>
+      </p:par>
+    </p:tnLst>
+  </p:timing>
+</p:sld>
+</file>
+
+<file path=ppt/slides/slide22.xml><?xml version="1.0" encoding="utf-8"?>
+<p:sld xmlns:a="http://schemas.openxmlformats.org/drawingml/2006/main" xmlns:r="http://schemas.openxmlformats.org/officeDocument/2006/relationships" xmlns:p="http://schemas.openxmlformats.org/presentationml/2006/main">
+  <p:cSld>
+    <p:spTree>
+      <p:nvGrpSpPr>
+        <p:cNvPr id="1" name=""/>
+        <p:cNvGrpSpPr/>
+        <p:nvPr/>
+      </p:nvGrpSpPr>
+      <p:grpSpPr>
+        <a:xfrm>
+          <a:off x="0" y="0"/>
+          <a:ext cx="0" cy="0"/>
+          <a:chOff x="0" y="0"/>
+          <a:chExt cx="0" cy="0"/>
+        </a:xfrm>
+      </p:grpSpPr>
+      <p:pic>
+        <p:nvPicPr>
+          <p:cNvPr id="3" name="Imagen 2"/>
+          <p:cNvPicPr>
+            <a:picLocks noChangeAspect="1"/>
+          </p:cNvPicPr>
+          <p:nvPr/>
+        </p:nvPicPr>
+        <p:blipFill>
+          <a:blip r:embed="rId3">
+            <a:extLst>
+              <a:ext uri="{28A0092B-C50C-407E-A947-70E740481C1C}">
+                <a14:useLocalDpi xmlns:a14="http://schemas.microsoft.com/office/drawing/2010/main" val="0"/>
+              </a:ext>
+            </a:extLst>
+          </a:blip>
+          <a:stretch>
+            <a:fillRect/>
+          </a:stretch>
+        </p:blipFill>
+        <p:spPr>
+          <a:xfrm>
             <a:off x="2032000" y="889000"/>
             <a:ext cx="8128000" cy="5080000"/>
           </a:xfrm>
@@ -10277,7 +10607,7 @@
 </p:sld>
 </file>
 
-<file path=ppt/slides/slide21.xml><?xml version="1.0" encoding="utf-8"?>
+<file path=ppt/slides/slide23.xml><?xml version="1.0" encoding="utf-8"?>
 <p:sld xmlns:a="http://schemas.openxmlformats.org/drawingml/2006/main" xmlns:r="http://schemas.openxmlformats.org/officeDocument/2006/relationships" xmlns:p="http://schemas.openxmlformats.org/presentationml/2006/main">
   <p:cSld>
     <p:spTree>
@@ -10390,7 +10720,7 @@
 </p:sld>
 </file>
 
-<file path=ppt/slides/slide22.xml><?xml version="1.0" encoding="utf-8"?>
+<file path=ppt/slides/slide24.xml><?xml version="1.0" encoding="utf-8"?>
 <p:sld xmlns:a="http://schemas.openxmlformats.org/drawingml/2006/main" xmlns:r="http://schemas.openxmlformats.org/officeDocument/2006/relationships" xmlns:p="http://schemas.openxmlformats.org/presentationml/2006/main">
   <p:cSld>
     <p:spTree>
@@ -10457,7 +10787,7 @@
 </p:sld>
 </file>
 
-<file path=ppt/slides/slide23.xml><?xml version="1.0" encoding="utf-8"?>
+<file path=ppt/slides/slide25.xml><?xml version="1.0" encoding="utf-8"?>
 <p:sld xmlns:a="http://schemas.openxmlformats.org/drawingml/2006/main" xmlns:r="http://schemas.openxmlformats.org/officeDocument/2006/relationships" xmlns:p="http://schemas.openxmlformats.org/presentationml/2006/main">
   <p:cSld>
     <p:spTree>
@@ -10562,7 +10892,7 @@
 </p:sld>
 </file>
 
-<file path=ppt/slides/slide24.xml><?xml version="1.0" encoding="utf-8"?>
+<file path=ppt/slides/slide26.xml><?xml version="1.0" encoding="utf-8"?>
 <p:sld xmlns:a="http://schemas.openxmlformats.org/drawingml/2006/main" xmlns:r="http://schemas.openxmlformats.org/officeDocument/2006/relationships" xmlns:p="http://schemas.openxmlformats.org/presentationml/2006/main">
   <p:cSld>
     <p:spTree>
@@ -10629,7 +10959,7 @@
 </p:sld>
 </file>
 
-<file path=ppt/slides/slide25.xml><?xml version="1.0" encoding="utf-8"?>
+<file path=ppt/slides/slide27.xml><?xml version="1.0" encoding="utf-8"?>
 <p:sld xmlns:a="http://schemas.openxmlformats.org/drawingml/2006/main" xmlns:r="http://schemas.openxmlformats.org/officeDocument/2006/relationships" xmlns:p="http://schemas.openxmlformats.org/presentationml/2006/main">
   <p:cSld>
     <p:spTree>
@@ -10688,7 +11018,7 @@
 </p:sld>
 </file>
 
-<file path=ppt/slides/slide26.xml><?xml version="1.0" encoding="utf-8"?>
+<file path=ppt/slides/slide28.xml><?xml version="1.0" encoding="utf-8"?>
 <p:sld xmlns:a="http://schemas.openxmlformats.org/drawingml/2006/main" xmlns:r="http://schemas.openxmlformats.org/officeDocument/2006/relationships" xmlns:p="http://schemas.openxmlformats.org/presentationml/2006/main">
   <p:cSld>
     <p:spTree>
@@ -10747,7 +11077,7 @@
 </p:sld>
 </file>
 
-<file path=ppt/slides/slide27.xml><?xml version="1.0" encoding="utf-8"?>
+<file path=ppt/slides/slide29.xml><?xml version="1.0" encoding="utf-8"?>
 <p:sld xmlns:a="http://schemas.openxmlformats.org/drawingml/2006/main" xmlns:r="http://schemas.openxmlformats.org/officeDocument/2006/relationships" xmlns:p="http://schemas.openxmlformats.org/presentationml/2006/main">
   <p:cSld>
     <p:spTree>
@@ -10814,7 +11144,123 @@
 </p:sld>
 </file>
 
-<file path=ppt/slides/slide28.xml><?xml version="1.0" encoding="utf-8"?>
+<file path=ppt/slides/slide3.xml><?xml version="1.0" encoding="utf-8"?>
+<p:sld xmlns:a="http://schemas.openxmlformats.org/drawingml/2006/main" xmlns:r="http://schemas.openxmlformats.org/officeDocument/2006/relationships" xmlns:p="http://schemas.openxmlformats.org/presentationml/2006/main">
+  <p:cSld>
+    <p:spTree>
+      <p:nvGrpSpPr>
+        <p:cNvPr id="1" name=""/>
+        <p:cNvGrpSpPr/>
+        <p:nvPr/>
+      </p:nvGrpSpPr>
+      <p:grpSpPr>
+        <a:xfrm>
+          <a:off x="0" y="0"/>
+          <a:ext cx="0" cy="0"/>
+          <a:chOff x="0" y="0"/>
+          <a:chExt cx="0" cy="0"/>
+        </a:xfrm>
+      </p:grpSpPr>
+      <p:sp>
+        <p:nvSpPr>
+          <p:cNvPr id="2" name="Título 1"/>
+          <p:cNvSpPr>
+            <a:spLocks noGrp="1"/>
+          </p:cNvSpPr>
+          <p:nvPr>
+            <p:ph type="title"/>
+          </p:nvPr>
+        </p:nvSpPr>
+        <p:spPr/>
+        <p:txBody>
+          <a:bodyPr/>
+          <a:lstStyle/>
+          <a:p>
+            <a:r>
+              <a:rPr lang="es-ES" dirty="0" err="1" smtClean="0"/>
+              <a:t>YoSoyTuCine</a:t>
+            </a:r>
+            <a:endParaRPr lang="es-ES" dirty="0"/>
+          </a:p>
+        </p:txBody>
+      </p:sp>
+      <p:sp>
+        <p:nvSpPr>
+          <p:cNvPr id="3" name="Marcador de contenido 2"/>
+          <p:cNvSpPr>
+            <a:spLocks noGrp="1"/>
+          </p:cNvSpPr>
+          <p:nvPr>
+            <p:ph idx="1"/>
+          </p:nvPr>
+        </p:nvSpPr>
+        <p:spPr/>
+        <p:txBody>
+          <a:bodyPr/>
+          <a:lstStyle/>
+          <a:p>
+            <a:r>
+              <a:rPr lang="es-ES_tradnl" dirty="0" smtClean="0"/>
+              <a:t>Comparador de cines.</a:t>
+            </a:r>
+          </a:p>
+          <a:p>
+            <a:endParaRPr lang="es-ES" dirty="0"/>
+          </a:p>
+          <a:p>
+            <a:r>
+              <a:rPr lang="es-ES_tradnl" dirty="0" smtClean="0"/>
+              <a:t>Cine más cercano en todo momento.</a:t>
+            </a:r>
+          </a:p>
+          <a:p>
+            <a:endParaRPr lang="es-ES" dirty="0"/>
+          </a:p>
+          <a:p>
+            <a:r>
+              <a:rPr lang="es-ES_tradnl" dirty="0" smtClean="0"/>
+              <a:t>Elige además en base de las </a:t>
+            </a:r>
+            <a:r>
+              <a:rPr lang="es-ES_tradnl" dirty="0"/>
+              <a:t>valoraciones dadas a los cines por la comunidad de usuarios de </a:t>
+            </a:r>
+            <a:r>
+              <a:rPr lang="es-ES_tradnl" dirty="0" err="1"/>
+              <a:t>YoSoyTuCine</a:t>
+            </a:r>
+            <a:r>
+              <a:rPr lang="es-ES_tradnl" dirty="0"/>
+              <a:t>.</a:t>
+            </a:r>
+            <a:endParaRPr lang="es-ES" dirty="0"/>
+          </a:p>
+          <a:p>
+            <a:endParaRPr lang="es-ES" dirty="0"/>
+          </a:p>
+        </p:txBody>
+      </p:sp>
+    </p:spTree>
+    <p:extLst>
+      <p:ext uri="{BB962C8B-B14F-4D97-AF65-F5344CB8AC3E}">
+        <p14:creationId xmlns:p14="http://schemas.microsoft.com/office/powerpoint/2010/main" val="3242723743"/>
+      </p:ext>
+    </p:extLst>
+  </p:cSld>
+  <p:clrMapOvr>
+    <a:masterClrMapping/>
+  </p:clrMapOvr>
+  <p:timing>
+    <p:tnLst>
+      <p:par>
+        <p:cTn id="1" dur="indefinite" restart="never" nodeType="tmRoot"/>
+      </p:par>
+    </p:tnLst>
+  </p:timing>
+</p:sld>
+</file>
+
+<file path=ppt/slides/slide30.xml><?xml version="1.0" encoding="utf-8"?>
 <p:sld xmlns:a="http://schemas.openxmlformats.org/drawingml/2006/main" xmlns:r="http://schemas.openxmlformats.org/officeDocument/2006/relationships" xmlns:p="http://schemas.openxmlformats.org/presentationml/2006/main">
   <p:cSld>
     <p:spTree>
@@ -10873,7 +11319,7 @@
 </p:sld>
 </file>
 
-<file path=ppt/slides/slide29.xml><?xml version="1.0" encoding="utf-8"?>
+<file path=ppt/slides/slide31.xml><?xml version="1.0" encoding="utf-8"?>
 <p:sld xmlns:a="http://schemas.openxmlformats.org/drawingml/2006/main" xmlns:r="http://schemas.openxmlformats.org/officeDocument/2006/relationships" xmlns:p="http://schemas.openxmlformats.org/presentationml/2006/main">
   <p:cSld>
     <p:spTree>
@@ -10934,123 +11380,7 @@
 </p:sld>
 </file>
 
-<file path=ppt/slides/slide3.xml><?xml version="1.0" encoding="utf-8"?>
-<p:sld xmlns:a="http://schemas.openxmlformats.org/drawingml/2006/main" xmlns:r="http://schemas.openxmlformats.org/officeDocument/2006/relationships" xmlns:p="http://schemas.openxmlformats.org/presentationml/2006/main">
-  <p:cSld>
-    <p:spTree>
-      <p:nvGrpSpPr>
-        <p:cNvPr id="1" name=""/>
-        <p:cNvGrpSpPr/>
-        <p:nvPr/>
-      </p:nvGrpSpPr>
-      <p:grpSpPr>
-        <a:xfrm>
-          <a:off x="0" y="0"/>
-          <a:ext cx="0" cy="0"/>
-          <a:chOff x="0" y="0"/>
-          <a:chExt cx="0" cy="0"/>
-        </a:xfrm>
-      </p:grpSpPr>
-      <p:sp>
-        <p:nvSpPr>
-          <p:cNvPr id="2" name="Título 1"/>
-          <p:cNvSpPr>
-            <a:spLocks noGrp="1"/>
-          </p:cNvSpPr>
-          <p:nvPr>
-            <p:ph type="title"/>
-          </p:nvPr>
-        </p:nvSpPr>
-        <p:spPr/>
-        <p:txBody>
-          <a:bodyPr/>
-          <a:lstStyle/>
-          <a:p>
-            <a:r>
-              <a:rPr lang="es-ES" dirty="0" err="1" smtClean="0"/>
-              <a:t>YoSoyTuCine</a:t>
-            </a:r>
-            <a:endParaRPr lang="es-ES" dirty="0"/>
-          </a:p>
-        </p:txBody>
-      </p:sp>
-      <p:sp>
-        <p:nvSpPr>
-          <p:cNvPr id="3" name="Marcador de contenido 2"/>
-          <p:cNvSpPr>
-            <a:spLocks noGrp="1"/>
-          </p:cNvSpPr>
-          <p:nvPr>
-            <p:ph idx="1"/>
-          </p:nvPr>
-        </p:nvSpPr>
-        <p:spPr/>
-        <p:txBody>
-          <a:bodyPr/>
-          <a:lstStyle/>
-          <a:p>
-            <a:r>
-              <a:rPr lang="es-ES_tradnl" dirty="0" smtClean="0"/>
-              <a:t>Comparador de cines.</a:t>
-            </a:r>
-          </a:p>
-          <a:p>
-            <a:endParaRPr lang="es-ES" dirty="0"/>
-          </a:p>
-          <a:p>
-            <a:r>
-              <a:rPr lang="es-ES_tradnl" dirty="0" smtClean="0"/>
-              <a:t>Cine más cercano en todo momento.</a:t>
-            </a:r>
-          </a:p>
-          <a:p>
-            <a:endParaRPr lang="es-ES" dirty="0"/>
-          </a:p>
-          <a:p>
-            <a:r>
-              <a:rPr lang="es-ES_tradnl" dirty="0" smtClean="0"/>
-              <a:t>Elige además en base de las </a:t>
-            </a:r>
-            <a:r>
-              <a:rPr lang="es-ES_tradnl" dirty="0"/>
-              <a:t>valoraciones dadas a los cines por la comunidad de usuarios de </a:t>
-            </a:r>
-            <a:r>
-              <a:rPr lang="es-ES_tradnl" dirty="0" err="1"/>
-              <a:t>YoSoyTuCine</a:t>
-            </a:r>
-            <a:r>
-              <a:rPr lang="es-ES_tradnl" dirty="0"/>
-              <a:t>.</a:t>
-            </a:r>
-            <a:endParaRPr lang="es-ES" dirty="0"/>
-          </a:p>
-          <a:p>
-            <a:endParaRPr lang="es-ES" dirty="0"/>
-          </a:p>
-        </p:txBody>
-      </p:sp>
-    </p:spTree>
-    <p:extLst>
-      <p:ext uri="{BB962C8B-B14F-4D97-AF65-F5344CB8AC3E}">
-        <p14:creationId xmlns:p14="http://schemas.microsoft.com/office/powerpoint/2010/main" val="3242723743"/>
-      </p:ext>
-    </p:extLst>
-  </p:cSld>
-  <p:clrMapOvr>
-    <a:masterClrMapping/>
-  </p:clrMapOvr>
-  <p:timing>
-    <p:tnLst>
-      <p:par>
-        <p:cTn id="1" dur="indefinite" restart="never" nodeType="tmRoot"/>
-      </p:par>
-    </p:tnLst>
-  </p:timing>
-</p:sld>
-</file>
-
-<file path=ppt/slides/slide30.xml><?xml version="1.0" encoding="utf-8"?>
+<file path=ppt/slides/slide32.xml><?xml version="1.0" encoding="utf-8"?>
 <p:sld xmlns:a="http://schemas.openxmlformats.org/drawingml/2006/main" xmlns:r="http://schemas.openxmlformats.org/officeDocument/2006/relationships" xmlns:p="http://schemas.openxmlformats.org/presentationml/2006/main">
   <p:cSld>
     <p:spTree>
@@ -11139,7 +11469,7 @@
 </p:sld>
 </file>
 
-<file path=ppt/slides/slide31.xml><?xml version="1.0" encoding="utf-8"?>
+<file path=ppt/slides/slide33.xml><?xml version="1.0" encoding="utf-8"?>
 <p:sld xmlns:a="http://schemas.openxmlformats.org/drawingml/2006/main" xmlns:r="http://schemas.openxmlformats.org/officeDocument/2006/relationships" xmlns:p="http://schemas.openxmlformats.org/presentationml/2006/main">
   <p:cSld>
     <p:spTree>
@@ -11235,7 +11565,7 @@
 </p:sld>
 </file>
 
-<file path=ppt/slides/slide32.xml><?xml version="1.0" encoding="utf-8"?>
+<file path=ppt/slides/slide34.xml><?xml version="1.0" encoding="utf-8"?>
 <p:sld xmlns:a="http://schemas.openxmlformats.org/drawingml/2006/main" xmlns:r="http://schemas.openxmlformats.org/officeDocument/2006/relationships" xmlns:p="http://schemas.openxmlformats.org/presentationml/2006/main">
   <p:cSld>
     <p:spTree>
@@ -11840,25 +12170,35 @@
           </a:p>
         </p:txBody>
       </p:sp>
-      <p:sp>
-        <p:nvSpPr>
-          <p:cNvPr id="5" name="Marcador de contenido 4"/>
-          <p:cNvSpPr>
-            <a:spLocks noGrp="1"/>
-          </p:cNvSpPr>
+      <p:pic>
+        <p:nvPicPr>
+          <p:cNvPr id="3" name="Marcador de contenido 2"/>
+          <p:cNvPicPr>
+            <a:picLocks noGrp="1" noChangeAspect="1"/>
+          </p:cNvPicPr>
           <p:nvPr>
             <p:ph idx="1"/>
           </p:nvPr>
-        </p:nvSpPr>
-        <p:spPr/>
-        <p:txBody>
-          <a:bodyPr/>
-          <a:lstStyle/>
-          <a:p>
-            <a:endParaRPr lang="es-ES" dirty="0"/>
-          </a:p>
-        </p:txBody>
-      </p:sp>
+        </p:nvPicPr>
+        <p:blipFill>
+          <a:blip r:embed="rId3">
+            <a:extLst>
+              <a:ext uri="{28A0092B-C50C-407E-A947-70E740481C1C}">
+                <a14:useLocalDpi xmlns:a14="http://schemas.microsoft.com/office/drawing/2010/main" val="0"/>
+              </a:ext>
+            </a:extLst>
+          </a:blip>
+          <a:stretch>
+            <a:fillRect/>
+          </a:stretch>
+        </p:blipFill>
+        <p:spPr>
+          <a:xfrm>
+            <a:off x="3964682" y="1477282"/>
+            <a:ext cx="3624006" cy="4351338"/>
+          </a:xfrm>
+        </p:spPr>
+      </p:pic>
     </p:spTree>
     <p:extLst>
       <p:ext uri="{BB962C8B-B14F-4D97-AF65-F5344CB8AC3E}">
@@ -11896,32 +12236,62 @@
           <a:chExt cx="0" cy="0"/>
         </a:xfrm>
       </p:grpSpPr>
+      <p:sp>
+        <p:nvSpPr>
+          <p:cNvPr id="2" name="Título 1"/>
+          <p:cNvSpPr>
+            <a:spLocks noGrp="1"/>
+          </p:cNvSpPr>
+          <p:nvPr>
+            <p:ph type="title"/>
+          </p:nvPr>
+        </p:nvSpPr>
+        <p:spPr/>
+        <p:txBody>
+          <a:bodyPr/>
+          <a:lstStyle/>
+          <a:p>
+            <a:r>
+              <a:rPr lang="es-ES" dirty="0" err="1" smtClean="0"/>
+              <a:t>Scrapping</a:t>
+            </a:r>
+            <a:endParaRPr lang="es-ES" dirty="0"/>
+          </a:p>
+        </p:txBody>
+      </p:sp>
       <p:pic>
         <p:nvPicPr>
-          <p:cNvPr id="2" name="Imagen 1"/>
-          <p:cNvPicPr/>
-          <p:nvPr/>
+          <p:cNvPr id="3" name="Marcador de contenido 2"/>
+          <p:cNvPicPr>
+            <a:picLocks noGrp="1" noChangeAspect="1"/>
+          </p:cNvPicPr>
+          <p:nvPr>
+            <p:ph idx="1"/>
+          </p:nvPr>
         </p:nvPicPr>
         <p:blipFill>
-          <a:blip r:embed="rId3"/>
+          <a:blip r:embed="rId3">
+            <a:extLst>
+              <a:ext uri="{28A0092B-C50C-407E-A947-70E740481C1C}">
+                <a14:useLocalDpi xmlns:a14="http://schemas.microsoft.com/office/drawing/2010/main" val="0"/>
+              </a:ext>
+            </a:extLst>
+          </a:blip>
           <a:stretch>
             <a:fillRect/>
           </a:stretch>
         </p:blipFill>
         <p:spPr>
           <a:xfrm>
-            <a:off x="1103541" y="727803"/>
-            <a:ext cx="9869260" cy="5183599"/>
+            <a:off x="838200" y="2405684"/>
+            <a:ext cx="10515600" cy="3191220"/>
           </a:xfrm>
-          <a:prstGeom prst="rect">
-            <a:avLst/>
-          </a:prstGeom>
         </p:spPr>
       </p:pic>
     </p:spTree>
     <p:extLst>
       <p:ext uri="{BB962C8B-B14F-4D97-AF65-F5344CB8AC3E}">
-        <p14:creationId xmlns:p14="http://schemas.microsoft.com/office/powerpoint/2010/main" val="2934858950"/>
+        <p14:creationId xmlns:p14="http://schemas.microsoft.com/office/powerpoint/2010/main" val="2915264181"/>
       </p:ext>
     </p:extLst>
   </p:cSld>

</xml_diff>